<commit_message>
Fixed typos on slides; fixed annimations; clarified slide on invariant violation
</commit_message>
<xml_diff>
--- a/Debugging/debugging.pptx
+++ b/Debugging/debugging.pptx
@@ -32,8 +32,8 @@
     <p:sldId id="319" r:id="rId26"/>
     <p:sldId id="320" r:id="rId27"/>
     <p:sldId id="321" r:id="rId28"/>
-    <p:sldId id="259" r:id="rId29"/>
-    <p:sldId id="331" r:id="rId30"/>
+    <p:sldId id="331" r:id="rId29"/>
+    <p:sldId id="333" r:id="rId30"/>
     <p:sldId id="260" r:id="rId31"/>
     <p:sldId id="261" r:id="rId32"/>
     <p:sldId id="262" r:id="rId33"/>
@@ -4861,6 +4861,9 @@
                     <p:cTn id="3" fill="hold">
                       <p:stCondLst>
                         <p:cond delay="indefinite"/>
+                        <p:cond evt="onBegin" delay="0">
+                          <p:tn val="2"/>
+                        </p:cond>
                       </p:stCondLst>
                       <p:childTnLst>
                         <p:par>
@@ -4870,7 +4873,7 @@
                             </p:stCondLst>
                             <p:childTnLst>
                               <p:par>
-                                <p:cTn id="5" presetID="1" presetClass="entr" presetSubtype="0" fill="hold" grpId="0" nodeType="clickEffect">
+                                <p:cTn id="5" presetID="1" presetClass="entr" presetSubtype="0" fill="hold" grpId="0" nodeType="withEffect">
                                   <p:stCondLst>
                                     <p:cond delay="0"/>
                                   </p:stCondLst>
@@ -5263,7 +5266,7 @@
       </p:par>
     </p:tnLst>
     <p:bldLst>
-      <p:bldP spid="3" grpId="0" build="p"/>
+      <p:bldP spid="3" grpId="0" uiExpand="1" build="p"/>
       <p:bldP spid="13" grpId="0" animBg="1"/>
       <p:bldP spid="14" grpId="0" animBg="1"/>
     </p:bldLst>
@@ -5846,6 +5849,9 @@
                     <p:cTn id="3" fill="hold">
                       <p:stCondLst>
                         <p:cond delay="indefinite"/>
+                        <p:cond evt="onBegin" delay="0">
+                          <p:tn val="2"/>
+                        </p:cond>
                       </p:stCondLst>
                       <p:childTnLst>
                         <p:par>
@@ -5855,7 +5861,7 @@
                             </p:stCondLst>
                             <p:childTnLst>
                               <p:par>
-                                <p:cTn id="5" presetID="1" presetClass="entr" presetSubtype="0" fill="hold" grpId="0" nodeType="clickEffect">
+                                <p:cTn id="5" presetID="1" presetClass="entr" presetSubtype="0" fill="hold" grpId="0" nodeType="withEffect">
                                   <p:stCondLst>
                                     <p:cond delay="0"/>
                                   </p:stCondLst>
@@ -6185,9 +6191,9 @@
       </p:par>
     </p:tnLst>
     <p:bldLst>
-      <p:bldP spid="3" grpId="0" build="p"/>
-      <p:bldP spid="5" grpId="0" animBg="1"/>
-      <p:bldP spid="7" grpId="0" animBg="1"/>
+      <p:bldP spid="3" grpId="0" uiExpand="1" build="p"/>
+      <p:bldP spid="5" grpId="0" uiExpand="1" animBg="1"/>
+      <p:bldP spid="7" grpId="0" uiExpand="1" animBg="1"/>
       <p:bldP spid="8" grpId="0" animBg="1"/>
     </p:bldLst>
   </p:timing>
@@ -6350,8 +6356,19 @@
           </a:p>
           <a:p>
             <a:r>
+              <a:rPr lang="en-US" dirty="0" smtClean="0"/>
+              <a:t>Implemented in</a:t>
+            </a:r>
+          </a:p>
+          <a:p>
+            <a:pPr lvl="1"/>
+            <a:r>
+              <a:rPr lang="en-US" dirty="0" smtClean="0"/>
+              <a:t>C </a:t>
+            </a:r>
+            <a:r>
               <a:rPr lang="en-US" dirty="0"/>
-              <a:t>C standard library: </a:t>
+              <a:t>standard library: </a:t>
             </a:r>
             <a:r>
               <a:rPr lang="en-US" dirty="0" err="1">
@@ -6373,12 +6390,14 @@
             </a:endParaRPr>
           </a:p>
           <a:p>
+            <a:pPr lvl="1"/>
             <a:r>
               <a:rPr lang="en-US" dirty="0" smtClean="0"/>
               <a:t>Java 5+: part of language specs</a:t>
             </a:r>
           </a:p>
           <a:p>
+            <a:pPr lvl="1"/>
             <a:r>
               <a:rPr lang="en-US" dirty="0" smtClean="0"/>
               <a:t>Python 2.7.x, 3.x: part of language specs</a:t>
@@ -6408,6 +6427,9 @@
                     <p:cTn id="3" fill="hold">
                       <p:stCondLst>
                         <p:cond delay="indefinite"/>
+                        <p:cond evt="onBegin" delay="0">
+                          <p:tn val="2"/>
+                        </p:cond>
                       </p:stCondLst>
                       <p:childTnLst>
                         <p:par>
@@ -6417,7 +6439,7 @@
                             </p:stCondLst>
                             <p:childTnLst>
                               <p:par>
-                                <p:cTn id="5" presetID="1" presetClass="entr" presetSubtype="0" fill="hold" grpId="0" nodeType="clickEffect">
+                                <p:cTn id="5" presetID="1" presetClass="entr" presetSubtype="0" fill="hold" grpId="0" nodeType="withEffect">
                                   <p:stCondLst>
                                     <p:cond delay="0"/>
                                   </p:stCondLst>
@@ -6946,6 +6968,55 @@
                       </p:childTnLst>
                     </p:cTn>
                   </p:par>
+                  <p:par>
+                    <p:cTn id="43" fill="hold">
+                      <p:stCondLst>
+                        <p:cond delay="indefinite"/>
+                      </p:stCondLst>
+                      <p:childTnLst>
+                        <p:par>
+                          <p:cTn id="44" fill="hold">
+                            <p:stCondLst>
+                              <p:cond delay="0"/>
+                            </p:stCondLst>
+                            <p:childTnLst>
+                              <p:par>
+                                <p:cTn id="45" presetID="1" presetClass="entr" presetSubtype="0" fill="hold" grpId="0" nodeType="clickEffect">
+                                  <p:stCondLst>
+                                    <p:cond delay="0"/>
+                                  </p:stCondLst>
+                                  <p:childTnLst>
+                                    <p:set>
+                                      <p:cBhvr>
+                                        <p:cTn id="46" dur="1" fill="hold">
+                                          <p:stCondLst>
+                                            <p:cond delay="0"/>
+                                          </p:stCondLst>
+                                        </p:cTn>
+                                        <p:tgtEl>
+                                          <p:spTgt spid="3">
+                                            <p:txEl>
+                                              <p:pRg st="14" end="14"/>
+                                            </p:txEl>
+                                          </p:spTgt>
+                                        </p:tgtEl>
+                                        <p:attrNameLst>
+                                          <p:attrName>style.visibility</p:attrName>
+                                        </p:attrNameLst>
+                                      </p:cBhvr>
+                                      <p:to>
+                                        <p:strVal val="visible"/>
+                                      </p:to>
+                                    </p:set>
+                                  </p:childTnLst>
+                                </p:cTn>
+                              </p:par>
+                            </p:childTnLst>
+                          </p:cTn>
+                        </p:par>
+                      </p:childTnLst>
+                    </p:cTn>
+                  </p:par>
                 </p:childTnLst>
               </p:cTn>
               <p:prevCondLst>
@@ -6968,7 +7039,7 @@
       </p:par>
     </p:tnLst>
     <p:bldLst>
-      <p:bldP spid="3" grpId="0" build="p" bldLvl="2"/>
+      <p:bldP spid="3" grpId="0" uiExpand="1" build="p" bldLvl="2"/>
     </p:bldLst>
   </p:timing>
 </p:sld>
@@ -7685,6 +7756,186 @@
           </p:txBody>
         </p:sp>
       </p:grpSp>
+      <p:grpSp>
+        <p:nvGrpSpPr>
+          <p:cNvPr id="15" name="Group 14"/>
+          <p:cNvGrpSpPr/>
+          <p:nvPr/>
+        </p:nvGrpSpPr>
+        <p:grpSpPr>
+          <a:xfrm>
+            <a:off x="3857065" y="3789040"/>
+            <a:ext cx="2731159" cy="821705"/>
+            <a:chOff x="3707905" y="3789040"/>
+            <a:chExt cx="2731159" cy="821705"/>
+          </a:xfrm>
+        </p:grpSpPr>
+        <p:sp>
+          <p:nvSpPr>
+            <p:cNvPr id="4" name="TextBox 3"/>
+            <p:cNvSpPr txBox="1"/>
+            <p:nvPr/>
+          </p:nvSpPr>
+          <p:spPr>
+            <a:xfrm>
+              <a:off x="5157623" y="4149080"/>
+              <a:ext cx="1281441" cy="461665"/>
+            </a:xfrm>
+            <a:prstGeom prst="rect">
+              <a:avLst/>
+            </a:prstGeom>
+            <a:solidFill>
+              <a:schemeClr val="bg1"/>
+            </a:solidFill>
+            <a:ln>
+              <a:solidFill>
+                <a:schemeClr val="tx1"/>
+              </a:solidFill>
+            </a:ln>
+          </p:spPr>
+          <p:txBody>
+            <a:bodyPr wrap="none" rtlCol="0">
+              <a:spAutoFit/>
+            </a:bodyPr>
+            <a:lstStyle/>
+            <a:p>
+              <a:r>
+                <a:rPr lang="en-US" sz="2400" dirty="0" smtClean="0"/>
+                <a:t>invariant</a:t>
+              </a:r>
+              <a:endParaRPr lang="nl-BE" sz="2400" dirty="0"/>
+            </a:p>
+          </p:txBody>
+        </p:sp>
+        <p:cxnSp>
+          <p:nvCxnSpPr>
+            <p:cNvPr id="14" name="Straight Arrow Connector 13"/>
+            <p:cNvCxnSpPr>
+              <a:stCxn id="4" idx="1"/>
+            </p:cNvCxnSpPr>
+            <p:nvPr/>
+          </p:nvCxnSpPr>
+          <p:spPr>
+            <a:xfrm flipH="1" flipV="1">
+              <a:off x="3707905" y="3789040"/>
+              <a:ext cx="1449718" cy="590873"/>
+            </a:xfrm>
+            <a:prstGeom prst="straightConnector1">
+              <a:avLst/>
+            </a:prstGeom>
+            <a:ln>
+              <a:solidFill>
+                <a:schemeClr val="tx1"/>
+              </a:solidFill>
+              <a:tailEnd type="stealth" w="lg" len="lg"/>
+            </a:ln>
+          </p:spPr>
+          <p:style>
+            <a:lnRef idx="1">
+              <a:schemeClr val="accent1"/>
+            </a:lnRef>
+            <a:fillRef idx="0">
+              <a:schemeClr val="accent1"/>
+            </a:fillRef>
+            <a:effectRef idx="0">
+              <a:schemeClr val="accent1"/>
+            </a:effectRef>
+            <a:fontRef idx="minor">
+              <a:schemeClr val="tx1"/>
+            </a:fontRef>
+          </p:style>
+        </p:cxnSp>
+      </p:grpSp>
+      <p:grpSp>
+        <p:nvGrpSpPr>
+          <p:cNvPr id="16" name="Group 15"/>
+          <p:cNvGrpSpPr/>
+          <p:nvPr/>
+        </p:nvGrpSpPr>
+        <p:grpSpPr>
+          <a:xfrm>
+            <a:off x="3491880" y="2210148"/>
+            <a:ext cx="3080415" cy="570781"/>
+            <a:chOff x="3182638" y="4149080"/>
+            <a:chExt cx="3080415" cy="570781"/>
+          </a:xfrm>
+        </p:grpSpPr>
+        <p:sp>
+          <p:nvSpPr>
+            <p:cNvPr id="17" name="TextBox 16"/>
+            <p:cNvSpPr txBox="1"/>
+            <p:nvPr/>
+          </p:nvSpPr>
+          <p:spPr>
+            <a:xfrm>
+              <a:off x="4478782" y="4149080"/>
+              <a:ext cx="1784271" cy="461665"/>
+            </a:xfrm>
+            <a:prstGeom prst="rect">
+              <a:avLst/>
+            </a:prstGeom>
+            <a:solidFill>
+              <a:schemeClr val="bg1"/>
+            </a:solidFill>
+            <a:ln>
+              <a:solidFill>
+                <a:schemeClr val="tx1"/>
+              </a:solidFill>
+            </a:ln>
+          </p:spPr>
+          <p:txBody>
+            <a:bodyPr wrap="none" rtlCol="0">
+              <a:spAutoFit/>
+            </a:bodyPr>
+            <a:lstStyle/>
+            <a:p>
+              <a:r>
+                <a:rPr lang="en-US" sz="2400" dirty="0" smtClean="0"/>
+                <a:t>precondition</a:t>
+              </a:r>
+              <a:endParaRPr lang="nl-BE" sz="2400" dirty="0"/>
+            </a:p>
+          </p:txBody>
+        </p:sp>
+        <p:cxnSp>
+          <p:nvCxnSpPr>
+            <p:cNvPr id="18" name="Straight Arrow Connector 17"/>
+            <p:cNvCxnSpPr>
+              <a:stCxn id="17" idx="1"/>
+            </p:cNvCxnSpPr>
+            <p:nvPr/>
+          </p:nvCxnSpPr>
+          <p:spPr>
+            <a:xfrm flipH="1">
+              <a:off x="3182638" y="4379913"/>
+              <a:ext cx="1296144" cy="339948"/>
+            </a:xfrm>
+            <a:prstGeom prst="straightConnector1">
+              <a:avLst/>
+            </a:prstGeom>
+            <a:ln>
+              <a:solidFill>
+                <a:schemeClr val="tx1"/>
+              </a:solidFill>
+              <a:tailEnd type="stealth" w="lg" len="lg"/>
+            </a:ln>
+          </p:spPr>
+          <p:style>
+            <a:lnRef idx="1">
+              <a:schemeClr val="accent1"/>
+            </a:lnRef>
+            <a:fillRef idx="0">
+              <a:schemeClr val="accent1"/>
+            </a:fillRef>
+            <a:effectRef idx="0">
+              <a:schemeClr val="accent1"/>
+            </a:effectRef>
+            <a:fontRef idx="minor">
+              <a:schemeClr val="tx1"/>
+            </a:fontRef>
+          </p:style>
+        </p:cxnSp>
+      </p:grpSp>
     </p:spTree>
     <p:extLst>
       <p:ext uri="{BB962C8B-B14F-4D97-AF65-F5344CB8AC3E}">
@@ -7698,7 +7949,120 @@
   <p:timing>
     <p:tnLst>
       <p:par>
-        <p:cTn id="1" dur="indefinite" restart="never" nodeType="tmRoot"/>
+        <p:cTn id="1" dur="indefinite" restart="never" nodeType="tmRoot">
+          <p:childTnLst>
+            <p:seq concurrent="1" nextAc="seek">
+              <p:cTn id="2" dur="indefinite" nodeType="mainSeq">
+                <p:childTnLst>
+                  <p:par>
+                    <p:cTn id="3" fill="hold">
+                      <p:stCondLst>
+                        <p:cond delay="indefinite"/>
+                      </p:stCondLst>
+                      <p:childTnLst>
+                        <p:par>
+                          <p:cTn id="4" fill="hold">
+                            <p:stCondLst>
+                              <p:cond delay="0"/>
+                            </p:stCondLst>
+                            <p:childTnLst>
+                              <p:par>
+                                <p:cTn id="5" presetID="1" presetClass="entr" presetSubtype="0" fill="hold" nodeType="clickEffect">
+                                  <p:stCondLst>
+                                    <p:cond delay="0"/>
+                                  </p:stCondLst>
+                                  <p:childTnLst>
+                                    <p:set>
+                                      <p:cBhvr>
+                                        <p:cTn id="6" dur="1" fill="hold">
+                                          <p:stCondLst>
+                                            <p:cond delay="0"/>
+                                          </p:stCondLst>
+                                        </p:cTn>
+                                        <p:tgtEl>
+                                          <p:spTgt spid="16"/>
+                                        </p:tgtEl>
+                                        <p:attrNameLst>
+                                          <p:attrName>style.visibility</p:attrName>
+                                        </p:attrNameLst>
+                                      </p:cBhvr>
+                                      <p:to>
+                                        <p:strVal val="visible"/>
+                                      </p:to>
+                                    </p:set>
+                                  </p:childTnLst>
+                                </p:cTn>
+                              </p:par>
+                            </p:childTnLst>
+                          </p:cTn>
+                        </p:par>
+                      </p:childTnLst>
+                    </p:cTn>
+                  </p:par>
+                  <p:par>
+                    <p:cTn id="7" fill="hold">
+                      <p:stCondLst>
+                        <p:cond delay="indefinite"/>
+                      </p:stCondLst>
+                      <p:childTnLst>
+                        <p:par>
+                          <p:cTn id="8" fill="hold">
+                            <p:stCondLst>
+                              <p:cond delay="0"/>
+                            </p:stCondLst>
+                            <p:childTnLst>
+                              <p:par>
+                                <p:cTn id="9" presetID="1" presetClass="entr" presetSubtype="0" fill="hold" nodeType="clickEffect">
+                                  <p:stCondLst>
+                                    <p:cond delay="0"/>
+                                  </p:stCondLst>
+                                  <p:childTnLst>
+                                    <p:set>
+                                      <p:cBhvr>
+                                        <p:cTn id="10" dur="1" fill="hold">
+                                          <p:stCondLst>
+                                            <p:cond delay="0"/>
+                                          </p:stCondLst>
+                                        </p:cTn>
+                                        <p:tgtEl>
+                                          <p:spTgt spid="15"/>
+                                        </p:tgtEl>
+                                        <p:attrNameLst>
+                                          <p:attrName>style.visibility</p:attrName>
+                                        </p:attrNameLst>
+                                      </p:cBhvr>
+                                      <p:to>
+                                        <p:strVal val="visible"/>
+                                      </p:to>
+                                    </p:set>
+                                  </p:childTnLst>
+                                </p:cTn>
+                              </p:par>
+                            </p:childTnLst>
+                          </p:cTn>
+                        </p:par>
+                      </p:childTnLst>
+                    </p:cTn>
+                  </p:par>
+                </p:childTnLst>
+              </p:cTn>
+              <p:prevCondLst>
+                <p:cond evt="onPrev" delay="0">
+                  <p:tgtEl>
+                    <p:sldTgt/>
+                  </p:tgtEl>
+                </p:cond>
+              </p:prevCondLst>
+              <p:nextCondLst>
+                <p:cond evt="onNext" delay="0">
+                  <p:tgtEl>
+                    <p:sldTgt/>
+                  </p:tgtEl>
+                </p:cond>
+              </p:nextCondLst>
+            </p:seq>
+          </p:childTnLst>
+        </p:cTn>
       </p:par>
     </p:tnLst>
   </p:timing>
@@ -7973,6 +8337,96 @@
           </a:p>
         </p:txBody>
       </p:sp>
+      <p:grpSp>
+        <p:nvGrpSpPr>
+          <p:cNvPr id="6" name="Group 5"/>
+          <p:cNvGrpSpPr/>
+          <p:nvPr/>
+        </p:nvGrpSpPr>
+        <p:grpSpPr>
+          <a:xfrm>
+            <a:off x="3352209" y="3330482"/>
+            <a:ext cx="4705157" cy="1322654"/>
+            <a:chOff x="2478191" y="4149080"/>
+            <a:chExt cx="4705157" cy="1322654"/>
+          </a:xfrm>
+        </p:grpSpPr>
+        <p:sp>
+          <p:nvSpPr>
+            <p:cNvPr id="7" name="TextBox 6"/>
+            <p:cNvSpPr txBox="1"/>
+            <p:nvPr/>
+          </p:nvSpPr>
+          <p:spPr>
+            <a:xfrm>
+              <a:off x="4729919" y="4149080"/>
+              <a:ext cx="2453429" cy="461665"/>
+            </a:xfrm>
+            <a:prstGeom prst="rect">
+              <a:avLst/>
+            </a:prstGeom>
+            <a:solidFill>
+              <a:schemeClr val="bg1"/>
+            </a:solidFill>
+            <a:ln>
+              <a:solidFill>
+                <a:schemeClr val="tx1"/>
+              </a:solidFill>
+            </a:ln>
+          </p:spPr>
+          <p:txBody>
+            <a:bodyPr wrap="none" rtlCol="0">
+              <a:spAutoFit/>
+            </a:bodyPr>
+            <a:lstStyle/>
+            <a:p>
+              <a:r>
+                <a:rPr lang="en-US" sz="2400" dirty="0" smtClean="0"/>
+                <a:t>invariant violated!</a:t>
+              </a:r>
+              <a:endParaRPr lang="nl-BE" sz="2400" dirty="0"/>
+            </a:p>
+          </p:txBody>
+        </p:sp>
+        <p:cxnSp>
+          <p:nvCxnSpPr>
+            <p:cNvPr id="8" name="Straight Arrow Connector 7"/>
+            <p:cNvCxnSpPr>
+              <a:stCxn id="7" idx="1"/>
+            </p:cNvCxnSpPr>
+            <p:nvPr/>
+          </p:nvCxnSpPr>
+          <p:spPr>
+            <a:xfrm flipH="1">
+              <a:off x="2478191" y="4379913"/>
+              <a:ext cx="2251728" cy="1091821"/>
+            </a:xfrm>
+            <a:prstGeom prst="straightConnector1">
+              <a:avLst/>
+            </a:prstGeom>
+            <a:ln>
+              <a:solidFill>
+                <a:schemeClr val="tx1"/>
+              </a:solidFill>
+              <a:tailEnd type="stealth" w="lg" len="lg"/>
+            </a:ln>
+          </p:spPr>
+          <p:style>
+            <a:lnRef idx="1">
+              <a:schemeClr val="accent1"/>
+            </a:lnRef>
+            <a:fillRef idx="0">
+              <a:schemeClr val="accent1"/>
+            </a:fillRef>
+            <a:effectRef idx="0">
+              <a:schemeClr val="accent1"/>
+            </a:effectRef>
+            <a:fontRef idx="minor">
+              <a:schemeClr val="tx1"/>
+            </a:fontRef>
+          </p:style>
+        </p:cxnSp>
+      </p:grpSp>
     </p:spTree>
     <p:extLst>
       <p:ext uri="{BB962C8B-B14F-4D97-AF65-F5344CB8AC3E}">
@@ -7995,6 +8449,9 @@
                     <p:cTn id="3" fill="hold">
                       <p:stCondLst>
                         <p:cond delay="indefinite"/>
+                        <p:cond evt="onBegin" delay="0">
+                          <p:tn val="2"/>
+                        </p:cond>
                       </p:stCondLst>
                       <p:childTnLst>
                         <p:par>
@@ -8004,7 +8461,7 @@
                             </p:stCondLst>
                             <p:childTnLst>
                               <p:par>
-                                <p:cTn id="5" presetID="1" presetClass="entr" presetSubtype="0" fill="hold" grpId="0" nodeType="clickEffect">
+                                <p:cTn id="5" presetID="1" presetClass="entr" presetSubtype="0" fill="hold" grpId="0" nodeType="withEffect">
                                   <p:stCondLst>
                                     <p:cond delay="0"/>
                                   </p:stCondLst>
@@ -8061,33 +8518,15 @@
                                   </p:childTnLst>
                                 </p:cTn>
                               </p:par>
-                            </p:childTnLst>
-                          </p:cTn>
-                        </p:par>
-                      </p:childTnLst>
-                    </p:cTn>
-                  </p:par>
-                  <p:par>
-                    <p:cTn id="9" fill="hold">
-                      <p:stCondLst>
-                        <p:cond delay="indefinite"/>
-                      </p:stCondLst>
-                      <p:childTnLst>
-                        <p:par>
-                          <p:cTn id="10" fill="hold">
-                            <p:stCondLst>
-                              <p:cond delay="0"/>
-                            </p:stCondLst>
-                            <p:childTnLst>
                               <p:par>
-                                <p:cTn id="11" presetID="1" presetClass="entr" presetSubtype="0" fill="hold" grpId="0" nodeType="clickEffect">
+                                <p:cTn id="9" presetID="1" presetClass="entr" presetSubtype="0" fill="hold" grpId="0" nodeType="withEffect">
                                   <p:stCondLst>
                                     <p:cond delay="0"/>
                                   </p:stCondLst>
                                   <p:childTnLst>
                                     <p:set>
                                       <p:cBhvr>
-                                        <p:cTn id="12" dur="1" fill="hold">
+                                        <p:cTn id="10" dur="1" fill="hold">
                                           <p:stCondLst>
                                             <p:cond delay="0"/>
                                           </p:stCondLst>
@@ -8111,20 +8550,65 @@
                                 </p:cTn>
                               </p:par>
                               <p:par>
-                                <p:cTn id="13" presetID="1" presetClass="entr" presetSubtype="0" fill="hold" grpId="0" nodeType="withEffect">
+                                <p:cTn id="11" presetID="1" presetClass="entr" presetSubtype="0" fill="hold" grpId="0" nodeType="withEffect">
                                   <p:stCondLst>
                                     <p:cond delay="0"/>
                                   </p:stCondLst>
                                   <p:childTnLst>
                                     <p:set>
                                       <p:cBhvr>
-                                        <p:cTn id="14" dur="1" fill="hold">
+                                        <p:cTn id="12" dur="1" fill="hold">
                                           <p:stCondLst>
                                             <p:cond delay="0"/>
                                           </p:stCondLst>
                                         </p:cTn>
                                         <p:tgtEl>
                                           <p:spTgt spid="5"/>
+                                        </p:tgtEl>
+                                        <p:attrNameLst>
+                                          <p:attrName>style.visibility</p:attrName>
+                                        </p:attrNameLst>
+                                      </p:cBhvr>
+                                      <p:to>
+                                        <p:strVal val="visible"/>
+                                      </p:to>
+                                    </p:set>
+                                  </p:childTnLst>
+                                </p:cTn>
+                              </p:par>
+                            </p:childTnLst>
+                          </p:cTn>
+                        </p:par>
+                      </p:childTnLst>
+                    </p:cTn>
+                  </p:par>
+                  <p:par>
+                    <p:cTn id="13" fill="hold">
+                      <p:stCondLst>
+                        <p:cond delay="indefinite"/>
+                      </p:stCondLst>
+                      <p:childTnLst>
+                        <p:par>
+                          <p:cTn id="14" fill="hold">
+                            <p:stCondLst>
+                              <p:cond delay="0"/>
+                            </p:stCondLst>
+                            <p:childTnLst>
+                              <p:par>
+                                <p:cTn id="15" presetID="1" presetClass="entr" presetSubtype="0" fill="hold" nodeType="clickEffect">
+                                  <p:stCondLst>
+                                    <p:cond delay="0"/>
+                                  </p:stCondLst>
+                                  <p:childTnLst>
+                                    <p:set>
+                                      <p:cBhvr>
+                                        <p:cTn id="16" dur="1" fill="hold">
+                                          <p:stCondLst>
+                                            <p:cond delay="0"/>
+                                          </p:stCondLst>
+                                        </p:cTn>
+                                        <p:tgtEl>
+                                          <p:spTgt spid="6"/>
                                         </p:tgtEl>
                                         <p:attrNameLst>
                                           <p:attrName>style.visibility</p:attrName>
@@ -8443,9 +8927,210 @@
   <p:timing>
     <p:tnLst>
       <p:par>
-        <p:cTn id="1" dur="indefinite" restart="never" nodeType="tmRoot"/>
+        <p:cTn id="1" dur="indefinite" restart="never" nodeType="tmRoot">
+          <p:childTnLst>
+            <p:seq concurrent="1" nextAc="seek">
+              <p:cTn id="2" dur="indefinite" nodeType="mainSeq">
+                <p:childTnLst>
+                  <p:par>
+                    <p:cTn id="3" fill="hold">
+                      <p:stCondLst>
+                        <p:cond delay="indefinite"/>
+                        <p:cond evt="onBegin" delay="0">
+                          <p:tn val="2"/>
+                        </p:cond>
+                      </p:stCondLst>
+                      <p:childTnLst>
+                        <p:par>
+                          <p:cTn id="4" fill="hold">
+                            <p:stCondLst>
+                              <p:cond delay="0"/>
+                            </p:stCondLst>
+                            <p:childTnLst>
+                              <p:par>
+                                <p:cTn id="5" presetID="1" presetClass="entr" presetSubtype="0" fill="hold" grpId="0" nodeType="withEffect">
+                                  <p:stCondLst>
+                                    <p:cond delay="0"/>
+                                  </p:stCondLst>
+                                  <p:childTnLst>
+                                    <p:set>
+                                      <p:cBhvr>
+                                        <p:cTn id="6" dur="1" fill="hold">
+                                          <p:stCondLst>
+                                            <p:cond delay="0"/>
+                                          </p:stCondLst>
+                                        </p:cTn>
+                                        <p:tgtEl>
+                                          <p:spTgt spid="3">
+                                            <p:txEl>
+                                              <p:pRg st="0" end="0"/>
+                                            </p:txEl>
+                                          </p:spTgt>
+                                        </p:tgtEl>
+                                        <p:attrNameLst>
+                                          <p:attrName>style.visibility</p:attrName>
+                                        </p:attrNameLst>
+                                      </p:cBhvr>
+                                      <p:to>
+                                        <p:strVal val="visible"/>
+                                      </p:to>
+                                    </p:set>
+                                  </p:childTnLst>
+                                </p:cTn>
+                              </p:par>
+                              <p:par>
+                                <p:cTn id="7" presetID="1" presetClass="entr" presetSubtype="0" fill="hold" grpId="0" nodeType="withEffect">
+                                  <p:stCondLst>
+                                    <p:cond delay="0"/>
+                                  </p:stCondLst>
+                                  <p:childTnLst>
+                                    <p:set>
+                                      <p:cBhvr>
+                                        <p:cTn id="8" dur="1" fill="hold">
+                                          <p:stCondLst>
+                                            <p:cond delay="0"/>
+                                          </p:stCondLst>
+                                        </p:cTn>
+                                        <p:tgtEl>
+                                          <p:spTgt spid="4"/>
+                                        </p:tgtEl>
+                                        <p:attrNameLst>
+                                          <p:attrName>style.visibility</p:attrName>
+                                        </p:attrNameLst>
+                                      </p:cBhvr>
+                                      <p:to>
+                                        <p:strVal val="visible"/>
+                                      </p:to>
+                                    </p:set>
+                                  </p:childTnLst>
+                                </p:cTn>
+                              </p:par>
+                            </p:childTnLst>
+                          </p:cTn>
+                        </p:par>
+                      </p:childTnLst>
+                    </p:cTn>
+                  </p:par>
+                  <p:par>
+                    <p:cTn id="9" fill="hold">
+                      <p:stCondLst>
+                        <p:cond delay="indefinite"/>
+                      </p:stCondLst>
+                      <p:childTnLst>
+                        <p:par>
+                          <p:cTn id="10" fill="hold">
+                            <p:stCondLst>
+                              <p:cond delay="0"/>
+                            </p:stCondLst>
+                            <p:childTnLst>
+                              <p:par>
+                                <p:cTn id="11" presetID="1" presetClass="entr" presetSubtype="0" fill="hold" grpId="0" nodeType="clickEffect">
+                                  <p:stCondLst>
+                                    <p:cond delay="0"/>
+                                  </p:stCondLst>
+                                  <p:childTnLst>
+                                    <p:set>
+                                      <p:cBhvr>
+                                        <p:cTn id="12" dur="1" fill="hold">
+                                          <p:stCondLst>
+                                            <p:cond delay="0"/>
+                                          </p:stCondLst>
+                                        </p:cTn>
+                                        <p:tgtEl>
+                                          <p:spTgt spid="3">
+                                            <p:txEl>
+                                              <p:pRg st="3" end="3"/>
+                                            </p:txEl>
+                                          </p:spTgt>
+                                        </p:tgtEl>
+                                        <p:attrNameLst>
+                                          <p:attrName>style.visibility</p:attrName>
+                                        </p:attrNameLst>
+                                      </p:cBhvr>
+                                      <p:to>
+                                        <p:strVal val="visible"/>
+                                      </p:to>
+                                    </p:set>
+                                  </p:childTnLst>
+                                </p:cTn>
+                              </p:par>
+                            </p:childTnLst>
+                          </p:cTn>
+                        </p:par>
+                      </p:childTnLst>
+                    </p:cTn>
+                  </p:par>
+                  <p:par>
+                    <p:cTn id="13" fill="hold">
+                      <p:stCondLst>
+                        <p:cond delay="indefinite"/>
+                      </p:stCondLst>
+                      <p:childTnLst>
+                        <p:par>
+                          <p:cTn id="14" fill="hold">
+                            <p:stCondLst>
+                              <p:cond delay="0"/>
+                            </p:stCondLst>
+                            <p:childTnLst>
+                              <p:par>
+                                <p:cTn id="15" presetID="1" presetClass="entr" presetSubtype="0" fill="hold" grpId="0" nodeType="clickEffect">
+                                  <p:stCondLst>
+                                    <p:cond delay="0"/>
+                                  </p:stCondLst>
+                                  <p:childTnLst>
+                                    <p:set>
+                                      <p:cBhvr>
+                                        <p:cTn id="16" dur="1" fill="hold">
+                                          <p:stCondLst>
+                                            <p:cond delay="0"/>
+                                          </p:stCondLst>
+                                        </p:cTn>
+                                        <p:tgtEl>
+                                          <p:spTgt spid="5"/>
+                                        </p:tgtEl>
+                                        <p:attrNameLst>
+                                          <p:attrName>style.visibility</p:attrName>
+                                        </p:attrNameLst>
+                                      </p:cBhvr>
+                                      <p:to>
+                                        <p:strVal val="visible"/>
+                                      </p:to>
+                                    </p:set>
+                                  </p:childTnLst>
+                                </p:cTn>
+                              </p:par>
+                            </p:childTnLst>
+                          </p:cTn>
+                        </p:par>
+                      </p:childTnLst>
+                    </p:cTn>
+                  </p:par>
+                </p:childTnLst>
+              </p:cTn>
+              <p:prevCondLst>
+                <p:cond evt="onPrev" delay="0">
+                  <p:tgtEl>
+                    <p:sldTgt/>
+                  </p:tgtEl>
+                </p:cond>
+              </p:prevCondLst>
+              <p:nextCondLst>
+                <p:cond evt="onNext" delay="0">
+                  <p:tgtEl>
+                    <p:sldTgt/>
+                  </p:tgtEl>
+                </p:cond>
+              </p:nextCondLst>
+            </p:seq>
+          </p:childTnLst>
+        </p:cTn>
       </p:par>
     </p:tnLst>
+    <p:bldLst>
+      <p:bldP spid="3" grpId="0" uiExpand="1" build="p"/>
+      <p:bldP spid="4" grpId="0" animBg="1"/>
+      <p:bldP spid="5" grpId="0" animBg="1"/>
+    </p:bldLst>
   </p:timing>
 </p:sld>
 </file>
@@ -8600,8 +9285,13 @@
           <a:p>
             <a:r>
               <a:rPr lang="en-US" dirty="0" smtClean="0"/>
-              <a:t>Framework</a:t>
-            </a:r>
+              <a:t>Implementations of f</a:t>
+            </a:r>
+            <a:r>
+              <a:rPr lang="en-US" dirty="0" smtClean="0"/>
+              <a:t>ramework</a:t>
+            </a:r>
+            <a:endParaRPr lang="en-US" dirty="0" smtClean="0"/>
           </a:p>
           <a:p>
             <a:pPr lvl="1"/>
@@ -8732,6 +9422,9 @@
                     <p:cTn id="3" fill="hold">
                       <p:stCondLst>
                         <p:cond delay="indefinite"/>
+                        <p:cond evt="onBegin" delay="0">
+                          <p:tn val="2"/>
+                        </p:cond>
                       </p:stCondLst>
                       <p:childTnLst>
                         <p:par>
@@ -8741,7 +9434,7 @@
                             </p:stCondLst>
                             <p:childTnLst>
                               <p:par>
-                                <p:cTn id="5" presetID="1" presetClass="entr" presetSubtype="0" fill="hold" grpId="0" nodeType="clickEffect">
+                                <p:cTn id="5" presetID="1" presetClass="entr" presetSubtype="0" fill="hold" grpId="0" nodeType="withEffect">
                                   <p:stCondLst>
                                     <p:cond delay="0"/>
                                   </p:stCondLst>
@@ -9328,7 +10021,7 @@
       </p:par>
     </p:tnLst>
     <p:bldLst>
-      <p:bldP spid="3" grpId="0" build="p"/>
+      <p:bldP spid="3" grpId="0" uiExpand="1" build="p"/>
     </p:bldLst>
   </p:timing>
 </p:sld>
@@ -10893,6 +11586,9 @@
                     <p:cTn id="3" fill="hold">
                       <p:stCondLst>
                         <p:cond delay="indefinite"/>
+                        <p:cond evt="onBegin" delay="0">
+                          <p:tn val="2"/>
+                        </p:cond>
                       </p:stCondLst>
                       <p:childTnLst>
                         <p:par>
@@ -10902,7 +11598,7 @@
                             </p:stCondLst>
                             <p:childTnLst>
                               <p:par>
-                                <p:cTn id="5" presetID="1" presetClass="entr" presetSubtype="0" fill="hold" grpId="0" nodeType="clickEffect">
+                                <p:cTn id="5" presetID="1" presetClass="entr" presetSubtype="0" fill="hold" grpId="0" nodeType="withEffect">
                                   <p:stCondLst>
                                     <p:cond delay="0"/>
                                   </p:stCondLst>
@@ -11108,7 +11804,7 @@
       </p:par>
     </p:tnLst>
     <p:bldLst>
-      <p:bldP spid="3" grpId="0" build="p"/>
+      <p:bldP spid="3" grpId="0" uiExpand="1" build="p"/>
     </p:bldLst>
   </p:timing>
 </p:sld>
@@ -11756,6 +12452,9 @@
                     <p:cTn id="3" fill="hold">
                       <p:stCondLst>
                         <p:cond delay="indefinite"/>
+                        <p:cond evt="onBegin" delay="0">
+                          <p:tn val="2"/>
+                        </p:cond>
                       </p:stCondLst>
                       <p:childTnLst>
                         <p:par>
@@ -11765,7 +12464,7 @@
                             </p:stCondLst>
                             <p:childTnLst>
                               <p:par>
-                                <p:cTn id="5" presetID="1" presetClass="entr" presetSubtype="0" fill="hold" grpId="0" nodeType="clickEffect">
+                                <p:cTn id="5" presetID="1" presetClass="entr" presetSubtype="0" fill="hold" grpId="0" nodeType="withEffect">
                                   <p:stCondLst>
                                     <p:cond delay="0"/>
                                   </p:stCondLst>
@@ -12016,7 +12715,7 @@
       </p:par>
     </p:tnLst>
     <p:bldLst>
-      <p:bldP spid="3" grpId="0" build="p"/>
+      <p:bldP spid="3" grpId="0" uiExpand="1" build="p"/>
     </p:bldLst>
   </p:timing>
 </p:sld>
@@ -12340,6 +13039,9 @@
                     <p:cTn id="3" fill="hold">
                       <p:stCondLst>
                         <p:cond delay="indefinite"/>
+                        <p:cond evt="onBegin" delay="0">
+                          <p:tn val="2"/>
+                        </p:cond>
                       </p:stCondLst>
                       <p:childTnLst>
                         <p:par>
@@ -12349,7 +13051,7 @@
                             </p:stCondLst>
                             <p:childTnLst>
                               <p:par>
-                                <p:cTn id="5" presetID="1" presetClass="entr" presetSubtype="0" fill="hold" grpId="0" nodeType="clickEffect">
+                                <p:cTn id="5" presetID="1" presetClass="entr" presetSubtype="0" fill="hold" grpId="0" nodeType="withEffect">
                                   <p:stCondLst>
                                     <p:cond delay="0"/>
                                   </p:stCondLst>
@@ -12510,8 +13212,8 @@
       </p:par>
     </p:tnLst>
     <p:bldLst>
-      <p:bldP spid="3" grpId="0" build="p"/>
-      <p:bldP spid="4" grpId="0" animBg="1"/>
+      <p:bldP spid="3" grpId="0" uiExpand="1" build="p"/>
+      <p:bldP spid="4" grpId="0" uiExpand="1" animBg="1"/>
       <p:bldP spid="5" grpId="0" animBg="1"/>
     </p:bldLst>
   </p:timing>
@@ -12948,6 +13650,9 @@
                     <p:cTn id="3" fill="hold">
                       <p:stCondLst>
                         <p:cond delay="indefinite"/>
+                        <p:cond evt="onBegin" delay="0">
+                          <p:tn val="2"/>
+                        </p:cond>
                       </p:stCondLst>
                       <p:childTnLst>
                         <p:par>
@@ -12957,7 +13662,7 @@
                             </p:stCondLst>
                             <p:childTnLst>
                               <p:par>
-                                <p:cTn id="5" presetID="1" presetClass="entr" presetSubtype="0" fill="hold" grpId="0" nodeType="clickEffect">
+                                <p:cTn id="5" presetID="1" presetClass="entr" presetSubtype="0" fill="hold" grpId="0" nodeType="withEffect">
                                   <p:stCondLst>
                                     <p:cond delay="0"/>
                                   </p:stCondLst>
@@ -13118,7 +13823,7 @@
       </p:par>
     </p:tnLst>
     <p:bldLst>
-      <p:bldP spid="3" grpId="0" build="p"/>
+      <p:bldP spid="3" grpId="0" uiExpand="1" build="p"/>
       <p:bldP spid="7" grpId="0" animBg="1"/>
     </p:bldLst>
   </p:timing>
@@ -14126,6 +14831,9 @@
                     <p:cTn id="3" fill="hold">
                       <p:stCondLst>
                         <p:cond delay="indefinite"/>
+                        <p:cond evt="onBegin" delay="0">
+                          <p:tn val="2"/>
+                        </p:cond>
                       </p:stCondLst>
                       <p:childTnLst>
                         <p:par>
@@ -14135,7 +14843,7 @@
                             </p:stCondLst>
                             <p:childTnLst>
                               <p:par>
-                                <p:cTn id="5" presetID="1" presetClass="entr" presetSubtype="0" fill="hold" grpId="0" nodeType="clickEffect">
+                                <p:cTn id="5" presetID="1" presetClass="entr" presetSubtype="0" fill="hold" grpId="0" nodeType="withEffect">
                                   <p:stCondLst>
                                     <p:cond delay="0"/>
                                   </p:stCondLst>
@@ -14558,7 +15266,7 @@
       </p:par>
     </p:tnLst>
     <p:bldLst>
-      <p:bldP spid="3" grpId="0" build="p"/>
+      <p:bldP spid="3" grpId="0" uiExpand="1" build="p"/>
     </p:bldLst>
   </p:timing>
 </p:sld>
@@ -14598,413 +15306,6 @@
           <a:p>
             <a:r>
               <a:rPr lang="en-US" dirty="0" smtClean="0"/>
-              <a:t>Testing</a:t>
-            </a:r>
-            <a:endParaRPr lang="nl-BE" dirty="0"/>
-          </a:p>
-        </p:txBody>
-      </p:sp>
-      <p:sp>
-        <p:nvSpPr>
-          <p:cNvPr id="3" name="Content Placeholder 2"/>
-          <p:cNvSpPr>
-            <a:spLocks noGrp="1"/>
-          </p:cNvSpPr>
-          <p:nvPr>
-            <p:ph idx="1"/>
-          </p:nvPr>
-        </p:nvSpPr>
-        <p:spPr/>
-        <p:txBody>
-          <a:bodyPr/>
-          <a:lstStyle/>
-          <a:p>
-            <a:r>
-              <a:rPr lang="en-US" dirty="0" smtClean="0"/>
-              <a:t>Use assertions</a:t>
-            </a:r>
-          </a:p>
-          <a:p>
-            <a:pPr lvl="1"/>
-            <a:r>
-              <a:rPr lang="en-US" dirty="0" smtClean="0"/>
-              <a:t>Check pre-conditions/post-conditions</a:t>
-            </a:r>
-          </a:p>
-          <a:p>
-            <a:pPr lvl="1"/>
-            <a:r>
-              <a:rPr lang="en-US" dirty="0" smtClean="0"/>
-              <a:t>Check invariants</a:t>
-            </a:r>
-          </a:p>
-          <a:p>
-            <a:r>
-              <a:rPr lang="en-US" dirty="0" smtClean="0"/>
-              <a:t>Test code thoroughly</a:t>
-            </a:r>
-          </a:p>
-          <a:p>
-            <a:pPr lvl="1"/>
-            <a:r>
-              <a:rPr lang="en-US" dirty="0" smtClean="0"/>
-              <a:t>Use unit testing</a:t>
-            </a:r>
-          </a:p>
-        </p:txBody>
-      </p:sp>
-      <p:sp>
-        <p:nvSpPr>
-          <p:cNvPr id="4" name="TextBox 3"/>
-          <p:cNvSpPr txBox="1"/>
-          <p:nvPr/>
-        </p:nvSpPr>
-        <p:spPr>
-          <a:xfrm>
-            <a:off x="1475230" y="5282044"/>
-            <a:ext cx="5689058" cy="523220"/>
-          </a:xfrm>
-          <a:prstGeom prst="rect">
-            <a:avLst/>
-          </a:prstGeom>
-          <a:noFill/>
-          <a:ln w="19050">
-            <a:solidFill>
-              <a:schemeClr val="tx1"/>
-            </a:solidFill>
-          </a:ln>
-        </p:spPr>
-        <p:txBody>
-          <a:bodyPr wrap="none" rtlCol="0">
-            <a:spAutoFit/>
-          </a:bodyPr>
-          <a:lstStyle/>
-          <a:p>
-            <a:r>
-              <a:rPr lang="en-US" sz="2800" dirty="0" smtClean="0"/>
-              <a:t>Whatever you do, code will have bugs</a:t>
-            </a:r>
-            <a:endParaRPr lang="nl-BE" sz="2800" dirty="0"/>
-          </a:p>
-        </p:txBody>
-      </p:sp>
-    </p:spTree>
-    <p:extLst>
-      <p:ext uri="{BB962C8B-B14F-4D97-AF65-F5344CB8AC3E}">
-        <p14:creationId xmlns:p14="http://schemas.microsoft.com/office/powerpoint/2010/main" val="395970246"/>
-      </p:ext>
-    </p:extLst>
-  </p:cSld>
-  <p:clrMapOvr>
-    <a:masterClrMapping/>
-  </p:clrMapOvr>
-  <p:timing>
-    <p:tnLst>
-      <p:par>
-        <p:cTn id="1" dur="indefinite" restart="never" nodeType="tmRoot">
-          <p:childTnLst>
-            <p:seq concurrent="1" nextAc="seek">
-              <p:cTn id="2" dur="indefinite" nodeType="mainSeq">
-                <p:childTnLst>
-                  <p:par>
-                    <p:cTn id="3" fill="hold">
-                      <p:stCondLst>
-                        <p:cond delay="indefinite"/>
-                      </p:stCondLst>
-                      <p:childTnLst>
-                        <p:par>
-                          <p:cTn id="4" fill="hold">
-                            <p:stCondLst>
-                              <p:cond delay="0"/>
-                            </p:stCondLst>
-                            <p:childTnLst>
-                              <p:par>
-                                <p:cTn id="5" presetID="1" presetClass="entr" presetSubtype="0" fill="hold" grpId="0" nodeType="clickEffect">
-                                  <p:stCondLst>
-                                    <p:cond delay="0"/>
-                                  </p:stCondLst>
-                                  <p:childTnLst>
-                                    <p:set>
-                                      <p:cBhvr>
-                                        <p:cTn id="6" dur="1" fill="hold">
-                                          <p:stCondLst>
-                                            <p:cond delay="0"/>
-                                          </p:stCondLst>
-                                        </p:cTn>
-                                        <p:tgtEl>
-                                          <p:spTgt spid="3">
-                                            <p:txEl>
-                                              <p:pRg st="0" end="0"/>
-                                            </p:txEl>
-                                          </p:spTgt>
-                                        </p:tgtEl>
-                                        <p:attrNameLst>
-                                          <p:attrName>style.visibility</p:attrName>
-                                        </p:attrNameLst>
-                                      </p:cBhvr>
-                                      <p:to>
-                                        <p:strVal val="visible"/>
-                                      </p:to>
-                                    </p:set>
-                                  </p:childTnLst>
-                                </p:cTn>
-                              </p:par>
-                              <p:par>
-                                <p:cTn id="7" presetID="1" presetClass="entr" presetSubtype="0" fill="hold" grpId="0" nodeType="withEffect">
-                                  <p:stCondLst>
-                                    <p:cond delay="0"/>
-                                  </p:stCondLst>
-                                  <p:childTnLst>
-                                    <p:set>
-                                      <p:cBhvr>
-                                        <p:cTn id="8" dur="1" fill="hold">
-                                          <p:stCondLst>
-                                            <p:cond delay="0"/>
-                                          </p:stCondLst>
-                                        </p:cTn>
-                                        <p:tgtEl>
-                                          <p:spTgt spid="3">
-                                            <p:txEl>
-                                              <p:pRg st="1" end="1"/>
-                                            </p:txEl>
-                                          </p:spTgt>
-                                        </p:tgtEl>
-                                        <p:attrNameLst>
-                                          <p:attrName>style.visibility</p:attrName>
-                                        </p:attrNameLst>
-                                      </p:cBhvr>
-                                      <p:to>
-                                        <p:strVal val="visible"/>
-                                      </p:to>
-                                    </p:set>
-                                  </p:childTnLst>
-                                </p:cTn>
-                              </p:par>
-                              <p:par>
-                                <p:cTn id="9" presetID="1" presetClass="entr" presetSubtype="0" fill="hold" grpId="0" nodeType="withEffect">
-                                  <p:stCondLst>
-                                    <p:cond delay="0"/>
-                                  </p:stCondLst>
-                                  <p:childTnLst>
-                                    <p:set>
-                                      <p:cBhvr>
-                                        <p:cTn id="10" dur="1" fill="hold">
-                                          <p:stCondLst>
-                                            <p:cond delay="0"/>
-                                          </p:stCondLst>
-                                        </p:cTn>
-                                        <p:tgtEl>
-                                          <p:spTgt spid="3">
-                                            <p:txEl>
-                                              <p:pRg st="2" end="2"/>
-                                            </p:txEl>
-                                          </p:spTgt>
-                                        </p:tgtEl>
-                                        <p:attrNameLst>
-                                          <p:attrName>style.visibility</p:attrName>
-                                        </p:attrNameLst>
-                                      </p:cBhvr>
-                                      <p:to>
-                                        <p:strVal val="visible"/>
-                                      </p:to>
-                                    </p:set>
-                                  </p:childTnLst>
-                                </p:cTn>
-                              </p:par>
-                            </p:childTnLst>
-                          </p:cTn>
-                        </p:par>
-                      </p:childTnLst>
-                    </p:cTn>
-                  </p:par>
-                  <p:par>
-                    <p:cTn id="11" fill="hold">
-                      <p:stCondLst>
-                        <p:cond delay="indefinite"/>
-                      </p:stCondLst>
-                      <p:childTnLst>
-                        <p:par>
-                          <p:cTn id="12" fill="hold">
-                            <p:stCondLst>
-                              <p:cond delay="0"/>
-                            </p:stCondLst>
-                            <p:childTnLst>
-                              <p:par>
-                                <p:cTn id="13" presetID="1" presetClass="entr" presetSubtype="0" fill="hold" grpId="0" nodeType="clickEffect">
-                                  <p:stCondLst>
-                                    <p:cond delay="0"/>
-                                  </p:stCondLst>
-                                  <p:childTnLst>
-                                    <p:set>
-                                      <p:cBhvr>
-                                        <p:cTn id="14" dur="1" fill="hold">
-                                          <p:stCondLst>
-                                            <p:cond delay="0"/>
-                                          </p:stCondLst>
-                                        </p:cTn>
-                                        <p:tgtEl>
-                                          <p:spTgt spid="3">
-                                            <p:txEl>
-                                              <p:pRg st="3" end="3"/>
-                                            </p:txEl>
-                                          </p:spTgt>
-                                        </p:tgtEl>
-                                        <p:attrNameLst>
-                                          <p:attrName>style.visibility</p:attrName>
-                                        </p:attrNameLst>
-                                      </p:cBhvr>
-                                      <p:to>
-                                        <p:strVal val="visible"/>
-                                      </p:to>
-                                    </p:set>
-                                  </p:childTnLst>
-                                </p:cTn>
-                              </p:par>
-                              <p:par>
-                                <p:cTn id="15" presetID="1" presetClass="entr" presetSubtype="0" fill="hold" grpId="0" nodeType="withEffect">
-                                  <p:stCondLst>
-                                    <p:cond delay="0"/>
-                                  </p:stCondLst>
-                                  <p:childTnLst>
-                                    <p:set>
-                                      <p:cBhvr>
-                                        <p:cTn id="16" dur="1" fill="hold">
-                                          <p:stCondLst>
-                                            <p:cond delay="0"/>
-                                          </p:stCondLst>
-                                        </p:cTn>
-                                        <p:tgtEl>
-                                          <p:spTgt spid="3">
-                                            <p:txEl>
-                                              <p:pRg st="4" end="4"/>
-                                            </p:txEl>
-                                          </p:spTgt>
-                                        </p:tgtEl>
-                                        <p:attrNameLst>
-                                          <p:attrName>style.visibility</p:attrName>
-                                        </p:attrNameLst>
-                                      </p:cBhvr>
-                                      <p:to>
-                                        <p:strVal val="visible"/>
-                                      </p:to>
-                                    </p:set>
-                                  </p:childTnLst>
-                                </p:cTn>
-                              </p:par>
-                            </p:childTnLst>
-                          </p:cTn>
-                        </p:par>
-                      </p:childTnLst>
-                    </p:cTn>
-                  </p:par>
-                  <p:par>
-                    <p:cTn id="17" fill="hold">
-                      <p:stCondLst>
-                        <p:cond delay="indefinite"/>
-                      </p:stCondLst>
-                      <p:childTnLst>
-                        <p:par>
-                          <p:cTn id="18" fill="hold">
-                            <p:stCondLst>
-                              <p:cond delay="0"/>
-                            </p:stCondLst>
-                            <p:childTnLst>
-                              <p:par>
-                                <p:cTn id="19" presetID="1" presetClass="entr" presetSubtype="0" fill="hold" grpId="0" nodeType="clickEffect">
-                                  <p:stCondLst>
-                                    <p:cond delay="0"/>
-                                  </p:stCondLst>
-                                  <p:childTnLst>
-                                    <p:set>
-                                      <p:cBhvr>
-                                        <p:cTn id="20" dur="1" fill="hold">
-                                          <p:stCondLst>
-                                            <p:cond delay="0"/>
-                                          </p:stCondLst>
-                                        </p:cTn>
-                                        <p:tgtEl>
-                                          <p:spTgt spid="4"/>
-                                        </p:tgtEl>
-                                        <p:attrNameLst>
-                                          <p:attrName>style.visibility</p:attrName>
-                                        </p:attrNameLst>
-                                      </p:cBhvr>
-                                      <p:to>
-                                        <p:strVal val="visible"/>
-                                      </p:to>
-                                    </p:set>
-                                  </p:childTnLst>
-                                </p:cTn>
-                              </p:par>
-                            </p:childTnLst>
-                          </p:cTn>
-                        </p:par>
-                      </p:childTnLst>
-                    </p:cTn>
-                  </p:par>
-                </p:childTnLst>
-              </p:cTn>
-              <p:prevCondLst>
-                <p:cond evt="onPrev" delay="0">
-                  <p:tgtEl>
-                    <p:sldTgt/>
-                  </p:tgtEl>
-                </p:cond>
-              </p:prevCondLst>
-              <p:nextCondLst>
-                <p:cond evt="onNext" delay="0">
-                  <p:tgtEl>
-                    <p:sldTgt/>
-                  </p:tgtEl>
-                </p:cond>
-              </p:nextCondLst>
-            </p:seq>
-          </p:childTnLst>
-        </p:cTn>
-      </p:par>
-    </p:tnLst>
-    <p:bldLst>
-      <p:bldP spid="3" grpId="0" build="p"/>
-      <p:bldP spid="4" grpId="0" animBg="1"/>
-    </p:bldLst>
-  </p:timing>
-</p:sld>
-</file>
-
-<file path=ppt/slides/slide29.xml><?xml version="1.0" encoding="utf-8"?>
-<p:sld xmlns:a="http://schemas.openxmlformats.org/drawingml/2006/main" xmlns:r="http://schemas.openxmlformats.org/officeDocument/2006/relationships" xmlns:p="http://schemas.openxmlformats.org/presentationml/2006/main">
-  <p:cSld>
-    <p:spTree>
-      <p:nvGrpSpPr>
-        <p:cNvPr id="1" name=""/>
-        <p:cNvGrpSpPr/>
-        <p:nvPr/>
-      </p:nvGrpSpPr>
-      <p:grpSpPr>
-        <a:xfrm>
-          <a:off x="0" y="0"/>
-          <a:ext cx="0" cy="0"/>
-          <a:chOff x="0" y="0"/>
-          <a:chExt cx="0" cy="0"/>
-        </a:xfrm>
-      </p:grpSpPr>
-      <p:sp>
-        <p:nvSpPr>
-          <p:cNvPr id="2" name="Title 1"/>
-          <p:cNvSpPr>
-            <a:spLocks noGrp="1"/>
-          </p:cNvSpPr>
-          <p:nvPr>
-            <p:ph type="title"/>
-          </p:nvPr>
-        </p:nvSpPr>
-        <p:spPr/>
-        <p:txBody>
-          <a:bodyPr/>
-          <a:lstStyle/>
-          <a:p>
-            <a:r>
-              <a:rPr lang="en-US" dirty="0" smtClean="0"/>
               <a:t>During development</a:t>
             </a:r>
             <a:endParaRPr lang="nl-BE" dirty="0"/>
@@ -15030,8 +15331,21 @@
           <a:p>
             <a:r>
               <a:rPr lang="en-US" dirty="0" smtClean="0"/>
-              <a:t>Use version control</a:t>
-            </a:r>
+              <a:t>Use version </a:t>
+            </a:r>
+            <a:r>
+              <a:rPr lang="en-US" dirty="0" smtClean="0"/>
+              <a:t>control: subversion, </a:t>
+            </a:r>
+            <a:r>
+              <a:rPr lang="en-US" dirty="0" err="1" smtClean="0"/>
+              <a:t>git</a:t>
+            </a:r>
+            <a:r>
+              <a:rPr lang="en-US" dirty="0" smtClean="0"/>
+              <a:t>, …</a:t>
+            </a:r>
+            <a:endParaRPr lang="en-US" dirty="0" smtClean="0"/>
           </a:p>
           <a:p>
             <a:pPr lvl="1"/>
@@ -15104,6 +15418,9 @@
                     <p:cTn id="3" fill="hold">
                       <p:stCondLst>
                         <p:cond delay="indefinite"/>
+                        <p:cond evt="onBegin" delay="0">
+                          <p:tn val="2"/>
+                        </p:cond>
                       </p:stCondLst>
                       <p:childTnLst>
                         <p:par>
@@ -15113,7 +15430,7 @@
                             </p:stCondLst>
                             <p:childTnLst>
                               <p:par>
-                                <p:cTn id="5" presetID="1" presetClass="entr" presetSubtype="0" fill="hold" grpId="0" nodeType="clickEffect">
+                                <p:cTn id="5" presetID="1" presetClass="entr" presetSubtype="0" fill="hold" grpId="0" nodeType="withEffect">
                                   <p:stCondLst>
                                     <p:cond delay="0"/>
                                   </p:stCondLst>
@@ -15442,8 +15759,105 @@
       </p:par>
     </p:tnLst>
     <p:bldLst>
-      <p:bldP spid="3" grpId="0" build="p"/>
+      <p:bldP spid="3" grpId="0" uiExpand="1" build="p"/>
     </p:bldLst>
+  </p:timing>
+</p:sld>
+</file>
+
+<file path=ppt/slides/slide29.xml><?xml version="1.0" encoding="utf-8"?>
+<p:sld xmlns:a="http://schemas.openxmlformats.org/drawingml/2006/main" xmlns:r="http://schemas.openxmlformats.org/officeDocument/2006/relationships" xmlns:p="http://schemas.openxmlformats.org/presentationml/2006/main">
+  <p:cSld>
+    <p:spTree>
+      <p:nvGrpSpPr>
+        <p:cNvPr id="1" name=""/>
+        <p:cNvGrpSpPr/>
+        <p:nvPr/>
+      </p:nvGrpSpPr>
+      <p:grpSpPr>
+        <a:xfrm>
+          <a:off x="0" y="0"/>
+          <a:ext cx="0" cy="0"/>
+          <a:chOff x="0" y="0"/>
+          <a:chExt cx="0" cy="0"/>
+        </a:xfrm>
+      </p:grpSpPr>
+      <p:sp>
+        <p:nvSpPr>
+          <p:cNvPr id="2" name="TextBox 1"/>
+          <p:cNvSpPr txBox="1"/>
+          <p:nvPr/>
+        </p:nvSpPr>
+        <p:spPr>
+          <a:xfrm>
+            <a:off x="1922660" y="2435404"/>
+            <a:ext cx="5241628" cy="1569660"/>
+          </a:xfrm>
+          <a:prstGeom prst="rect">
+            <a:avLst/>
+          </a:prstGeom>
+          <a:noFill/>
+          <a:ln>
+            <a:solidFill>
+              <a:srgbClr val="C00000"/>
+            </a:solidFill>
+          </a:ln>
+          <a:effectLst>
+            <a:outerShdw blurRad="76200" dir="18900000" sy="23000" kx="-1200000" algn="bl" rotWithShape="0">
+              <a:prstClr val="black">
+                <a:alpha val="20000"/>
+              </a:prstClr>
+            </a:outerShdw>
+          </a:effectLst>
+        </p:spPr>
+        <p:txBody>
+          <a:bodyPr wrap="none" rtlCol="0">
+            <a:spAutoFit/>
+          </a:bodyPr>
+          <a:lstStyle/>
+          <a:p>
+            <a:r>
+              <a:rPr lang="en-US" sz="4800" dirty="0" smtClean="0">
+                <a:solidFill>
+                  <a:srgbClr val="C00000"/>
+                </a:solidFill>
+              </a:rPr>
+              <a:t>Harbor no illusions,</a:t>
+            </a:r>
+          </a:p>
+          <a:p>
+            <a:r>
+              <a:rPr lang="en-US" sz="4800" dirty="0" smtClean="0">
+                <a:solidFill>
+                  <a:srgbClr val="C00000"/>
+                </a:solidFill>
+              </a:rPr>
+              <a:t>code will have bugs!</a:t>
+            </a:r>
+            <a:endParaRPr lang="nl-BE" sz="4800" dirty="0">
+              <a:solidFill>
+                <a:srgbClr val="C00000"/>
+              </a:solidFill>
+            </a:endParaRPr>
+          </a:p>
+        </p:txBody>
+      </p:sp>
+    </p:spTree>
+    <p:extLst>
+      <p:ext uri="{BB962C8B-B14F-4D97-AF65-F5344CB8AC3E}">
+        <p14:creationId xmlns:p14="http://schemas.microsoft.com/office/powerpoint/2010/main" val="1450249562"/>
+      </p:ext>
+    </p:extLst>
+  </p:cSld>
+  <p:clrMapOvr>
+    <a:masterClrMapping/>
+  </p:clrMapOvr>
+  <p:timing>
+    <p:tnLst>
+      <p:par>
+        <p:cTn id="1" dur="indefinite" restart="never" nodeType="tmRoot"/>
+      </p:par>
+    </p:tnLst>
   </p:timing>
 </p:sld>
 </file>
@@ -16067,6 +16481,9 @@
                     <p:cTn id="3" fill="hold">
                       <p:stCondLst>
                         <p:cond delay="indefinite"/>
+                        <p:cond evt="onBegin" delay="0">
+                          <p:tn val="2"/>
+                        </p:cond>
                       </p:stCondLst>
                       <p:childTnLst>
                         <p:par>
@@ -16076,7 +16493,7 @@
                             </p:stCondLst>
                             <p:childTnLst>
                               <p:par>
-                                <p:cTn id="5" presetID="1" presetClass="entr" presetSubtype="0" fill="hold" grpId="0" nodeType="clickEffect">
+                                <p:cTn id="5" presetID="1" presetClass="entr" presetSubtype="0" fill="hold" grpId="0" nodeType="withEffect">
                                   <p:stCondLst>
                                     <p:cond delay="0"/>
                                   </p:stCondLst>
@@ -16525,7 +16942,7 @@
       </p:par>
     </p:tnLst>
     <p:bldLst>
-      <p:bldP spid="3" grpId="0" build="p"/>
+      <p:bldP spid="3" grpId="0" uiExpand="1" build="p"/>
       <p:bldP spid="4" grpId="0" animBg="1"/>
     </p:bldLst>
   </p:timing>
@@ -18196,6 +18613,9 @@
                     <p:cTn id="3" fill="hold">
                       <p:stCondLst>
                         <p:cond delay="indefinite"/>
+                        <p:cond evt="onBegin" delay="0">
+                          <p:tn val="2"/>
+                        </p:cond>
                       </p:stCondLst>
                       <p:childTnLst>
                         <p:par>
@@ -18205,7 +18625,7 @@
                             </p:stCondLst>
                             <p:childTnLst>
                               <p:par>
-                                <p:cTn id="5" presetID="1" presetClass="entr" presetSubtype="0" fill="hold" grpId="0" nodeType="clickEffect">
+                                <p:cTn id="5" presetID="1" presetClass="entr" presetSubtype="0" fill="hold" grpId="0" nodeType="withEffect">
                                   <p:stCondLst>
                                     <p:cond delay="0"/>
                                   </p:stCondLst>
@@ -23409,6 +23829,9 @@
                     <p:cTn id="3" fill="hold">
                       <p:stCondLst>
                         <p:cond delay="indefinite"/>
+                        <p:cond evt="onBegin" delay="0">
+                          <p:tn val="2"/>
+                        </p:cond>
                       </p:stCondLst>
                       <p:childTnLst>
                         <p:par>
@@ -23418,7 +23841,7 @@
                             </p:stCondLst>
                             <p:childTnLst>
                               <p:par>
-                                <p:cTn id="5" presetID="1" presetClass="entr" presetSubtype="0" fill="hold" grpId="0" nodeType="clickEffect">
+                                <p:cTn id="5" presetID="1" presetClass="entr" presetSubtype="0" fill="hold" grpId="0" nodeType="withEffect">
                                   <p:stCondLst>
                                     <p:cond delay="0"/>
                                   </p:stCondLst>
@@ -23853,7 +24276,7 @@
       </p:par>
     </p:tnLst>
     <p:bldLst>
-      <p:bldP spid="3" grpId="0" build="p"/>
+      <p:bldP spid="3" grpId="0" uiExpand="1" build="p"/>
     </p:bldLst>
   </p:timing>
 </p:sld>
@@ -27411,6 +27834,33 @@
                                   </p:childTnLst>
                                 </p:cTn>
                               </p:par>
+                              <p:par>
+                                <p:cTn id="7" presetID="1" presetClass="entr" presetSubtype="0" fill="hold" grpId="0" nodeType="withEffect">
+                                  <p:stCondLst>
+                                    <p:cond delay="0"/>
+                                  </p:stCondLst>
+                                  <p:childTnLst>
+                                    <p:set>
+                                      <p:cBhvr>
+                                        <p:cTn id="8" dur="1" fill="hold">
+                                          <p:stCondLst>
+                                            <p:cond delay="0"/>
+                                          </p:stCondLst>
+                                        </p:cTn>
+                                        <p:tgtEl>
+                                          <p:spTgt spid="4"/>
+                                        </p:tgtEl>
+                                        <p:attrNameLst>
+                                          <p:attrName>style.visibility</p:attrName>
+                                        </p:attrNameLst>
+                                      </p:cBhvr>
+                                      <p:to>
+                                        <p:strVal val="visible"/>
+                                      </p:to>
+                                    </p:set>
+                                  </p:childTnLst>
+                                </p:cTn>
+                              </p:par>
                             </p:childTnLst>
                           </p:cTn>
                         </p:par>
@@ -27418,26 +27868,26 @@
                     </p:cTn>
                   </p:par>
                   <p:par>
-                    <p:cTn id="7" fill="hold">
+                    <p:cTn id="9" fill="hold">
                       <p:stCondLst>
                         <p:cond delay="indefinite"/>
                       </p:stCondLst>
                       <p:childTnLst>
                         <p:par>
-                          <p:cTn id="8" fill="hold">
+                          <p:cTn id="10" fill="hold">
                             <p:stCondLst>
                               <p:cond delay="0"/>
                             </p:stCondLst>
                             <p:childTnLst>
                               <p:par>
-                                <p:cTn id="9" presetID="1" presetClass="entr" presetSubtype="0" fill="hold" grpId="0" nodeType="clickEffect">
+                                <p:cTn id="11" presetID="1" presetClass="entr" presetSubtype="0" fill="hold" grpId="0" nodeType="clickEffect">
                                   <p:stCondLst>
                                     <p:cond delay="0"/>
                                   </p:stCondLst>
                                   <p:childTnLst>
                                     <p:set>
                                       <p:cBhvr>
-                                        <p:cTn id="10" dur="1" fill="hold">
+                                        <p:cTn id="12" dur="1" fill="hold">
                                           <p:stCondLst>
                                             <p:cond delay="0"/>
                                           </p:stCondLst>
@@ -27461,14 +27911,14 @@
                                 </p:cTn>
                               </p:par>
                               <p:par>
-                                <p:cTn id="11" presetID="1" presetClass="entr" presetSubtype="0" fill="hold" grpId="0" nodeType="withEffect">
+                                <p:cTn id="13" presetID="1" presetClass="entr" presetSubtype="0" fill="hold" grpId="0" nodeType="withEffect">
                                   <p:stCondLst>
                                     <p:cond delay="0"/>
                                   </p:stCondLst>
                                   <p:childTnLst>
                                     <p:set>
                                       <p:cBhvr>
-                                        <p:cTn id="12" dur="1" fill="hold">
+                                        <p:cTn id="14" dur="1" fill="hold">
                                           <p:stCondLst>
                                             <p:cond delay="0"/>
                                           </p:stCondLst>
@@ -27492,14 +27942,14 @@
                                 </p:cTn>
                               </p:par>
                               <p:par>
-                                <p:cTn id="13" presetID="1" presetClass="entr" presetSubtype="0" fill="hold" grpId="0" nodeType="withEffect">
+                                <p:cTn id="15" presetID="1" presetClass="entr" presetSubtype="0" fill="hold" grpId="0" nodeType="withEffect">
                                   <p:stCondLst>
                                     <p:cond delay="0"/>
                                   </p:stCondLst>
                                   <p:childTnLst>
                                     <p:set>
                                       <p:cBhvr>
-                                        <p:cTn id="14" dur="1" fill="hold">
+                                        <p:cTn id="16" dur="1" fill="hold">
                                           <p:stCondLst>
                                             <p:cond delay="0"/>
                                           </p:stCondLst>
@@ -27551,6 +28001,7 @@
     </p:tnLst>
     <p:bldLst>
       <p:bldP spid="3" grpId="0" uiExpand="1" build="p"/>
+      <p:bldP spid="4" grpId="0" animBg="1"/>
     </p:bldLst>
   </p:timing>
 </p:sld>
@@ -30194,9 +30645,229 @@
   <p:timing>
     <p:tnLst>
       <p:par>
-        <p:cTn id="1" dur="indefinite" restart="never" nodeType="tmRoot"/>
+        <p:cTn id="1" dur="indefinite" restart="never" nodeType="tmRoot">
+          <p:childTnLst>
+            <p:seq concurrent="1" nextAc="seek">
+              <p:cTn id="2" dur="indefinite" nodeType="mainSeq">
+                <p:childTnLst>
+                  <p:par>
+                    <p:cTn id="3" fill="hold">
+                      <p:stCondLst>
+                        <p:cond delay="indefinite"/>
+                        <p:cond evt="onBegin" delay="0">
+                          <p:tn val="2"/>
+                        </p:cond>
+                      </p:stCondLst>
+                      <p:childTnLst>
+                        <p:par>
+                          <p:cTn id="4" fill="hold">
+                            <p:stCondLst>
+                              <p:cond delay="0"/>
+                            </p:stCondLst>
+                            <p:childTnLst>
+                              <p:par>
+                                <p:cTn id="5" presetID="1" presetClass="entr" presetSubtype="0" fill="hold" grpId="0" nodeType="withEffect">
+                                  <p:stCondLst>
+                                    <p:cond delay="0"/>
+                                  </p:stCondLst>
+                                  <p:childTnLst>
+                                    <p:set>
+                                      <p:cBhvr>
+                                        <p:cTn id="6" dur="1" fill="hold">
+                                          <p:stCondLst>
+                                            <p:cond delay="0"/>
+                                          </p:stCondLst>
+                                        </p:cTn>
+                                        <p:tgtEl>
+                                          <p:spTgt spid="3">
+                                            <p:txEl>
+                                              <p:pRg st="0" end="0"/>
+                                            </p:txEl>
+                                          </p:spTgt>
+                                        </p:tgtEl>
+                                        <p:attrNameLst>
+                                          <p:attrName>style.visibility</p:attrName>
+                                        </p:attrNameLst>
+                                      </p:cBhvr>
+                                      <p:to>
+                                        <p:strVal val="visible"/>
+                                      </p:to>
+                                    </p:set>
+                                  </p:childTnLst>
+                                </p:cTn>
+                              </p:par>
+                              <p:par>
+                                <p:cTn id="7" presetID="1" presetClass="entr" presetSubtype="0" fill="hold" grpId="0" nodeType="withEffect">
+                                  <p:stCondLst>
+                                    <p:cond delay="0"/>
+                                  </p:stCondLst>
+                                  <p:childTnLst>
+                                    <p:set>
+                                      <p:cBhvr>
+                                        <p:cTn id="8" dur="1" fill="hold">
+                                          <p:stCondLst>
+                                            <p:cond delay="0"/>
+                                          </p:stCondLst>
+                                        </p:cTn>
+                                        <p:tgtEl>
+                                          <p:spTgt spid="3">
+                                            <p:txEl>
+                                              <p:pRg st="1" end="1"/>
+                                            </p:txEl>
+                                          </p:spTgt>
+                                        </p:tgtEl>
+                                        <p:attrNameLst>
+                                          <p:attrName>style.visibility</p:attrName>
+                                        </p:attrNameLst>
+                                      </p:cBhvr>
+                                      <p:to>
+                                        <p:strVal val="visible"/>
+                                      </p:to>
+                                    </p:set>
+                                  </p:childTnLst>
+                                </p:cTn>
+                              </p:par>
+                            </p:childTnLst>
+                          </p:cTn>
+                        </p:par>
+                      </p:childTnLst>
+                    </p:cTn>
+                  </p:par>
+                  <p:par>
+                    <p:cTn id="9" fill="hold">
+                      <p:stCondLst>
+                        <p:cond delay="indefinite"/>
+                      </p:stCondLst>
+                      <p:childTnLst>
+                        <p:par>
+                          <p:cTn id="10" fill="hold">
+                            <p:stCondLst>
+                              <p:cond delay="0"/>
+                            </p:stCondLst>
+                            <p:childTnLst>
+                              <p:par>
+                                <p:cTn id="11" presetID="1" presetClass="entr" presetSubtype="0" fill="hold" grpId="0" nodeType="clickEffect">
+                                  <p:stCondLst>
+                                    <p:cond delay="0"/>
+                                  </p:stCondLst>
+                                  <p:childTnLst>
+                                    <p:set>
+                                      <p:cBhvr>
+                                        <p:cTn id="12" dur="1" fill="hold">
+                                          <p:stCondLst>
+                                            <p:cond delay="0"/>
+                                          </p:stCondLst>
+                                        </p:cTn>
+                                        <p:tgtEl>
+                                          <p:spTgt spid="3">
+                                            <p:txEl>
+                                              <p:pRg st="2" end="2"/>
+                                            </p:txEl>
+                                          </p:spTgt>
+                                        </p:tgtEl>
+                                        <p:attrNameLst>
+                                          <p:attrName>style.visibility</p:attrName>
+                                        </p:attrNameLst>
+                                      </p:cBhvr>
+                                      <p:to>
+                                        <p:strVal val="visible"/>
+                                      </p:to>
+                                    </p:set>
+                                  </p:childTnLst>
+                                </p:cTn>
+                              </p:par>
+                              <p:par>
+                                <p:cTn id="13" presetID="1" presetClass="entr" presetSubtype="0" fill="hold" grpId="0" nodeType="withEffect">
+                                  <p:stCondLst>
+                                    <p:cond delay="0"/>
+                                  </p:stCondLst>
+                                  <p:childTnLst>
+                                    <p:set>
+                                      <p:cBhvr>
+                                        <p:cTn id="14" dur="1" fill="hold">
+                                          <p:stCondLst>
+                                            <p:cond delay="0"/>
+                                          </p:stCondLst>
+                                        </p:cTn>
+                                        <p:tgtEl>
+                                          <p:spTgt spid="3">
+                                            <p:txEl>
+                                              <p:pRg st="3" end="3"/>
+                                            </p:txEl>
+                                          </p:spTgt>
+                                        </p:tgtEl>
+                                        <p:attrNameLst>
+                                          <p:attrName>style.visibility</p:attrName>
+                                        </p:attrNameLst>
+                                      </p:cBhvr>
+                                      <p:to>
+                                        <p:strVal val="visible"/>
+                                      </p:to>
+                                    </p:set>
+                                  </p:childTnLst>
+                                </p:cTn>
+                              </p:par>
+                              <p:par>
+                                <p:cTn id="15" presetID="1" presetClass="entr" presetSubtype="0" fill="hold" grpId="0" nodeType="withEffect">
+                                  <p:stCondLst>
+                                    <p:cond delay="0"/>
+                                  </p:stCondLst>
+                                  <p:childTnLst>
+                                    <p:set>
+                                      <p:cBhvr>
+                                        <p:cTn id="16" dur="1" fill="hold">
+                                          <p:stCondLst>
+                                            <p:cond delay="0"/>
+                                          </p:stCondLst>
+                                        </p:cTn>
+                                        <p:tgtEl>
+                                          <p:spTgt spid="3">
+                                            <p:txEl>
+                                              <p:pRg st="4" end="4"/>
+                                            </p:txEl>
+                                          </p:spTgt>
+                                        </p:tgtEl>
+                                        <p:attrNameLst>
+                                          <p:attrName>style.visibility</p:attrName>
+                                        </p:attrNameLst>
+                                      </p:cBhvr>
+                                      <p:to>
+                                        <p:strVal val="visible"/>
+                                      </p:to>
+                                    </p:set>
+                                  </p:childTnLst>
+                                </p:cTn>
+                              </p:par>
+                            </p:childTnLst>
+                          </p:cTn>
+                        </p:par>
+                      </p:childTnLst>
+                    </p:cTn>
+                  </p:par>
+                </p:childTnLst>
+              </p:cTn>
+              <p:prevCondLst>
+                <p:cond evt="onPrev" delay="0">
+                  <p:tgtEl>
+                    <p:sldTgt/>
+                  </p:tgtEl>
+                </p:cond>
+              </p:prevCondLst>
+              <p:nextCondLst>
+                <p:cond evt="onNext" delay="0">
+                  <p:tgtEl>
+                    <p:sldTgt/>
+                  </p:tgtEl>
+                </p:cond>
+              </p:nextCondLst>
+            </p:seq>
+          </p:childTnLst>
+        </p:cTn>
       </p:par>
     </p:tnLst>
+    <p:bldLst>
+      <p:bldP spid="3" grpId="0" uiExpand="1" build="p"/>
+    </p:bldLst>
   </p:timing>
 </p:sld>
 </file>
@@ -31818,8 +32489,8 @@
         </p:nvSpPr>
         <p:spPr>
           <a:xfrm>
-            <a:off x="2191379" y="5589240"/>
-            <a:ext cx="4396845" cy="461665"/>
+            <a:off x="3347864" y="5703639"/>
+            <a:ext cx="2383025" cy="461665"/>
           </a:xfrm>
           <a:prstGeom prst="rect">
             <a:avLst/>
@@ -31838,8 +32509,16 @@
           <a:lstStyle/>
           <a:p>
             <a:r>
+              <a:rPr lang="en-US" sz="2400" dirty="0"/>
+              <a:t>U</a:t>
+            </a:r>
+            <a:r>
               <a:rPr lang="en-US" sz="2400" dirty="0" smtClean="0"/>
-              <a:t>Not mature yet, use with caution!</a:t>
+              <a:t>se </a:t>
+            </a:r>
+            <a:r>
+              <a:rPr lang="en-US" sz="2400" dirty="0" smtClean="0"/>
+              <a:t>with caution!</a:t>
             </a:r>
             <a:endParaRPr lang="en-US" sz="2400" dirty="0"/>
           </a:p>
@@ -34231,18 +34910,32 @@
                 <a:t>    double *a = (double *) </a:t>
               </a:r>
               <a:r>
+                <a:rPr lang="en-US" sz="1600" dirty="0" err="1">
+                  <a:latin typeface="Courier New" pitchFamily="49" charset="0"/>
+                  <a:cs typeface="Courier New" pitchFamily="49" charset="0"/>
+                </a:rPr>
+                <a:t>m</a:t>
+              </a:r>
+              <a:r>
                 <a:rPr lang="en-US" sz="1600" dirty="0" err="1" smtClean="0">
                   <a:latin typeface="Courier New" pitchFamily="49" charset="0"/>
                   <a:cs typeface="Courier New" pitchFamily="49" charset="0"/>
                 </a:rPr>
-                <a:t>calloc</a:t>
+                <a:t>alloc</a:t>
               </a:r>
               <a:r>
                 <a:rPr lang="en-US" sz="1600" dirty="0" smtClean="0">
                   <a:latin typeface="Courier New" pitchFamily="49" charset="0"/>
                   <a:cs typeface="Courier New" pitchFamily="49" charset="0"/>
                 </a:rPr>
-                <a:t>(n, </a:t>
+                <a:t>(n</a:t>
+              </a:r>
+              <a:r>
+                <a:rPr lang="en-US" sz="1600" dirty="0" smtClean="0">
+                  <a:latin typeface="Courier New" pitchFamily="49" charset="0"/>
+                  <a:cs typeface="Courier New" pitchFamily="49" charset="0"/>
+                </a:rPr>
+                <a:t>, </a:t>
               </a:r>
               <a:r>
                 <a:rPr lang="en-US" sz="1600" dirty="0" err="1" smtClean="0">
@@ -34655,7 +35348,120 @@
   <p:timing>
     <p:tnLst>
       <p:par>
-        <p:cTn id="1" dur="indefinite" restart="never" nodeType="tmRoot"/>
+        <p:cTn id="1" dur="indefinite" restart="never" nodeType="tmRoot">
+          <p:childTnLst>
+            <p:seq concurrent="1" nextAc="seek">
+              <p:cTn id="2" dur="indefinite" nodeType="mainSeq">
+                <p:childTnLst>
+                  <p:par>
+                    <p:cTn id="3" fill="hold">
+                      <p:stCondLst>
+                        <p:cond delay="indefinite"/>
+                      </p:stCondLst>
+                      <p:childTnLst>
+                        <p:par>
+                          <p:cTn id="4" fill="hold">
+                            <p:stCondLst>
+                              <p:cond delay="0"/>
+                            </p:stCondLst>
+                            <p:childTnLst>
+                              <p:par>
+                                <p:cTn id="5" presetID="1" presetClass="entr" presetSubtype="0" fill="hold" nodeType="clickEffect">
+                                  <p:stCondLst>
+                                    <p:cond delay="0"/>
+                                  </p:stCondLst>
+                                  <p:childTnLst>
+                                    <p:set>
+                                      <p:cBhvr>
+                                        <p:cTn id="6" dur="1" fill="hold">
+                                          <p:stCondLst>
+                                            <p:cond delay="0"/>
+                                          </p:stCondLst>
+                                        </p:cTn>
+                                        <p:tgtEl>
+                                          <p:spTgt spid="8"/>
+                                        </p:tgtEl>
+                                        <p:attrNameLst>
+                                          <p:attrName>style.visibility</p:attrName>
+                                        </p:attrNameLst>
+                                      </p:cBhvr>
+                                      <p:to>
+                                        <p:strVal val="visible"/>
+                                      </p:to>
+                                    </p:set>
+                                  </p:childTnLst>
+                                </p:cTn>
+                              </p:par>
+                            </p:childTnLst>
+                          </p:cTn>
+                        </p:par>
+                      </p:childTnLst>
+                    </p:cTn>
+                  </p:par>
+                  <p:par>
+                    <p:cTn id="7" fill="hold">
+                      <p:stCondLst>
+                        <p:cond delay="indefinite"/>
+                      </p:stCondLst>
+                      <p:childTnLst>
+                        <p:par>
+                          <p:cTn id="8" fill="hold">
+                            <p:stCondLst>
+                              <p:cond delay="0"/>
+                            </p:stCondLst>
+                            <p:childTnLst>
+                              <p:par>
+                                <p:cTn id="9" presetID="1" presetClass="entr" presetSubtype="0" fill="hold" nodeType="clickEffect">
+                                  <p:stCondLst>
+                                    <p:cond delay="0"/>
+                                  </p:stCondLst>
+                                  <p:childTnLst>
+                                    <p:set>
+                                      <p:cBhvr>
+                                        <p:cTn id="10" dur="1" fill="hold">
+                                          <p:stCondLst>
+                                            <p:cond delay="0"/>
+                                          </p:stCondLst>
+                                        </p:cTn>
+                                        <p:tgtEl>
+                                          <p:spTgt spid="12"/>
+                                        </p:tgtEl>
+                                        <p:attrNameLst>
+                                          <p:attrName>style.visibility</p:attrName>
+                                        </p:attrNameLst>
+                                      </p:cBhvr>
+                                      <p:to>
+                                        <p:strVal val="visible"/>
+                                      </p:to>
+                                    </p:set>
+                                  </p:childTnLst>
+                                </p:cTn>
+                              </p:par>
+                            </p:childTnLst>
+                          </p:cTn>
+                        </p:par>
+                      </p:childTnLst>
+                    </p:cTn>
+                  </p:par>
+                </p:childTnLst>
+              </p:cTn>
+              <p:prevCondLst>
+                <p:cond evt="onPrev" delay="0">
+                  <p:tgtEl>
+                    <p:sldTgt/>
+                  </p:tgtEl>
+                </p:cond>
+              </p:prevCondLst>
+              <p:nextCondLst>
+                <p:cond evt="onNext" delay="0">
+                  <p:tgtEl>
+                    <p:sldTgt/>
+                  </p:tgtEl>
+                </p:cond>
+              </p:nextCondLst>
+            </p:seq>
+          </p:childTnLst>
+        </p:cTn>
       </p:par>
     </p:tnLst>
   </p:timing>
@@ -34900,9 +35706,192 @@
   <p:timing>
     <p:tnLst>
       <p:par>
-        <p:cTn id="1" dur="indefinite" restart="never" nodeType="tmRoot"/>
+        <p:cTn id="1" dur="indefinite" restart="never" nodeType="tmRoot">
+          <p:childTnLst>
+            <p:seq concurrent="1" nextAc="seek">
+              <p:cTn id="2" dur="indefinite" nodeType="mainSeq">
+                <p:childTnLst>
+                  <p:par>
+                    <p:cTn id="3" fill="hold">
+                      <p:stCondLst>
+                        <p:cond delay="indefinite"/>
+                        <p:cond evt="onBegin" delay="0">
+                          <p:tn val="2"/>
+                        </p:cond>
+                      </p:stCondLst>
+                      <p:childTnLst>
+                        <p:par>
+                          <p:cTn id="4" fill="hold">
+                            <p:stCondLst>
+                              <p:cond delay="0"/>
+                            </p:stCondLst>
+                            <p:childTnLst>
+                              <p:par>
+                                <p:cTn id="5" presetID="1" presetClass="entr" presetSubtype="0" fill="hold" grpId="0" nodeType="withEffect">
+                                  <p:stCondLst>
+                                    <p:cond delay="0"/>
+                                  </p:stCondLst>
+                                  <p:childTnLst>
+                                    <p:set>
+                                      <p:cBhvr>
+                                        <p:cTn id="6" dur="1" fill="hold">
+                                          <p:stCondLst>
+                                            <p:cond delay="0"/>
+                                          </p:stCondLst>
+                                        </p:cTn>
+                                        <p:tgtEl>
+                                          <p:spTgt spid="3">
+                                            <p:txEl>
+                                              <p:pRg st="0" end="0"/>
+                                            </p:txEl>
+                                          </p:spTgt>
+                                        </p:tgtEl>
+                                        <p:attrNameLst>
+                                          <p:attrName>style.visibility</p:attrName>
+                                        </p:attrNameLst>
+                                      </p:cBhvr>
+                                      <p:to>
+                                        <p:strVal val="visible"/>
+                                      </p:to>
+                                    </p:set>
+                                  </p:childTnLst>
+                                </p:cTn>
+                              </p:par>
+                              <p:par>
+                                <p:cTn id="7" presetID="1" presetClass="entr" presetSubtype="0" fill="hold" grpId="0" nodeType="withEffect">
+                                  <p:stCondLst>
+                                    <p:cond delay="0"/>
+                                  </p:stCondLst>
+                                  <p:childTnLst>
+                                    <p:set>
+                                      <p:cBhvr>
+                                        <p:cTn id="8" dur="1" fill="hold">
+                                          <p:stCondLst>
+                                            <p:cond delay="0"/>
+                                          </p:stCondLst>
+                                        </p:cTn>
+                                        <p:tgtEl>
+                                          <p:spTgt spid="4"/>
+                                        </p:tgtEl>
+                                        <p:attrNameLst>
+                                          <p:attrName>style.visibility</p:attrName>
+                                        </p:attrNameLst>
+                                      </p:cBhvr>
+                                      <p:to>
+                                        <p:strVal val="visible"/>
+                                      </p:to>
+                                    </p:set>
+                                  </p:childTnLst>
+                                </p:cTn>
+                              </p:par>
+                            </p:childTnLst>
+                          </p:cTn>
+                        </p:par>
+                      </p:childTnLst>
+                    </p:cTn>
+                  </p:par>
+                  <p:par>
+                    <p:cTn id="9" fill="hold">
+                      <p:stCondLst>
+                        <p:cond delay="indefinite"/>
+                      </p:stCondLst>
+                      <p:childTnLst>
+                        <p:par>
+                          <p:cTn id="10" fill="hold">
+                            <p:stCondLst>
+                              <p:cond delay="0"/>
+                            </p:stCondLst>
+                            <p:childTnLst>
+                              <p:par>
+                                <p:cTn id="11" presetID="1" presetClass="entr" presetSubtype="0" fill="hold" grpId="0" nodeType="clickEffect">
+                                  <p:stCondLst>
+                                    <p:cond delay="0"/>
+                                  </p:stCondLst>
+                                  <p:childTnLst>
+                                    <p:set>
+                                      <p:cBhvr>
+                                        <p:cTn id="12" dur="1" fill="hold">
+                                          <p:stCondLst>
+                                            <p:cond delay="0"/>
+                                          </p:stCondLst>
+                                        </p:cTn>
+                                        <p:tgtEl>
+                                          <p:spTgt spid="3">
+                                            <p:txEl>
+                                              <p:pRg st="2" end="2"/>
+                                            </p:txEl>
+                                          </p:spTgt>
+                                        </p:tgtEl>
+                                        <p:attrNameLst>
+                                          <p:attrName>style.visibility</p:attrName>
+                                        </p:attrNameLst>
+                                      </p:cBhvr>
+                                      <p:to>
+                                        <p:strVal val="visible"/>
+                                      </p:to>
+                                    </p:set>
+                                  </p:childTnLst>
+                                </p:cTn>
+                              </p:par>
+                              <p:par>
+                                <p:cTn id="13" presetID="1" presetClass="entr" presetSubtype="0" fill="hold" grpId="0" nodeType="withEffect">
+                                  <p:stCondLst>
+                                    <p:cond delay="0"/>
+                                  </p:stCondLst>
+                                  <p:childTnLst>
+                                    <p:set>
+                                      <p:cBhvr>
+                                        <p:cTn id="14" dur="1" fill="hold">
+                                          <p:stCondLst>
+                                            <p:cond delay="0"/>
+                                          </p:stCondLst>
+                                        </p:cTn>
+                                        <p:tgtEl>
+                                          <p:spTgt spid="5"/>
+                                        </p:tgtEl>
+                                        <p:attrNameLst>
+                                          <p:attrName>style.visibility</p:attrName>
+                                        </p:attrNameLst>
+                                      </p:cBhvr>
+                                      <p:to>
+                                        <p:strVal val="visible"/>
+                                      </p:to>
+                                    </p:set>
+                                  </p:childTnLst>
+                                </p:cTn>
+                              </p:par>
+                            </p:childTnLst>
+                          </p:cTn>
+                        </p:par>
+                      </p:childTnLst>
+                    </p:cTn>
+                  </p:par>
+                </p:childTnLst>
+              </p:cTn>
+              <p:prevCondLst>
+                <p:cond evt="onPrev" delay="0">
+                  <p:tgtEl>
+                    <p:sldTgt/>
+                  </p:tgtEl>
+                </p:cond>
+              </p:prevCondLst>
+              <p:nextCondLst>
+                <p:cond evt="onNext" delay="0">
+                  <p:tgtEl>
+                    <p:sldTgt/>
+                  </p:tgtEl>
+                </p:cond>
+              </p:nextCondLst>
+            </p:seq>
+          </p:childTnLst>
+        </p:cTn>
       </p:par>
     </p:tnLst>
+    <p:bldLst>
+      <p:bldP spid="3" grpId="0" uiExpand="1" build="p"/>
+      <p:bldP spid="4" grpId="0" animBg="1"/>
+      <p:bldP spid="5" grpId="0" animBg="1"/>
+    </p:bldLst>
   </p:timing>
 </p:sld>
 </file>
@@ -35569,18 +36558,32 @@
                 <a:t>    double *a = (double *) </a:t>
               </a:r>
               <a:r>
+                <a:rPr lang="en-US" sz="1600" dirty="0" err="1">
+                  <a:latin typeface="Courier New" pitchFamily="49" charset="0"/>
+                  <a:cs typeface="Courier New" pitchFamily="49" charset="0"/>
+                </a:rPr>
+                <a:t>m</a:t>
+              </a:r>
+              <a:r>
                 <a:rPr lang="en-US" sz="1600" dirty="0" err="1" smtClean="0">
                   <a:latin typeface="Courier New" pitchFamily="49" charset="0"/>
                   <a:cs typeface="Courier New" pitchFamily="49" charset="0"/>
                 </a:rPr>
-                <a:t>calloc</a:t>
+                <a:t>alloc</a:t>
               </a:r>
               <a:r>
                 <a:rPr lang="en-US" sz="1600" dirty="0" smtClean="0">
                   <a:latin typeface="Courier New" pitchFamily="49" charset="0"/>
                   <a:cs typeface="Courier New" pitchFamily="49" charset="0"/>
                 </a:rPr>
-                <a:t>(n, </a:t>
+                <a:t>(n</a:t>
+              </a:r>
+              <a:r>
+                <a:rPr lang="en-US" sz="1600" dirty="0" smtClean="0">
+                  <a:latin typeface="Courier New" pitchFamily="49" charset="0"/>
+                  <a:cs typeface="Courier New" pitchFamily="49" charset="0"/>
+                </a:rPr>
+                <a:t>, </a:t>
               </a:r>
               <a:r>
                 <a:rPr lang="en-US" sz="1600" dirty="0" err="1" smtClean="0">
@@ -35998,7 +37001,120 @@
   <p:timing>
     <p:tnLst>
       <p:par>
-        <p:cTn id="1" dur="indefinite" restart="never" nodeType="tmRoot"/>
+        <p:cTn id="1" dur="indefinite" restart="never" nodeType="tmRoot">
+          <p:childTnLst>
+            <p:seq concurrent="1" nextAc="seek">
+              <p:cTn id="2" dur="indefinite" nodeType="mainSeq">
+                <p:childTnLst>
+                  <p:par>
+                    <p:cTn id="3" fill="hold">
+                      <p:stCondLst>
+                        <p:cond delay="indefinite"/>
+                      </p:stCondLst>
+                      <p:childTnLst>
+                        <p:par>
+                          <p:cTn id="4" fill="hold">
+                            <p:stCondLst>
+                              <p:cond delay="0"/>
+                            </p:stCondLst>
+                            <p:childTnLst>
+                              <p:par>
+                                <p:cTn id="5" presetID="1" presetClass="entr" presetSubtype="0" fill="hold" nodeType="clickEffect">
+                                  <p:stCondLst>
+                                    <p:cond delay="0"/>
+                                  </p:stCondLst>
+                                  <p:childTnLst>
+                                    <p:set>
+                                      <p:cBhvr>
+                                        <p:cTn id="6" dur="1" fill="hold">
+                                          <p:stCondLst>
+                                            <p:cond delay="0"/>
+                                          </p:stCondLst>
+                                        </p:cTn>
+                                        <p:tgtEl>
+                                          <p:spTgt spid="4"/>
+                                        </p:tgtEl>
+                                        <p:attrNameLst>
+                                          <p:attrName>style.visibility</p:attrName>
+                                        </p:attrNameLst>
+                                      </p:cBhvr>
+                                      <p:to>
+                                        <p:strVal val="visible"/>
+                                      </p:to>
+                                    </p:set>
+                                  </p:childTnLst>
+                                </p:cTn>
+                              </p:par>
+                            </p:childTnLst>
+                          </p:cTn>
+                        </p:par>
+                      </p:childTnLst>
+                    </p:cTn>
+                  </p:par>
+                  <p:par>
+                    <p:cTn id="7" fill="hold">
+                      <p:stCondLst>
+                        <p:cond delay="indefinite"/>
+                      </p:stCondLst>
+                      <p:childTnLst>
+                        <p:par>
+                          <p:cTn id="8" fill="hold">
+                            <p:stCondLst>
+                              <p:cond delay="0"/>
+                            </p:stCondLst>
+                            <p:childTnLst>
+                              <p:par>
+                                <p:cTn id="9" presetID="1" presetClass="entr" presetSubtype="0" fill="hold" nodeType="clickEffect">
+                                  <p:stCondLst>
+                                    <p:cond delay="0"/>
+                                  </p:stCondLst>
+                                  <p:childTnLst>
+                                    <p:set>
+                                      <p:cBhvr>
+                                        <p:cTn id="10" dur="1" fill="hold">
+                                          <p:stCondLst>
+                                            <p:cond delay="0"/>
+                                          </p:stCondLst>
+                                        </p:cTn>
+                                        <p:tgtEl>
+                                          <p:spTgt spid="5"/>
+                                        </p:tgtEl>
+                                        <p:attrNameLst>
+                                          <p:attrName>style.visibility</p:attrName>
+                                        </p:attrNameLst>
+                                      </p:cBhvr>
+                                      <p:to>
+                                        <p:strVal val="visible"/>
+                                      </p:to>
+                                    </p:set>
+                                  </p:childTnLst>
+                                </p:cTn>
+                              </p:par>
+                            </p:childTnLst>
+                          </p:cTn>
+                        </p:par>
+                      </p:childTnLst>
+                    </p:cTn>
+                  </p:par>
+                </p:childTnLst>
+              </p:cTn>
+              <p:prevCondLst>
+                <p:cond evt="onPrev" delay="0">
+                  <p:tgtEl>
+                    <p:sldTgt/>
+                  </p:tgtEl>
+                </p:cond>
+              </p:prevCondLst>
+              <p:nextCondLst>
+                <p:cond evt="onNext" delay="0">
+                  <p:tgtEl>
+                    <p:sldTgt/>
+                  </p:tgtEl>
+                </p:cond>
+              </p:nextCondLst>
+            </p:seq>
+          </p:childTnLst>
+        </p:cTn>
       </p:par>
     </p:tnLst>
   </p:timing>
@@ -36947,7 +38063,75 @@
   <p:timing>
     <p:tnLst>
       <p:par>
-        <p:cTn id="1" dur="indefinite" restart="never" nodeType="tmRoot"/>
+        <p:cTn id="1" dur="indefinite" restart="never" nodeType="tmRoot">
+          <p:childTnLst>
+            <p:seq concurrent="1" nextAc="seek">
+              <p:cTn id="2" dur="indefinite" nodeType="mainSeq">
+                <p:childTnLst>
+                  <p:par>
+                    <p:cTn id="3" fill="hold">
+                      <p:stCondLst>
+                        <p:cond delay="indefinite"/>
+                      </p:stCondLst>
+                      <p:childTnLst>
+                        <p:par>
+                          <p:cTn id="4" fill="hold">
+                            <p:stCondLst>
+                              <p:cond delay="0"/>
+                            </p:stCondLst>
+                            <p:childTnLst>
+                              <p:par>
+                                <p:cTn id="5" presetID="1" presetClass="entr" presetSubtype="0" fill="hold" nodeType="clickEffect">
+                                  <p:stCondLst>
+                                    <p:cond delay="0"/>
+                                  </p:stCondLst>
+                                  <p:childTnLst>
+                                    <p:set>
+                                      <p:cBhvr>
+                                        <p:cTn id="6" dur="1" fill="hold">
+                                          <p:stCondLst>
+                                            <p:cond delay="0"/>
+                                          </p:stCondLst>
+                                        </p:cTn>
+                                        <p:tgtEl>
+                                          <p:spTgt spid="9"/>
+                                        </p:tgtEl>
+                                        <p:attrNameLst>
+                                          <p:attrName>style.visibility</p:attrName>
+                                        </p:attrNameLst>
+                                      </p:cBhvr>
+                                      <p:to>
+                                        <p:strVal val="visible"/>
+                                      </p:to>
+                                    </p:set>
+                                  </p:childTnLst>
+                                </p:cTn>
+                              </p:par>
+                            </p:childTnLst>
+                          </p:cTn>
+                        </p:par>
+                      </p:childTnLst>
+                    </p:cTn>
+                  </p:par>
+                </p:childTnLst>
+              </p:cTn>
+              <p:prevCondLst>
+                <p:cond evt="onPrev" delay="0">
+                  <p:tgtEl>
+                    <p:sldTgt/>
+                  </p:tgtEl>
+                </p:cond>
+              </p:prevCondLst>
+              <p:nextCondLst>
+                <p:cond evt="onNext" delay="0">
+                  <p:tgtEl>
+                    <p:sldTgt/>
+                  </p:tgtEl>
+                </p:cond>
+              </p:nextCondLst>
+            </p:seq>
+          </p:childTnLst>
+        </p:cTn>
       </p:par>
     </p:tnLst>
   </p:timing>
@@ -39673,8 +40857,8 @@
         </p:nvSpPr>
         <p:spPr>
           <a:xfrm>
-            <a:off x="2159200" y="5805264"/>
-            <a:ext cx="5005088" cy="523220"/>
+            <a:off x="1403648" y="5805264"/>
+            <a:ext cx="6382068" cy="523220"/>
           </a:xfrm>
           <a:prstGeom prst="rect">
             <a:avLst/>
@@ -39702,7 +40886,11 @@
             </a:r>
             <a:r>
               <a:rPr lang="en-US" sz="2800" dirty="0" smtClean="0"/>
-              <a:t>: no problem!</a:t>
+              <a:t>: no </a:t>
+            </a:r>
+            <a:r>
+              <a:rPr lang="en-US" sz="2800" dirty="0" smtClean="0"/>
+              <a:t>problem detected!</a:t>
             </a:r>
             <a:endParaRPr lang="en-US" sz="2800" dirty="0"/>
           </a:p>
@@ -42956,6 +44144,9 @@
                     <p:cTn id="3" fill="hold">
                       <p:stCondLst>
                         <p:cond delay="indefinite"/>
+                        <p:cond evt="onBegin" delay="0">
+                          <p:tn val="2"/>
+                        </p:cond>
                       </p:stCondLst>
                       <p:childTnLst>
                         <p:par>
@@ -42965,7 +44156,7 @@
                             </p:stCondLst>
                             <p:childTnLst>
                               <p:par>
-                                <p:cTn id="5" presetID="1" presetClass="entr" presetSubtype="0" fill="hold" grpId="0" nodeType="clickEffect">
+                                <p:cTn id="5" presetID="1" presetClass="entr" presetSubtype="0" fill="hold" grpId="0" nodeType="withEffect">
                                   <p:stCondLst>
                                     <p:cond delay="0"/>
                                   </p:stCondLst>
@@ -43431,7 +44622,7 @@
       </p:par>
     </p:tnLst>
     <p:bldLst>
-      <p:bldP spid="3" grpId="0" build="p"/>
+      <p:bldP spid="3" grpId="0" uiExpand="1" build="p"/>
     </p:bldLst>
   </p:timing>
 </p:sld>
@@ -43659,6 +44850,9 @@
                     <p:cTn id="3" fill="hold">
                       <p:stCondLst>
                         <p:cond delay="indefinite"/>
+                        <p:cond evt="onBegin" delay="0">
+                          <p:tn val="2"/>
+                        </p:cond>
                       </p:stCondLst>
                       <p:childTnLst>
                         <p:par>
@@ -43668,7 +44862,7 @@
                             </p:stCondLst>
                             <p:childTnLst>
                               <p:par>
-                                <p:cTn id="5" presetID="1" presetClass="entr" presetSubtype="0" fill="hold" grpId="0" nodeType="clickEffect">
+                                <p:cTn id="5" presetID="1" presetClass="entr" presetSubtype="0" fill="hold" grpId="0" nodeType="withEffect">
                                   <p:stCondLst>
                                     <p:cond delay="0"/>
                                   </p:stCondLst>
@@ -43886,7 +45080,7 @@
       </p:par>
     </p:tnLst>
     <p:bldLst>
-      <p:bldP spid="3" grpId="0" build="p"/>
+      <p:bldP spid="3" grpId="0" uiExpand="1" build="p"/>
     </p:bldLst>
   </p:timing>
 </p:sld>

</xml_diff>

<commit_message>
Fixed typo on slides
</commit_message>
<xml_diff>
--- a/Debugging/debugging.pptx
+++ b/Debugging/debugging.pptx
@@ -362,7 +362,7 @@
           <a:p>
             <a:fld id="{E04DB63C-8DFF-407A-A12E-32A5188618B9}" type="datetimeFigureOut">
               <a:rPr lang="nl-BE" smtClean="0"/>
-              <a:t>1/12/2015</a:t>
+              <a:t>30/12/2015</a:t>
             </a:fld>
             <a:endParaRPr lang="nl-BE"/>
           </a:p>
@@ -532,7 +532,7 @@
           <a:p>
             <a:fld id="{E04DB63C-8DFF-407A-A12E-32A5188618B9}" type="datetimeFigureOut">
               <a:rPr lang="nl-BE" smtClean="0"/>
-              <a:t>1/12/2015</a:t>
+              <a:t>30/12/2015</a:t>
             </a:fld>
             <a:endParaRPr lang="nl-BE"/>
           </a:p>
@@ -712,7 +712,7 @@
           <a:p>
             <a:fld id="{E04DB63C-8DFF-407A-A12E-32A5188618B9}" type="datetimeFigureOut">
               <a:rPr lang="nl-BE" smtClean="0"/>
-              <a:t>1/12/2015</a:t>
+              <a:t>30/12/2015</a:t>
             </a:fld>
             <a:endParaRPr lang="nl-BE"/>
           </a:p>
@@ -882,7 +882,7 @@
           <a:p>
             <a:fld id="{E04DB63C-8DFF-407A-A12E-32A5188618B9}" type="datetimeFigureOut">
               <a:rPr lang="nl-BE" smtClean="0"/>
-              <a:t>1/12/2015</a:t>
+              <a:t>30/12/2015</a:t>
             </a:fld>
             <a:endParaRPr lang="nl-BE"/>
           </a:p>
@@ -1128,7 +1128,7 @@
           <a:p>
             <a:fld id="{E04DB63C-8DFF-407A-A12E-32A5188618B9}" type="datetimeFigureOut">
               <a:rPr lang="nl-BE" smtClean="0"/>
-              <a:t>1/12/2015</a:t>
+              <a:t>30/12/2015</a:t>
             </a:fld>
             <a:endParaRPr lang="nl-BE"/>
           </a:p>
@@ -1416,7 +1416,7 @@
           <a:p>
             <a:fld id="{E04DB63C-8DFF-407A-A12E-32A5188618B9}" type="datetimeFigureOut">
               <a:rPr lang="nl-BE" smtClean="0"/>
-              <a:t>1/12/2015</a:t>
+              <a:t>30/12/2015</a:t>
             </a:fld>
             <a:endParaRPr lang="nl-BE"/>
           </a:p>
@@ -1838,7 +1838,7 @@
           <a:p>
             <a:fld id="{E04DB63C-8DFF-407A-A12E-32A5188618B9}" type="datetimeFigureOut">
               <a:rPr lang="nl-BE" smtClean="0"/>
-              <a:t>1/12/2015</a:t>
+              <a:t>30/12/2015</a:t>
             </a:fld>
             <a:endParaRPr lang="nl-BE"/>
           </a:p>
@@ -1956,7 +1956,7 @@
           <a:p>
             <a:fld id="{E04DB63C-8DFF-407A-A12E-32A5188618B9}" type="datetimeFigureOut">
               <a:rPr lang="nl-BE" smtClean="0"/>
-              <a:t>1/12/2015</a:t>
+              <a:t>30/12/2015</a:t>
             </a:fld>
             <a:endParaRPr lang="nl-BE"/>
           </a:p>
@@ -2051,7 +2051,7 @@
           <a:p>
             <a:fld id="{E04DB63C-8DFF-407A-A12E-32A5188618B9}" type="datetimeFigureOut">
               <a:rPr lang="nl-BE" smtClean="0"/>
-              <a:t>1/12/2015</a:t>
+              <a:t>30/12/2015</a:t>
             </a:fld>
             <a:endParaRPr lang="nl-BE"/>
           </a:p>
@@ -2328,7 +2328,7 @@
           <a:p>
             <a:fld id="{E04DB63C-8DFF-407A-A12E-32A5188618B9}" type="datetimeFigureOut">
               <a:rPr lang="nl-BE" smtClean="0"/>
-              <a:t>1/12/2015</a:t>
+              <a:t>30/12/2015</a:t>
             </a:fld>
             <a:endParaRPr lang="nl-BE"/>
           </a:p>
@@ -2581,7 +2581,7 @@
           <a:p>
             <a:fld id="{E04DB63C-8DFF-407A-A12E-32A5188618B9}" type="datetimeFigureOut">
               <a:rPr lang="nl-BE" smtClean="0"/>
-              <a:t>1/12/2015</a:t>
+              <a:t>30/12/2015</a:t>
             </a:fld>
             <a:endParaRPr lang="nl-BE"/>
           </a:p>
@@ -2794,7 +2794,7 @@
           <a:p>
             <a:fld id="{E04DB63C-8DFF-407A-A12E-32A5188618B9}" type="datetimeFigureOut">
               <a:rPr lang="nl-BE" smtClean="0"/>
-              <a:t>1/12/2015</a:t>
+              <a:t>30/12/2015</a:t>
             </a:fld>
             <a:endParaRPr lang="nl-BE"/>
           </a:p>
@@ -9285,13 +9285,8 @@
           <a:p>
             <a:r>
               <a:rPr lang="en-US" dirty="0" smtClean="0"/>
-              <a:t>Implementations of f</a:t>
-            </a:r>
-            <a:r>
-              <a:rPr lang="en-US" dirty="0" smtClean="0"/>
-              <a:t>ramework</a:t>
-            </a:r>
-            <a:endParaRPr lang="en-US" dirty="0" smtClean="0"/>
+              <a:t>Implementations of framework</a:t>
+            </a:r>
           </a:p>
           <a:p>
             <a:pPr lvl="1"/>
@@ -10997,7 +10992,7 @@
                   <a:latin typeface="Courier New" pitchFamily="49" charset="0"/>
                   <a:cs typeface="Courier New" pitchFamily="49" charset="0"/>
                 </a:rPr>
-                <a:t>Cunit.h</a:t>
+                <a:t>CUnit.h</a:t>
               </a:r>
               <a:r>
                 <a:rPr lang="en-US" sz="1600" dirty="0" smtClean="0">
@@ -15331,11 +15326,7 @@
           <a:p>
             <a:r>
               <a:rPr lang="en-US" dirty="0" smtClean="0"/>
-              <a:t>Use version </a:t>
-            </a:r>
-            <a:r>
-              <a:rPr lang="en-US" dirty="0" smtClean="0"/>
-              <a:t>control: subversion, </a:t>
+              <a:t>Use version control: subversion, </a:t>
             </a:r>
             <a:r>
               <a:rPr lang="en-US" dirty="0" err="1" smtClean="0"/>
@@ -15345,7 +15336,6 @@
               <a:rPr lang="en-US" dirty="0" smtClean="0"/>
               <a:t>, …</a:t>
             </a:r>
-            <a:endParaRPr lang="en-US" dirty="0" smtClean="0"/>
           </a:p>
           <a:p>
             <a:pPr lvl="1"/>
@@ -32514,11 +32504,7 @@
             </a:r>
             <a:r>
               <a:rPr lang="en-US" sz="2400" dirty="0" smtClean="0"/>
-              <a:t>se </a:t>
-            </a:r>
-            <a:r>
-              <a:rPr lang="en-US" sz="2400" dirty="0" smtClean="0"/>
-              <a:t>with caution!</a:t>
+              <a:t>se with caution!</a:t>
             </a:r>
             <a:endParaRPr lang="en-US" sz="2400" dirty="0"/>
           </a:p>
@@ -34928,14 +34914,7 @@
                   <a:latin typeface="Courier New" pitchFamily="49" charset="0"/>
                   <a:cs typeface="Courier New" pitchFamily="49" charset="0"/>
                 </a:rPr>
-                <a:t>(n</a:t>
-              </a:r>
-              <a:r>
-                <a:rPr lang="en-US" sz="1600" dirty="0" smtClean="0">
-                  <a:latin typeface="Courier New" pitchFamily="49" charset="0"/>
-                  <a:cs typeface="Courier New" pitchFamily="49" charset="0"/>
-                </a:rPr>
-                <a:t>, </a:t>
+                <a:t>(n, </a:t>
               </a:r>
               <a:r>
                 <a:rPr lang="en-US" sz="1600" dirty="0" err="1" smtClean="0">
@@ -36576,14 +36555,7 @@
                   <a:latin typeface="Courier New" pitchFamily="49" charset="0"/>
                   <a:cs typeface="Courier New" pitchFamily="49" charset="0"/>
                 </a:rPr>
-                <a:t>(n</a:t>
-              </a:r>
-              <a:r>
-                <a:rPr lang="en-US" sz="1600" dirty="0" smtClean="0">
-                  <a:latin typeface="Courier New" pitchFamily="49" charset="0"/>
-                  <a:cs typeface="Courier New" pitchFamily="49" charset="0"/>
-                </a:rPr>
-                <a:t>, </a:t>
+                <a:t>(n, </a:t>
               </a:r>
               <a:r>
                 <a:rPr lang="en-US" sz="1600" dirty="0" err="1" smtClean="0">
@@ -40886,11 +40858,7 @@
             </a:r>
             <a:r>
               <a:rPr lang="en-US" sz="2800" dirty="0" smtClean="0"/>
-              <a:t>: no </a:t>
-            </a:r>
-            <a:r>
-              <a:rPr lang="en-US" sz="2800" dirty="0" smtClean="0"/>
-              <a:t>problem detected!</a:t>
+              <a:t>: no problem detected!</a:t>
             </a:r>
             <a:endParaRPr lang="en-US" sz="2800" dirty="0"/>
           </a:p>

</xml_diff>

<commit_message>
Added finish to step slide
</commit_message>
<xml_diff>
--- a/Debugging/debugging.pptx
+++ b/Debugging/debugging.pptx
@@ -23004,7 +23004,7 @@
         <p:spPr/>
         <p:txBody>
           <a:bodyPr>
-            <a:normAutofit fontScale="92500" lnSpcReduction="20000"/>
+            <a:normAutofit fontScale="85000" lnSpcReduction="20000"/>
           </a:bodyPr>
           <a:lstStyle/>
           <a:p>
@@ -23146,6 +23146,26 @@
               </a:rPr>
               <a:t>)</a:t>
             </a:r>
+          </a:p>
+          <a:p>
+            <a:pPr lvl="1"/>
+            <a:r>
+              <a:rPr lang="en-US" dirty="0" smtClean="0">
+                <a:cs typeface="Courier New" pitchFamily="49" charset="0"/>
+              </a:rPr>
+              <a:t>Step out of function: </a:t>
+            </a:r>
+            <a:r>
+              <a:rPr lang="en-US" dirty="0" smtClean="0">
+                <a:latin typeface="Courier New" pitchFamily="49" charset="0"/>
+                <a:cs typeface="Courier New" pitchFamily="49" charset="0"/>
+              </a:rPr>
+              <a:t>finish</a:t>
+            </a:r>
+            <a:endParaRPr lang="en-US" dirty="0" smtClean="0">
+              <a:latin typeface="Courier New" pitchFamily="49" charset="0"/>
+              <a:cs typeface="Courier New" pitchFamily="49" charset="0"/>
+            </a:endParaRPr>
           </a:p>
           <a:p>
             <a:r>
@@ -23575,33 +23595,15 @@
                                   </p:childTnLst>
                                 </p:cTn>
                               </p:par>
-                            </p:childTnLst>
-                          </p:cTn>
-                        </p:par>
-                      </p:childTnLst>
-                    </p:cTn>
-                  </p:par>
-                  <p:par>
-                    <p:cTn id="21" fill="hold">
-                      <p:stCondLst>
-                        <p:cond delay="indefinite"/>
-                      </p:stCondLst>
-                      <p:childTnLst>
-                        <p:par>
-                          <p:cTn id="22" fill="hold">
-                            <p:stCondLst>
-                              <p:cond delay="0"/>
-                            </p:stCondLst>
-                            <p:childTnLst>
                               <p:par>
-                                <p:cTn id="23" presetID="1" presetClass="entr" presetSubtype="0" fill="hold" grpId="0" nodeType="clickEffect">
+                                <p:cTn id="21" presetID="1" presetClass="entr" presetSubtype="0" fill="hold" grpId="0" nodeType="withEffect">
                                   <p:stCondLst>
                                     <p:cond delay="0"/>
                                   </p:stCondLst>
                                   <p:childTnLst>
                                     <p:set>
                                       <p:cBhvr>
-                                        <p:cTn id="24" dur="1" fill="hold">
+                                        <p:cTn id="22" dur="1" fill="hold">
                                           <p:stCondLst>
                                             <p:cond delay="0"/>
                                           </p:stCondLst>
@@ -23624,8 +23626,26 @@
                                   </p:childTnLst>
                                 </p:cTn>
                               </p:par>
+                            </p:childTnLst>
+                          </p:cTn>
+                        </p:par>
+                      </p:childTnLst>
+                    </p:cTn>
+                  </p:par>
+                  <p:par>
+                    <p:cTn id="23" fill="hold">
+                      <p:stCondLst>
+                        <p:cond delay="indefinite"/>
+                      </p:stCondLst>
+                      <p:childTnLst>
+                        <p:par>
+                          <p:cTn id="24" fill="hold">
+                            <p:stCondLst>
+                              <p:cond delay="0"/>
+                            </p:stCondLst>
+                            <p:childTnLst>
                               <p:par>
-                                <p:cTn id="25" presetID="1" presetClass="entr" presetSubtype="0" fill="hold" grpId="0" nodeType="withEffect">
+                                <p:cTn id="25" presetID="1" presetClass="entr" presetSubtype="0" fill="hold" grpId="0" nodeType="clickEffect">
                                   <p:stCondLst>
                                     <p:cond delay="0"/>
                                   </p:stCondLst>
@@ -23703,6 +23723,37 @@
                                           <p:spTgt spid="3">
                                             <p:txEl>
                                               <p:pRg st="10" end="10"/>
+                                            </p:txEl>
+                                          </p:spTgt>
+                                        </p:tgtEl>
+                                        <p:attrNameLst>
+                                          <p:attrName>style.visibility</p:attrName>
+                                        </p:attrNameLst>
+                                      </p:cBhvr>
+                                      <p:to>
+                                        <p:strVal val="visible"/>
+                                      </p:to>
+                                    </p:set>
+                                  </p:childTnLst>
+                                </p:cTn>
+                              </p:par>
+                              <p:par>
+                                <p:cTn id="31" presetID="1" presetClass="entr" presetSubtype="0" fill="hold" grpId="0" nodeType="withEffect">
+                                  <p:stCondLst>
+                                    <p:cond delay="0"/>
+                                  </p:stCondLst>
+                                  <p:childTnLst>
+                                    <p:set>
+                                      <p:cBhvr>
+                                        <p:cTn id="32" dur="1" fill="hold">
+                                          <p:stCondLst>
+                                            <p:cond delay="0"/>
+                                          </p:stCondLst>
+                                        </p:cTn>
+                                        <p:tgtEl>
+                                          <p:spTgt spid="3">
+                                            <p:txEl>
+                                              <p:pRg st="11" end="11"/>
                                             </p:txEl>
                                           </p:spTgt>
                                         </p:tgtEl>

</xml_diff>

<commit_message>
Fixed ambiguous formulation with respect to load balance
</commit_message>
<xml_diff>
--- a/Debugging/debugging.pptx
+++ b/Debugging/debugging.pptx
@@ -42943,7 +42943,19 @@
             <a:pPr lvl="1"/>
             <a:r>
               <a:rPr lang="en-US" dirty="0" smtClean="0"/>
-              <a:t>Unexpected load balance between processes/threads</a:t>
+              <a:t>Unexpected load </a:t>
+            </a:r>
+            <a:r>
+              <a:rPr lang="en-US" dirty="0" err="1" smtClean="0"/>
+              <a:t>inbalance</a:t>
+            </a:r>
+            <a:r>
+              <a:rPr lang="en-US" dirty="0" smtClean="0"/>
+              <a:t> </a:t>
+            </a:r>
+            <a:r>
+              <a:rPr lang="en-US" dirty="0" smtClean="0"/>
+              <a:t>between processes/threads</a:t>
             </a:r>
           </a:p>
           <a:p>

</xml_diff>

<commit_message>
Added note on license
</commit_message>
<xml_diff>
--- a/Debugging/debugging.pptx
+++ b/Debugging/debugging.pptx
@@ -290,6 +290,20 @@
         </p14:section>
       </p14:sectionLst>
     </p:ext>
+    <p:ext uri="{EFAFB233-063F-42B5-8137-9DF3F51BA10A}">
+      <p15:sldGuideLst xmlns:p15="http://schemas.microsoft.com/office/powerpoint/2012/main">
+        <p15:guide id="1" orient="horz" pos="2160">
+          <p15:clr>
+            <a:srgbClr val="A4A3A4"/>
+          </p15:clr>
+        </p15:guide>
+        <p15:guide id="2" pos="2880">
+          <p15:clr>
+            <a:srgbClr val="A4A3A4"/>
+          </p15:clr>
+        </p15:guide>
+      </p15:sldGuideLst>
+    </p:ext>
   </p:extLst>
 </p:presentation>
 </file>
@@ -475,7 +489,7 @@
           <a:p>
             <a:fld id="{E04DB63C-8DFF-407A-A12E-32A5188618B9}" type="datetimeFigureOut">
               <a:rPr lang="nl-BE" smtClean="0"/>
-              <a:t>15/04/2016</a:t>
+              <a:t>15/06/2016</a:t>
             </a:fld>
             <a:endParaRPr lang="nl-BE"/>
           </a:p>
@@ -645,7 +659,7 @@
           <a:p>
             <a:fld id="{E04DB63C-8DFF-407A-A12E-32A5188618B9}" type="datetimeFigureOut">
               <a:rPr lang="nl-BE" smtClean="0"/>
-              <a:t>15/04/2016</a:t>
+              <a:t>15/06/2016</a:t>
             </a:fld>
             <a:endParaRPr lang="nl-BE"/>
           </a:p>
@@ -825,7 +839,7 @@
           <a:p>
             <a:fld id="{E04DB63C-8DFF-407A-A12E-32A5188618B9}" type="datetimeFigureOut">
               <a:rPr lang="nl-BE" smtClean="0"/>
-              <a:t>15/04/2016</a:t>
+              <a:t>15/06/2016</a:t>
             </a:fld>
             <a:endParaRPr lang="nl-BE"/>
           </a:p>
@@ -995,7 +1009,7 @@
           <a:p>
             <a:fld id="{E04DB63C-8DFF-407A-A12E-32A5188618B9}" type="datetimeFigureOut">
               <a:rPr lang="nl-BE" smtClean="0"/>
-              <a:t>15/04/2016</a:t>
+              <a:t>15/06/2016</a:t>
             </a:fld>
             <a:endParaRPr lang="nl-BE"/>
           </a:p>
@@ -1241,7 +1255,7 @@
           <a:p>
             <a:fld id="{E04DB63C-8DFF-407A-A12E-32A5188618B9}" type="datetimeFigureOut">
               <a:rPr lang="nl-BE" smtClean="0"/>
-              <a:t>15/04/2016</a:t>
+              <a:t>15/06/2016</a:t>
             </a:fld>
             <a:endParaRPr lang="nl-BE"/>
           </a:p>
@@ -1529,7 +1543,7 @@
           <a:p>
             <a:fld id="{E04DB63C-8DFF-407A-A12E-32A5188618B9}" type="datetimeFigureOut">
               <a:rPr lang="nl-BE" smtClean="0"/>
-              <a:t>15/04/2016</a:t>
+              <a:t>15/06/2016</a:t>
             </a:fld>
             <a:endParaRPr lang="nl-BE"/>
           </a:p>
@@ -1951,7 +1965,7 @@
           <a:p>
             <a:fld id="{E04DB63C-8DFF-407A-A12E-32A5188618B9}" type="datetimeFigureOut">
               <a:rPr lang="nl-BE" smtClean="0"/>
-              <a:t>15/04/2016</a:t>
+              <a:t>15/06/2016</a:t>
             </a:fld>
             <a:endParaRPr lang="nl-BE"/>
           </a:p>
@@ -2069,7 +2083,7 @@
           <a:p>
             <a:fld id="{E04DB63C-8DFF-407A-A12E-32A5188618B9}" type="datetimeFigureOut">
               <a:rPr lang="nl-BE" smtClean="0"/>
-              <a:t>15/04/2016</a:t>
+              <a:t>15/06/2016</a:t>
             </a:fld>
             <a:endParaRPr lang="nl-BE"/>
           </a:p>
@@ -2164,7 +2178,7 @@
           <a:p>
             <a:fld id="{E04DB63C-8DFF-407A-A12E-32A5188618B9}" type="datetimeFigureOut">
               <a:rPr lang="nl-BE" smtClean="0"/>
-              <a:t>15/04/2016</a:t>
+              <a:t>15/06/2016</a:t>
             </a:fld>
             <a:endParaRPr lang="nl-BE"/>
           </a:p>
@@ -2441,7 +2455,7 @@
           <a:p>
             <a:fld id="{E04DB63C-8DFF-407A-A12E-32A5188618B9}" type="datetimeFigureOut">
               <a:rPr lang="nl-BE" smtClean="0"/>
-              <a:t>15/04/2016</a:t>
+              <a:t>15/06/2016</a:t>
             </a:fld>
             <a:endParaRPr lang="nl-BE"/>
           </a:p>
@@ -2694,7 +2708,7 @@
           <a:p>
             <a:fld id="{E04DB63C-8DFF-407A-A12E-32A5188618B9}" type="datetimeFigureOut">
               <a:rPr lang="nl-BE" smtClean="0"/>
-              <a:t>15/04/2016</a:t>
+              <a:t>15/06/2016</a:t>
             </a:fld>
             <a:endParaRPr lang="nl-BE"/>
           </a:p>
@@ -2907,7 +2921,7 @@
           <a:p>
             <a:fld id="{E04DB63C-8DFF-407A-A12E-32A5188618B9}" type="datetimeFigureOut">
               <a:rPr lang="nl-BE" smtClean="0"/>
-              <a:t>15/04/2016</a:t>
+              <a:t>15/06/2016</a:t>
             </a:fld>
             <a:endParaRPr lang="nl-BE"/>
           </a:p>
@@ -3332,6 +3346,153 @@
               <a:t>geertjan.bex@uhasselt.be</a:t>
             </a:r>
             <a:endParaRPr lang="en-US" dirty="0"/>
+          </a:p>
+        </p:txBody>
+      </p:sp>
+      <p:sp>
+        <p:nvSpPr>
+          <p:cNvPr id="4" name="TextBox 3"/>
+          <p:cNvSpPr txBox="1"/>
+          <p:nvPr/>
+        </p:nvSpPr>
+        <p:spPr>
+          <a:xfrm>
+            <a:off x="2123728" y="6095037"/>
+            <a:ext cx="6869573" cy="646331"/>
+          </a:xfrm>
+          <a:prstGeom prst="rect">
+            <a:avLst/>
+          </a:prstGeom>
+          <a:noFill/>
+        </p:spPr>
+        <p:txBody>
+          <a:bodyPr wrap="none" rtlCol="0">
+            <a:spAutoFit/>
+          </a:bodyPr>
+          <a:lstStyle>
+            <a:defPPr>
+              <a:defRPr lang="nl-BE"/>
+            </a:defPPr>
+            <a:lvl1pPr marL="0" algn="l" defTabSz="914400" rtl="0" eaLnBrk="1" latinLnBrk="0" hangingPunct="1">
+              <a:defRPr sz="1800" kern="1200">
+                <a:solidFill>
+                  <a:schemeClr val="tx1"/>
+                </a:solidFill>
+                <a:latin typeface="+mn-lt"/>
+                <a:ea typeface="+mn-ea"/>
+                <a:cs typeface="+mn-cs"/>
+              </a:defRPr>
+            </a:lvl1pPr>
+            <a:lvl2pPr marL="457200" algn="l" defTabSz="914400" rtl="0" eaLnBrk="1" latinLnBrk="0" hangingPunct="1">
+              <a:defRPr sz="1800" kern="1200">
+                <a:solidFill>
+                  <a:schemeClr val="tx1"/>
+                </a:solidFill>
+                <a:latin typeface="+mn-lt"/>
+                <a:ea typeface="+mn-ea"/>
+                <a:cs typeface="+mn-cs"/>
+              </a:defRPr>
+            </a:lvl2pPr>
+            <a:lvl3pPr marL="914400" algn="l" defTabSz="914400" rtl="0" eaLnBrk="1" latinLnBrk="0" hangingPunct="1">
+              <a:defRPr sz="1800" kern="1200">
+                <a:solidFill>
+                  <a:schemeClr val="tx1"/>
+                </a:solidFill>
+                <a:latin typeface="+mn-lt"/>
+                <a:ea typeface="+mn-ea"/>
+                <a:cs typeface="+mn-cs"/>
+              </a:defRPr>
+            </a:lvl3pPr>
+            <a:lvl4pPr marL="1371600" algn="l" defTabSz="914400" rtl="0" eaLnBrk="1" latinLnBrk="0" hangingPunct="1">
+              <a:defRPr sz="1800" kern="1200">
+                <a:solidFill>
+                  <a:schemeClr val="tx1"/>
+                </a:solidFill>
+                <a:latin typeface="+mn-lt"/>
+                <a:ea typeface="+mn-ea"/>
+                <a:cs typeface="+mn-cs"/>
+              </a:defRPr>
+            </a:lvl4pPr>
+            <a:lvl5pPr marL="1828800" algn="l" defTabSz="914400" rtl="0" eaLnBrk="1" latinLnBrk="0" hangingPunct="1">
+              <a:defRPr sz="1800" kern="1200">
+                <a:solidFill>
+                  <a:schemeClr val="tx1"/>
+                </a:solidFill>
+                <a:latin typeface="+mn-lt"/>
+                <a:ea typeface="+mn-ea"/>
+                <a:cs typeface="+mn-cs"/>
+              </a:defRPr>
+            </a:lvl5pPr>
+            <a:lvl6pPr marL="2286000" algn="l" defTabSz="914400" rtl="0" eaLnBrk="1" latinLnBrk="0" hangingPunct="1">
+              <a:defRPr sz="1800" kern="1200">
+                <a:solidFill>
+                  <a:schemeClr val="tx1"/>
+                </a:solidFill>
+                <a:latin typeface="+mn-lt"/>
+                <a:ea typeface="+mn-ea"/>
+                <a:cs typeface="+mn-cs"/>
+              </a:defRPr>
+            </a:lvl6pPr>
+            <a:lvl7pPr marL="2743200" algn="l" defTabSz="914400" rtl="0" eaLnBrk="1" latinLnBrk="0" hangingPunct="1">
+              <a:defRPr sz="1800" kern="1200">
+                <a:solidFill>
+                  <a:schemeClr val="tx1"/>
+                </a:solidFill>
+                <a:latin typeface="+mn-lt"/>
+                <a:ea typeface="+mn-ea"/>
+                <a:cs typeface="+mn-cs"/>
+              </a:defRPr>
+            </a:lvl7pPr>
+            <a:lvl8pPr marL="3200400" algn="l" defTabSz="914400" rtl="0" eaLnBrk="1" latinLnBrk="0" hangingPunct="1">
+              <a:defRPr sz="1800" kern="1200">
+                <a:solidFill>
+                  <a:schemeClr val="tx1"/>
+                </a:solidFill>
+                <a:latin typeface="+mn-lt"/>
+                <a:ea typeface="+mn-ea"/>
+                <a:cs typeface="+mn-cs"/>
+              </a:defRPr>
+            </a:lvl8pPr>
+            <a:lvl9pPr marL="3657600" algn="l" defTabSz="914400" rtl="0" eaLnBrk="1" latinLnBrk="0" hangingPunct="1">
+              <a:defRPr sz="1800" kern="1200">
+                <a:solidFill>
+                  <a:schemeClr val="tx1"/>
+                </a:solidFill>
+                <a:latin typeface="+mn-lt"/>
+                <a:ea typeface="+mn-ea"/>
+                <a:cs typeface="+mn-cs"/>
+              </a:defRPr>
+            </a:lvl9pPr>
+          </a:lstStyle>
+          <a:p>
+            <a:r>
+              <a:rPr lang="en-US" b="1" dirty="0" smtClean="0"/>
+              <a:t>License</a:t>
+            </a:r>
+            <a:r>
+              <a:rPr lang="en-US" dirty="0" smtClean="0"/>
+              <a:t>: this presentation is released under the Creative Commons, see</a:t>
+            </a:r>
+            <a:br>
+              <a:rPr lang="en-US" dirty="0" smtClean="0"/>
+            </a:br>
+            <a:r>
+              <a:rPr lang="nl-BE" dirty="0">
+                <a:hlinkClick r:id="rId2"/>
+              </a:rPr>
+              <a:t>http://creativecommons.org/publicdomain/zero/1.0</a:t>
+            </a:r>
+            <a:r>
+              <a:rPr lang="nl-BE" dirty="0" smtClean="0">
+                <a:hlinkClick r:id="rId2"/>
+              </a:rPr>
+              <a:t>/</a:t>
+            </a:r>
+            <a:r>
+              <a:rPr lang="nl-BE" dirty="0" smtClean="0"/>
+              <a:t> </a:t>
+            </a:r>
+            <a:endParaRPr lang="nl-BE" dirty="0"/>
           </a:p>
         </p:txBody>
       </p:sp>
@@ -23162,10 +23323,6 @@
               </a:rPr>
               <a:t>finish</a:t>
             </a:r>
-            <a:endParaRPr lang="en-US" dirty="0" smtClean="0">
-              <a:latin typeface="Courier New" pitchFamily="49" charset="0"/>
-              <a:cs typeface="Courier New" pitchFamily="49" charset="0"/>
-            </a:endParaRPr>
           </a:p>
           <a:p>
             <a:r>
@@ -42951,11 +43108,7 @@
             </a:r>
             <a:r>
               <a:rPr lang="en-US" dirty="0" smtClean="0"/>
-              <a:t> </a:t>
-            </a:r>
-            <a:r>
-              <a:rPr lang="en-US" dirty="0" smtClean="0"/>
-              <a:t>between processes/threads</a:t>
+              <a:t> between processes/threads</a:t>
             </a:r>
           </a:p>
           <a:p>

</xml_diff>

<commit_message>
Added -w3 flag for Intel; fixed type
</commit_message>
<xml_diff>
--- a/Debugging/debugging.pptx
+++ b/Debugging/debugging.pptx
@@ -491,7 +491,7 @@
           <a:p>
             <a:fld id="{E04DB63C-8DFF-407A-A12E-32A5188618B9}" type="datetimeFigureOut">
               <a:rPr lang="nl-BE" smtClean="0"/>
-              <a:t>16/08/2016</a:t>
+              <a:t>2016-09-09</a:t>
             </a:fld>
             <a:endParaRPr lang="nl-BE"/>
           </a:p>
@@ -661,7 +661,7 @@
           <a:p>
             <a:fld id="{E04DB63C-8DFF-407A-A12E-32A5188618B9}" type="datetimeFigureOut">
               <a:rPr lang="nl-BE" smtClean="0"/>
-              <a:t>16/08/2016</a:t>
+              <a:t>2016-09-09</a:t>
             </a:fld>
             <a:endParaRPr lang="nl-BE"/>
           </a:p>
@@ -841,7 +841,7 @@
           <a:p>
             <a:fld id="{E04DB63C-8DFF-407A-A12E-32A5188618B9}" type="datetimeFigureOut">
               <a:rPr lang="nl-BE" smtClean="0"/>
-              <a:t>16/08/2016</a:t>
+              <a:t>2016-09-09</a:t>
             </a:fld>
             <a:endParaRPr lang="nl-BE"/>
           </a:p>
@@ -1011,7 +1011,7 @@
           <a:p>
             <a:fld id="{E04DB63C-8DFF-407A-A12E-32A5188618B9}" type="datetimeFigureOut">
               <a:rPr lang="nl-BE" smtClean="0"/>
-              <a:t>16/08/2016</a:t>
+              <a:t>2016-09-09</a:t>
             </a:fld>
             <a:endParaRPr lang="nl-BE"/>
           </a:p>
@@ -1257,7 +1257,7 @@
           <a:p>
             <a:fld id="{E04DB63C-8DFF-407A-A12E-32A5188618B9}" type="datetimeFigureOut">
               <a:rPr lang="nl-BE" smtClean="0"/>
-              <a:t>16/08/2016</a:t>
+              <a:t>2016-09-09</a:t>
             </a:fld>
             <a:endParaRPr lang="nl-BE"/>
           </a:p>
@@ -1545,7 +1545,7 @@
           <a:p>
             <a:fld id="{E04DB63C-8DFF-407A-A12E-32A5188618B9}" type="datetimeFigureOut">
               <a:rPr lang="nl-BE" smtClean="0"/>
-              <a:t>16/08/2016</a:t>
+              <a:t>2016-09-09</a:t>
             </a:fld>
             <a:endParaRPr lang="nl-BE"/>
           </a:p>
@@ -1967,7 +1967,7 @@
           <a:p>
             <a:fld id="{E04DB63C-8DFF-407A-A12E-32A5188618B9}" type="datetimeFigureOut">
               <a:rPr lang="nl-BE" smtClean="0"/>
-              <a:t>16/08/2016</a:t>
+              <a:t>2016-09-09</a:t>
             </a:fld>
             <a:endParaRPr lang="nl-BE"/>
           </a:p>
@@ -2085,7 +2085,7 @@
           <a:p>
             <a:fld id="{E04DB63C-8DFF-407A-A12E-32A5188618B9}" type="datetimeFigureOut">
               <a:rPr lang="nl-BE" smtClean="0"/>
-              <a:t>16/08/2016</a:t>
+              <a:t>2016-09-09</a:t>
             </a:fld>
             <a:endParaRPr lang="nl-BE"/>
           </a:p>
@@ -2180,7 +2180,7 @@
           <a:p>
             <a:fld id="{E04DB63C-8DFF-407A-A12E-32A5188618B9}" type="datetimeFigureOut">
               <a:rPr lang="nl-BE" smtClean="0"/>
-              <a:t>16/08/2016</a:t>
+              <a:t>2016-09-09</a:t>
             </a:fld>
             <a:endParaRPr lang="nl-BE"/>
           </a:p>
@@ -2457,7 +2457,7 @@
           <a:p>
             <a:fld id="{E04DB63C-8DFF-407A-A12E-32A5188618B9}" type="datetimeFigureOut">
               <a:rPr lang="nl-BE" smtClean="0"/>
-              <a:t>16/08/2016</a:t>
+              <a:t>2016-09-09</a:t>
             </a:fld>
             <a:endParaRPr lang="nl-BE"/>
           </a:p>
@@ -2710,7 +2710,7 @@
           <a:p>
             <a:fld id="{E04DB63C-8DFF-407A-A12E-32A5188618B9}" type="datetimeFigureOut">
               <a:rPr lang="nl-BE" smtClean="0"/>
-              <a:t>16/08/2016</a:t>
+              <a:t>2016-09-09</a:t>
             </a:fld>
             <a:endParaRPr lang="nl-BE"/>
           </a:p>
@@ -2923,7 +2923,7 @@
           <a:p>
             <a:fld id="{E04DB63C-8DFF-407A-A12E-32A5188618B9}" type="datetimeFigureOut">
               <a:rPr lang="nl-BE" smtClean="0"/>
-              <a:t>16/08/2016</a:t>
+              <a:t>2016-09-09</a:t>
             </a:fld>
             <a:endParaRPr lang="nl-BE"/>
           </a:p>
@@ -35007,7 +35007,7 @@
         <p:spPr/>
         <p:txBody>
           <a:bodyPr>
-            <a:normAutofit lnSpcReduction="10000"/>
+            <a:normAutofit fontScale="92500"/>
           </a:bodyPr>
           <a:lstStyle/>
           <a:p>
@@ -35036,51 +35036,58 @@
                 <a:latin typeface="Courier New" pitchFamily="49" charset="0"/>
                 <a:cs typeface="Courier New" pitchFamily="49" charset="0"/>
               </a:rPr>
-              <a:t>-</a:t>
-            </a:r>
+              <a:t>-Wall</a:t>
+            </a:r>
+          </a:p>
+          <a:p>
+            <a:pPr lvl="1"/>
             <a:r>
               <a:rPr lang="en-US" dirty="0" smtClean="0">
-                <a:latin typeface="Courier New" pitchFamily="49" charset="0"/>
-                <a:cs typeface="Courier New" pitchFamily="49" charset="0"/>
-              </a:rPr>
-              <a:t>Wall</a:t>
-            </a:r>
-          </a:p>
-          <a:p>
-            <a:pPr lvl="1"/>
+                <a:cs typeface="Courier New" pitchFamily="49" charset="0"/>
+              </a:rPr>
+              <a:t>For Intel:</a:t>
+            </a:r>
             <a:r>
               <a:rPr lang="en-US" dirty="0" smtClean="0">
-                <a:cs typeface="Courier New" pitchFamily="49" charset="0"/>
-              </a:rPr>
-              <a:t>For Intel:</a:t>
+                <a:latin typeface="Courier New" pitchFamily="49" charset="0"/>
+                <a:cs typeface="Courier New" pitchFamily="49" charset="0"/>
+              </a:rPr>
+              <a:t> -Wall -</a:t>
+            </a:r>
+            <a:r>
+              <a:rPr lang="en-US" dirty="0" err="1" smtClean="0">
+                <a:latin typeface="Courier New" pitchFamily="49" charset="0"/>
+                <a:cs typeface="Courier New" pitchFamily="49" charset="0"/>
+              </a:rPr>
+              <a:t>Wremarks</a:t>
             </a:r>
             <a:r>
               <a:rPr lang="en-US" dirty="0" smtClean="0">
                 <a:latin typeface="Courier New" pitchFamily="49" charset="0"/>
                 <a:cs typeface="Courier New" pitchFamily="49" charset="0"/>
               </a:rPr>
-              <a:t> -Wall -</a:t>
+              <a:t> </a:t>
+            </a:r>
+            <a:r>
+              <a:rPr lang="en-US" dirty="0" smtClean="0">
+                <a:latin typeface="Courier New" pitchFamily="49" charset="0"/>
+                <a:cs typeface="Courier New" pitchFamily="49" charset="0"/>
+              </a:rPr>
+              <a:t>–</a:t>
             </a:r>
             <a:r>
               <a:rPr lang="en-US" dirty="0" err="1" smtClean="0">
                 <a:latin typeface="Courier New" pitchFamily="49" charset="0"/>
                 <a:cs typeface="Courier New" pitchFamily="49" charset="0"/>
               </a:rPr>
-              <a:t>Wremarks</a:t>
+              <a:t>Wchecks</a:t>
             </a:r>
             <a:r>
               <a:rPr lang="en-US" dirty="0" smtClean="0">
                 <a:latin typeface="Courier New" pitchFamily="49" charset="0"/>
                 <a:cs typeface="Courier New" pitchFamily="49" charset="0"/>
               </a:rPr>
-              <a:t> -</a:t>
-            </a:r>
-            <a:r>
-              <a:rPr lang="en-US" dirty="0" err="1" smtClean="0">
-                <a:latin typeface="Courier New" pitchFamily="49" charset="0"/>
-                <a:cs typeface="Courier New" pitchFamily="49" charset="0"/>
-              </a:rPr>
-              <a:t>Wchecks</a:t>
+              <a:t> –w3</a:t>
             </a:r>
             <a:endParaRPr lang="en-US" dirty="0" smtClean="0">
               <a:latin typeface="Courier New" pitchFamily="49" charset="0"/>
@@ -43084,12 +43091,12 @@
               <a:t>Unexpected load </a:t>
             </a:r>
             <a:r>
-              <a:rPr lang="en-US" dirty="0" err="1" smtClean="0"/>
-              <a:t>inbalance</a:t>
-            </a:r>
-            <a:r>
               <a:rPr lang="en-US" dirty="0" smtClean="0"/>
-              <a:t> between processes/threads</a:t>
+              <a:t>imbalance </a:t>
+            </a:r>
+            <a:r>
+              <a:rPr lang="en-US" dirty="0" smtClean="0"/>
+              <a:t>between processes/threads</a:t>
             </a:r>
           </a:p>
           <a:p>
@@ -44369,8 +44376,9 @@
             <a:pPr lvl="1"/>
             <a:r>
               <a:rPr lang="en-US" dirty="0" smtClean="0"/>
-              <a:t>MPE</a:t>
-            </a:r>
+              <a:t>MPE2</a:t>
+            </a:r>
+            <a:endParaRPr lang="en-US" dirty="0" smtClean="0"/>
           </a:p>
           <a:p>
             <a:r>

</xml_diff>

<commit_message>
Added slide on gdb call and set functions
</commit_message>
<xml_diff>
--- a/Debugging/debugging.pptx
+++ b/Debugging/debugging.pptx
@@ -59,28 +59,29 @@
     <p:sldId id="279" r:id="rId53"/>
     <p:sldId id="280" r:id="rId54"/>
     <p:sldId id="281" r:id="rId55"/>
-    <p:sldId id="282" r:id="rId56"/>
-    <p:sldId id="283" r:id="rId57"/>
-    <p:sldId id="284" r:id="rId58"/>
-    <p:sldId id="303" r:id="rId59"/>
-    <p:sldId id="286" r:id="rId60"/>
-    <p:sldId id="287" r:id="rId61"/>
-    <p:sldId id="288" r:id="rId62"/>
-    <p:sldId id="289" r:id="rId63"/>
-    <p:sldId id="290" r:id="rId64"/>
-    <p:sldId id="291" r:id="rId65"/>
-    <p:sldId id="292" r:id="rId66"/>
-    <p:sldId id="293" r:id="rId67"/>
-    <p:sldId id="294" r:id="rId68"/>
-    <p:sldId id="295" r:id="rId69"/>
-    <p:sldId id="296" r:id="rId70"/>
-    <p:sldId id="297" r:id="rId71"/>
-    <p:sldId id="327" r:id="rId72"/>
-    <p:sldId id="328" r:id="rId73"/>
-    <p:sldId id="299" r:id="rId74"/>
-    <p:sldId id="300" r:id="rId75"/>
-    <p:sldId id="332" r:id="rId76"/>
-    <p:sldId id="298" r:id="rId77"/>
+    <p:sldId id="335" r:id="rId56"/>
+    <p:sldId id="282" r:id="rId57"/>
+    <p:sldId id="283" r:id="rId58"/>
+    <p:sldId id="284" r:id="rId59"/>
+    <p:sldId id="303" r:id="rId60"/>
+    <p:sldId id="286" r:id="rId61"/>
+    <p:sldId id="287" r:id="rId62"/>
+    <p:sldId id="288" r:id="rId63"/>
+    <p:sldId id="289" r:id="rId64"/>
+    <p:sldId id="290" r:id="rId65"/>
+    <p:sldId id="291" r:id="rId66"/>
+    <p:sldId id="292" r:id="rId67"/>
+    <p:sldId id="293" r:id="rId68"/>
+    <p:sldId id="294" r:id="rId69"/>
+    <p:sldId id="295" r:id="rId70"/>
+    <p:sldId id="296" r:id="rId71"/>
+    <p:sldId id="297" r:id="rId72"/>
+    <p:sldId id="327" r:id="rId73"/>
+    <p:sldId id="328" r:id="rId74"/>
+    <p:sldId id="299" r:id="rId75"/>
+    <p:sldId id="300" r:id="rId76"/>
+    <p:sldId id="332" r:id="rId77"/>
+    <p:sldId id="298" r:id="rId78"/>
   </p:sldIdLst>
   <p:sldSz cx="9144000" cy="6858000" type="screen4x3"/>
   <p:notesSz cx="6858000" cy="9144000"/>
@@ -254,6 +255,7 @@
             <p14:sldId id="279"/>
             <p14:sldId id="280"/>
             <p14:sldId id="281"/>
+            <p14:sldId id="335"/>
             <p14:sldId id="282"/>
             <p14:sldId id="283"/>
             <p14:sldId id="284"/>
@@ -491,7 +493,7 @@
           <a:p>
             <a:fld id="{E04DB63C-8DFF-407A-A12E-32A5188618B9}" type="datetimeFigureOut">
               <a:rPr lang="nl-BE" smtClean="0"/>
-              <a:t>17/01/2017</a:t>
+              <a:t>2017-01-17</a:t>
             </a:fld>
             <a:endParaRPr lang="nl-BE"/>
           </a:p>
@@ -661,7 +663,7 @@
           <a:p>
             <a:fld id="{E04DB63C-8DFF-407A-A12E-32A5188618B9}" type="datetimeFigureOut">
               <a:rPr lang="nl-BE" smtClean="0"/>
-              <a:t>17/01/2017</a:t>
+              <a:t>2017-01-17</a:t>
             </a:fld>
             <a:endParaRPr lang="nl-BE"/>
           </a:p>
@@ -841,7 +843,7 @@
           <a:p>
             <a:fld id="{E04DB63C-8DFF-407A-A12E-32A5188618B9}" type="datetimeFigureOut">
               <a:rPr lang="nl-BE" smtClean="0"/>
-              <a:t>17/01/2017</a:t>
+              <a:t>2017-01-17</a:t>
             </a:fld>
             <a:endParaRPr lang="nl-BE"/>
           </a:p>
@@ -1011,7 +1013,7 @@
           <a:p>
             <a:fld id="{E04DB63C-8DFF-407A-A12E-32A5188618B9}" type="datetimeFigureOut">
               <a:rPr lang="nl-BE" smtClean="0"/>
-              <a:t>17/01/2017</a:t>
+              <a:t>2017-01-17</a:t>
             </a:fld>
             <a:endParaRPr lang="nl-BE"/>
           </a:p>
@@ -1257,7 +1259,7 @@
           <a:p>
             <a:fld id="{E04DB63C-8DFF-407A-A12E-32A5188618B9}" type="datetimeFigureOut">
               <a:rPr lang="nl-BE" smtClean="0"/>
-              <a:t>17/01/2017</a:t>
+              <a:t>2017-01-17</a:t>
             </a:fld>
             <a:endParaRPr lang="nl-BE"/>
           </a:p>
@@ -1545,7 +1547,7 @@
           <a:p>
             <a:fld id="{E04DB63C-8DFF-407A-A12E-32A5188618B9}" type="datetimeFigureOut">
               <a:rPr lang="nl-BE" smtClean="0"/>
-              <a:t>17/01/2017</a:t>
+              <a:t>2017-01-17</a:t>
             </a:fld>
             <a:endParaRPr lang="nl-BE"/>
           </a:p>
@@ -1967,7 +1969,7 @@
           <a:p>
             <a:fld id="{E04DB63C-8DFF-407A-A12E-32A5188618B9}" type="datetimeFigureOut">
               <a:rPr lang="nl-BE" smtClean="0"/>
-              <a:t>17/01/2017</a:t>
+              <a:t>2017-01-17</a:t>
             </a:fld>
             <a:endParaRPr lang="nl-BE"/>
           </a:p>
@@ -2085,7 +2087,7 @@
           <a:p>
             <a:fld id="{E04DB63C-8DFF-407A-A12E-32A5188618B9}" type="datetimeFigureOut">
               <a:rPr lang="nl-BE" smtClean="0"/>
-              <a:t>17/01/2017</a:t>
+              <a:t>2017-01-17</a:t>
             </a:fld>
             <a:endParaRPr lang="nl-BE"/>
           </a:p>
@@ -2180,7 +2182,7 @@
           <a:p>
             <a:fld id="{E04DB63C-8DFF-407A-A12E-32A5188618B9}" type="datetimeFigureOut">
               <a:rPr lang="nl-BE" smtClean="0"/>
-              <a:t>17/01/2017</a:t>
+              <a:t>2017-01-17</a:t>
             </a:fld>
             <a:endParaRPr lang="nl-BE"/>
           </a:p>
@@ -2457,7 +2459,7 @@
           <a:p>
             <a:fld id="{E04DB63C-8DFF-407A-A12E-32A5188618B9}" type="datetimeFigureOut">
               <a:rPr lang="nl-BE" smtClean="0"/>
-              <a:t>17/01/2017</a:t>
+              <a:t>2017-01-17</a:t>
             </a:fld>
             <a:endParaRPr lang="nl-BE"/>
           </a:p>
@@ -2710,7 +2712,7 @@
           <a:p>
             <a:fld id="{E04DB63C-8DFF-407A-A12E-32A5188618B9}" type="datetimeFigureOut">
               <a:rPr lang="nl-BE" smtClean="0"/>
-              <a:t>17/01/2017</a:t>
+              <a:t>2017-01-17</a:t>
             </a:fld>
             <a:endParaRPr lang="nl-BE"/>
           </a:p>
@@ -2923,7 +2925,7 @@
           <a:p>
             <a:fld id="{E04DB63C-8DFF-407A-A12E-32A5188618B9}" type="datetimeFigureOut">
               <a:rPr lang="nl-BE" smtClean="0"/>
-              <a:t>17/01/2017</a:t>
+              <a:t>2017-01-17</a:t>
             </a:fld>
             <a:endParaRPr lang="nl-BE"/>
           </a:p>
@@ -29749,11 +29751,7 @@
             <a:pPr lvl="1"/>
             <a:r>
               <a:rPr lang="en-US" dirty="0" smtClean="0"/>
-              <a:t>Synonym </a:t>
-            </a:r>
-            <a:r>
-              <a:rPr lang="en-US" dirty="0" smtClean="0"/>
-              <a:t>for </a:t>
+              <a:t>Synonym for </a:t>
             </a:r>
             <a:r>
               <a:rPr lang="en-US" dirty="0" err="1" smtClean="0">
@@ -33113,6 +33111,195 @@
           <a:lstStyle/>
           <a:p>
             <a:r>
+              <a:rPr lang="en-US" dirty="0" err="1" smtClean="0"/>
+              <a:t>gdb</a:t>
+            </a:r>
+            <a:r>
+              <a:rPr lang="en-US" dirty="0" smtClean="0"/>
+              <a:t>: hypothesis testing</a:t>
+            </a:r>
+            <a:endParaRPr lang="nl-BE" dirty="0"/>
+          </a:p>
+        </p:txBody>
+      </p:sp>
+      <p:sp>
+        <p:nvSpPr>
+          <p:cNvPr id="3" name="Content Placeholder 2"/>
+          <p:cNvSpPr>
+            <a:spLocks noGrp="1"/>
+          </p:cNvSpPr>
+          <p:nvPr>
+            <p:ph idx="1"/>
+          </p:nvPr>
+        </p:nvSpPr>
+        <p:spPr/>
+        <p:txBody>
+          <a:bodyPr/>
+          <a:lstStyle/>
+          <a:p>
+            <a:r>
+              <a:rPr lang="en-US" dirty="0" smtClean="0"/>
+              <a:t>Calling a function/subroutine</a:t>
+            </a:r>
+            <a:br>
+              <a:rPr lang="en-US" dirty="0" smtClean="0"/>
+            </a:br>
+            <a:r>
+              <a:rPr lang="en-US" dirty="0" smtClean="0">
+                <a:latin typeface="Courier New" panose="02070309020205020404" pitchFamily="49" charset="0"/>
+                <a:cs typeface="Courier New" panose="02070309020205020404" pitchFamily="49" charset="0"/>
+              </a:rPr>
+              <a:t>call &lt;</a:t>
+            </a:r>
+            <a:r>
+              <a:rPr lang="en-US" dirty="0" err="1" smtClean="0">
+                <a:latin typeface="Courier New" panose="02070309020205020404" pitchFamily="49" charset="0"/>
+                <a:cs typeface="Courier New" panose="02070309020205020404" pitchFamily="49" charset="0"/>
+              </a:rPr>
+              <a:t>func</a:t>
+            </a:r>
+            <a:r>
+              <a:rPr lang="en-US" dirty="0" smtClean="0">
+                <a:latin typeface="Courier New" panose="02070309020205020404" pitchFamily="49" charset="0"/>
+                <a:cs typeface="Courier New" panose="02070309020205020404" pitchFamily="49" charset="0"/>
+              </a:rPr>
+              <a:t>&gt;(&lt;</a:t>
+            </a:r>
+            <a:r>
+              <a:rPr lang="en-US" dirty="0" err="1" smtClean="0">
+                <a:latin typeface="Courier New" panose="02070309020205020404" pitchFamily="49" charset="0"/>
+                <a:cs typeface="Courier New" panose="02070309020205020404" pitchFamily="49" charset="0"/>
+              </a:rPr>
+              <a:t>vars</a:t>
+            </a:r>
+            <a:r>
+              <a:rPr lang="en-US" dirty="0" smtClean="0">
+                <a:latin typeface="Courier New" panose="02070309020205020404" pitchFamily="49" charset="0"/>
+                <a:cs typeface="Courier New" panose="02070309020205020404" pitchFamily="49" charset="0"/>
+              </a:rPr>
+              <a:t>&gt;)</a:t>
+            </a:r>
+          </a:p>
+          <a:p>
+            <a:r>
+              <a:rPr lang="en-US" dirty="0" smtClean="0"/>
+              <a:t>Modifying a variable</a:t>
+            </a:r>
+            <a:br>
+              <a:rPr lang="en-US" dirty="0" smtClean="0"/>
+            </a:br>
+            <a:r>
+              <a:rPr lang="en-US" dirty="0" smtClean="0">
+                <a:latin typeface="Courier New" panose="02070309020205020404" pitchFamily="49" charset="0"/>
+                <a:cs typeface="Courier New" panose="02070309020205020404" pitchFamily="49" charset="0"/>
+              </a:rPr>
+              <a:t>set &lt;</a:t>
+            </a:r>
+            <a:r>
+              <a:rPr lang="en-US" dirty="0" err="1" smtClean="0">
+                <a:latin typeface="Courier New" panose="02070309020205020404" pitchFamily="49" charset="0"/>
+                <a:cs typeface="Courier New" panose="02070309020205020404" pitchFamily="49" charset="0"/>
+              </a:rPr>
+              <a:t>var</a:t>
+            </a:r>
+            <a:r>
+              <a:rPr lang="en-US" dirty="0" smtClean="0">
+                <a:latin typeface="Courier New" panose="02070309020205020404" pitchFamily="49" charset="0"/>
+                <a:cs typeface="Courier New" panose="02070309020205020404" pitchFamily="49" charset="0"/>
+              </a:rPr>
+              <a:t>&gt;=&lt;expr&gt;</a:t>
+            </a:r>
+          </a:p>
+        </p:txBody>
+      </p:sp>
+      <p:sp>
+        <p:nvSpPr>
+          <p:cNvPr id="4" name="TextBox 3"/>
+          <p:cNvSpPr txBox="1"/>
+          <p:nvPr/>
+        </p:nvSpPr>
+        <p:spPr>
+          <a:xfrm>
+            <a:off x="1835696" y="4221088"/>
+            <a:ext cx="4437690" cy="830997"/>
+          </a:xfrm>
+          <a:prstGeom prst="rect">
+            <a:avLst/>
+          </a:prstGeom>
+          <a:noFill/>
+          <a:ln>
+            <a:solidFill>
+              <a:schemeClr val="tx1"/>
+            </a:solidFill>
+          </a:ln>
+        </p:spPr>
+        <p:txBody>
+          <a:bodyPr wrap="none" rtlCol="0">
+            <a:spAutoFit/>
+          </a:bodyPr>
+          <a:lstStyle/>
+          <a:p>
+            <a:r>
+              <a:rPr lang="en-US" sz="2400" dirty="0" smtClean="0"/>
+              <a:t>Nice for testing hypotheses, but…</a:t>
+            </a:r>
+            <a:br>
+              <a:rPr lang="en-US" sz="2400" dirty="0" smtClean="0"/>
+            </a:br>
+            <a:r>
+              <a:rPr lang="en-US" sz="2400" dirty="0" smtClean="0"/>
+              <a:t>modifies state of program!</a:t>
+            </a:r>
+            <a:endParaRPr lang="nl-BE" sz="2400" dirty="0"/>
+          </a:p>
+        </p:txBody>
+      </p:sp>
+    </p:spTree>
+    <p:extLst>
+      <p:ext uri="{BB962C8B-B14F-4D97-AF65-F5344CB8AC3E}">
+        <p14:creationId xmlns:p14="http://schemas.microsoft.com/office/powerpoint/2010/main" val="73794240"/>
+      </p:ext>
+    </p:extLst>
+  </p:cSld>
+  <p:clrMapOvr>
+    <a:masterClrMapping/>
+  </p:clrMapOvr>
+</p:sld>
+</file>
+
+<file path=ppt/slides/slide56.xml><?xml version="1.0" encoding="utf-8"?>
+<p:sld xmlns:a="http://schemas.openxmlformats.org/drawingml/2006/main" xmlns:r="http://schemas.openxmlformats.org/officeDocument/2006/relationships" xmlns:p="http://schemas.openxmlformats.org/presentationml/2006/main">
+  <p:cSld>
+    <p:spTree>
+      <p:nvGrpSpPr>
+        <p:cNvPr id="1" name=""/>
+        <p:cNvGrpSpPr/>
+        <p:nvPr/>
+      </p:nvGrpSpPr>
+      <p:grpSpPr>
+        <a:xfrm>
+          <a:off x="0" y="0"/>
+          <a:ext cx="0" cy="0"/>
+          <a:chOff x="0" y="0"/>
+          <a:chExt cx="0" cy="0"/>
+        </a:xfrm>
+      </p:grpSpPr>
+      <p:sp>
+        <p:nvSpPr>
+          <p:cNvPr id="2" name="Title 1"/>
+          <p:cNvSpPr>
+            <a:spLocks noGrp="1"/>
+          </p:cNvSpPr>
+          <p:nvPr>
+            <p:ph type="title"/>
+          </p:nvPr>
+        </p:nvSpPr>
+        <p:spPr/>
+        <p:txBody>
+          <a:bodyPr/>
+          <a:lstStyle/>
+          <a:p>
+            <a:r>
               <a:rPr lang="en-US" dirty="0" smtClean="0"/>
               <a:t>gdb: reverse debugging</a:t>
             </a:r>
@@ -33716,7 +33903,7 @@
 </p:sld>
 </file>
 
-<file path=ppt/slides/slide56.xml><?xml version="1.0" encoding="utf-8"?>
+<file path=ppt/slides/slide57.xml><?xml version="1.0" encoding="utf-8"?>
 <p:sld xmlns:a="http://schemas.openxmlformats.org/drawingml/2006/main" xmlns:r="http://schemas.openxmlformats.org/officeDocument/2006/relationships" xmlns:p="http://schemas.openxmlformats.org/presentationml/2006/main">
   <p:cSld>
     <p:spTree>
@@ -34175,7 +34362,7 @@
 </p:sld>
 </file>
 
-<file path=ppt/slides/slide57.xml><?xml version="1.0" encoding="utf-8"?>
+<file path=ppt/slides/slide58.xml><?xml version="1.0" encoding="utf-8"?>
 <p:sld xmlns:a="http://schemas.openxmlformats.org/drawingml/2006/main" xmlns:r="http://schemas.openxmlformats.org/officeDocument/2006/relationships" xmlns:p="http://schemas.openxmlformats.org/presentationml/2006/main">
   <p:cSld>
     <p:spTree>
@@ -34752,129 +34939,6 @@
 </p:sld>
 </file>
 
-<file path=ppt/slides/slide58.xml><?xml version="1.0" encoding="utf-8"?>
-<p:sld xmlns:a="http://schemas.openxmlformats.org/drawingml/2006/main" xmlns:r="http://schemas.openxmlformats.org/officeDocument/2006/relationships" xmlns:p="http://schemas.openxmlformats.org/presentationml/2006/main">
-  <p:cSld>
-    <p:spTree>
-      <p:nvGrpSpPr>
-        <p:cNvPr id="1" name=""/>
-        <p:cNvGrpSpPr/>
-        <p:nvPr/>
-      </p:nvGrpSpPr>
-      <p:grpSpPr>
-        <a:xfrm>
-          <a:off x="0" y="0"/>
-          <a:ext cx="0" cy="0"/>
-          <a:chOff x="0" y="0"/>
-          <a:chExt cx="0" cy="0"/>
-        </a:xfrm>
-      </p:grpSpPr>
-      <p:sp>
-        <p:nvSpPr>
-          <p:cNvPr id="2" name="Title 1"/>
-          <p:cNvSpPr>
-            <a:spLocks noGrp="1"/>
-          </p:cNvSpPr>
-          <p:nvPr>
-            <p:ph type="title"/>
-          </p:nvPr>
-        </p:nvSpPr>
-        <p:spPr/>
-        <p:txBody>
-          <a:bodyPr/>
-          <a:lstStyle/>
-          <a:p>
-            <a:r>
-              <a:rPr lang="en-US" dirty="0" err="1" smtClean="0"/>
-              <a:t>gdb</a:t>
-            </a:r>
-            <a:r>
-              <a:rPr lang="en-US" dirty="0" smtClean="0"/>
-              <a:t>: checkpoint</a:t>
-            </a:r>
-            <a:endParaRPr lang="nl-BE" dirty="0"/>
-          </a:p>
-        </p:txBody>
-      </p:sp>
-      <p:sp>
-        <p:nvSpPr>
-          <p:cNvPr id="3" name="Content Placeholder 2"/>
-          <p:cNvSpPr>
-            <a:spLocks noGrp="1"/>
-          </p:cNvSpPr>
-          <p:nvPr>
-            <p:ph idx="1"/>
-          </p:nvPr>
-        </p:nvSpPr>
-        <p:spPr/>
-        <p:txBody>
-          <a:bodyPr/>
-          <a:lstStyle/>
-          <a:p>
-            <a:r>
-              <a:rPr lang="en-US" dirty="0" smtClean="0"/>
-              <a:t>Checkpoints can be used to restart program from previous state</a:t>
-            </a:r>
-            <a:endParaRPr lang="nl-BE" dirty="0" smtClean="0"/>
-          </a:p>
-          <a:p>
-            <a:r>
-              <a:rPr lang="en-US" dirty="0" smtClean="0"/>
-              <a:t>create checkpoint:</a:t>
-            </a:r>
-            <a:br>
-              <a:rPr lang="en-US" dirty="0" smtClean="0"/>
-            </a:br>
-            <a:r>
-              <a:rPr lang="en-US" dirty="0" smtClean="0">
-                <a:latin typeface="Courier New" pitchFamily="49" charset="0"/>
-                <a:cs typeface="Courier New" pitchFamily="49" charset="0"/>
-              </a:rPr>
-              <a:t>checkpoint</a:t>
-            </a:r>
-          </a:p>
-          <a:p>
-            <a:r>
-              <a:rPr lang="en-US" dirty="0" smtClean="0"/>
-              <a:t>Restart from that point:</a:t>
-            </a:r>
-            <a:br>
-              <a:rPr lang="en-US" dirty="0" smtClean="0"/>
-            </a:br>
-            <a:r>
-              <a:rPr lang="en-US" dirty="0" smtClean="0">
-                <a:latin typeface="Courier New" pitchFamily="49" charset="0"/>
-                <a:cs typeface="Courier New" pitchFamily="49" charset="0"/>
-              </a:rPr>
-              <a:t>restart &lt;checkpoint-id&gt;</a:t>
-            </a:r>
-            <a:endParaRPr lang="en-US" dirty="0">
-              <a:latin typeface="Courier New" pitchFamily="49" charset="0"/>
-              <a:cs typeface="Courier New" pitchFamily="49" charset="0"/>
-            </a:endParaRPr>
-          </a:p>
-        </p:txBody>
-      </p:sp>
-    </p:spTree>
-    <p:extLst>
-      <p:ext uri="{BB962C8B-B14F-4D97-AF65-F5344CB8AC3E}">
-        <p14:creationId xmlns:p14="http://schemas.microsoft.com/office/powerpoint/2010/main" val="4125269110"/>
-      </p:ext>
-    </p:extLst>
-  </p:cSld>
-  <p:clrMapOvr>
-    <a:masterClrMapping/>
-  </p:clrMapOvr>
-  <p:timing>
-    <p:tnLst>
-      <p:par>
-        <p:cTn id="1" dur="indefinite" restart="never" nodeType="tmRoot"/>
-      </p:par>
-    </p:tnLst>
-  </p:timing>
-</p:sld>
-</file>
-
 <file path=ppt/slides/slide59.xml><?xml version="1.0" encoding="utf-8"?>
 <p:sld xmlns:a="http://schemas.openxmlformats.org/drawingml/2006/main" xmlns:r="http://schemas.openxmlformats.org/officeDocument/2006/relationships" xmlns:p="http://schemas.openxmlformats.org/presentationml/2006/main">
   <p:cSld>
@@ -34908,21 +34972,25 @@
           <a:lstStyle/>
           <a:p>
             <a:r>
+              <a:rPr lang="en-US" dirty="0" err="1" smtClean="0"/>
+              <a:t>gdb</a:t>
+            </a:r>
+            <a:r>
               <a:rPr lang="en-US" dirty="0" smtClean="0"/>
-              <a:t>valgrind</a:t>
-            </a:r>
-            <a:endParaRPr lang="en-US" dirty="0"/>
+              <a:t>: checkpoint</a:t>
+            </a:r>
+            <a:endParaRPr lang="nl-BE" dirty="0"/>
           </a:p>
         </p:txBody>
       </p:sp>
       <p:sp>
         <p:nvSpPr>
-          <p:cNvPr id="3" name="Text Placeholder 2"/>
+          <p:cNvPr id="3" name="Content Placeholder 2"/>
           <p:cNvSpPr>
             <a:spLocks noGrp="1"/>
           </p:cNvSpPr>
           <p:nvPr>
-            <p:ph type="body" idx="1"/>
+            <p:ph idx="1"/>
           </p:nvPr>
         </p:nvSpPr>
         <p:spPr/>
@@ -34930,14 +34998,54 @@
           <a:bodyPr/>
           <a:lstStyle/>
           <a:p>
-            <a:endParaRPr lang="en-US"/>
+            <a:r>
+              <a:rPr lang="en-US" dirty="0" smtClean="0"/>
+              <a:t>Checkpoints can be used to restart program from previous state</a:t>
+            </a:r>
+            <a:endParaRPr lang="nl-BE" dirty="0" smtClean="0"/>
+          </a:p>
+          <a:p>
+            <a:r>
+              <a:rPr lang="en-US" dirty="0" smtClean="0"/>
+              <a:t>create checkpoint:</a:t>
+            </a:r>
+            <a:br>
+              <a:rPr lang="en-US" dirty="0" smtClean="0"/>
+            </a:br>
+            <a:r>
+              <a:rPr lang="en-US" dirty="0" smtClean="0">
+                <a:latin typeface="Courier New" pitchFamily="49" charset="0"/>
+                <a:cs typeface="Courier New" pitchFamily="49" charset="0"/>
+              </a:rPr>
+              <a:t>checkpoint</a:t>
+            </a:r>
+          </a:p>
+          <a:p>
+            <a:r>
+              <a:rPr lang="en-US" dirty="0" smtClean="0"/>
+              <a:t>Restart from that point:</a:t>
+            </a:r>
+            <a:br>
+              <a:rPr lang="en-US" dirty="0" smtClean="0"/>
+            </a:br>
+            <a:r>
+              <a:rPr lang="en-US" dirty="0" smtClean="0">
+                <a:latin typeface="Courier New" pitchFamily="49" charset="0"/>
+                <a:cs typeface="Courier New" pitchFamily="49" charset="0"/>
+              </a:rPr>
+              <a:t>restart &lt;checkpoint-id&gt;</a:t>
+            </a:r>
+            <a:endParaRPr lang="en-US" dirty="0">
+              <a:latin typeface="Courier New" pitchFamily="49" charset="0"/>
+              <a:cs typeface="Courier New" pitchFamily="49" charset="0"/>
+            </a:endParaRPr>
           </a:p>
         </p:txBody>
       </p:sp>
     </p:spTree>
     <p:extLst>
       <p:ext uri="{BB962C8B-B14F-4D97-AF65-F5344CB8AC3E}">
-        <p14:creationId xmlns:p14="http://schemas.microsoft.com/office/powerpoint/2010/main" val="3137797742"/>
+        <p14:creationId xmlns:p14="http://schemas.microsoft.com/office/powerpoint/2010/main" val="4125269110"/>
       </p:ext>
     </p:extLst>
   </p:cSld>
@@ -35499,6 +35607,85 @@
           <a:p>
             <a:r>
               <a:rPr lang="en-US" dirty="0" smtClean="0"/>
+              <a:t>valgrind</a:t>
+            </a:r>
+            <a:endParaRPr lang="en-US" dirty="0"/>
+          </a:p>
+        </p:txBody>
+      </p:sp>
+      <p:sp>
+        <p:nvSpPr>
+          <p:cNvPr id="3" name="Text Placeholder 2"/>
+          <p:cNvSpPr>
+            <a:spLocks noGrp="1"/>
+          </p:cNvSpPr>
+          <p:nvPr>
+            <p:ph type="body" idx="1"/>
+          </p:nvPr>
+        </p:nvSpPr>
+        <p:spPr/>
+        <p:txBody>
+          <a:bodyPr/>
+          <a:lstStyle/>
+          <a:p>
+            <a:endParaRPr lang="en-US"/>
+          </a:p>
+        </p:txBody>
+      </p:sp>
+    </p:spTree>
+    <p:extLst>
+      <p:ext uri="{BB962C8B-B14F-4D97-AF65-F5344CB8AC3E}">
+        <p14:creationId xmlns:p14="http://schemas.microsoft.com/office/powerpoint/2010/main" val="3137797742"/>
+      </p:ext>
+    </p:extLst>
+  </p:cSld>
+  <p:clrMapOvr>
+    <a:masterClrMapping/>
+  </p:clrMapOvr>
+  <p:timing>
+    <p:tnLst>
+      <p:par>
+        <p:cTn id="1" dur="indefinite" restart="never" nodeType="tmRoot"/>
+      </p:par>
+    </p:tnLst>
+  </p:timing>
+</p:sld>
+</file>
+
+<file path=ppt/slides/slide61.xml><?xml version="1.0" encoding="utf-8"?>
+<p:sld xmlns:a="http://schemas.openxmlformats.org/drawingml/2006/main" xmlns:r="http://schemas.openxmlformats.org/officeDocument/2006/relationships" xmlns:p="http://schemas.openxmlformats.org/presentationml/2006/main">
+  <p:cSld>
+    <p:spTree>
+      <p:nvGrpSpPr>
+        <p:cNvPr id="1" name=""/>
+        <p:cNvGrpSpPr/>
+        <p:nvPr/>
+      </p:nvGrpSpPr>
+      <p:grpSpPr>
+        <a:xfrm>
+          <a:off x="0" y="0"/>
+          <a:ext cx="0" cy="0"/>
+          <a:chOff x="0" y="0"/>
+          <a:chExt cx="0" cy="0"/>
+        </a:xfrm>
+      </p:grpSpPr>
+      <p:sp>
+        <p:nvSpPr>
+          <p:cNvPr id="2" name="Title 1"/>
+          <p:cNvSpPr>
+            <a:spLocks noGrp="1"/>
+          </p:cNvSpPr>
+          <p:nvPr>
+            <p:ph type="title"/>
+          </p:nvPr>
+        </p:nvSpPr>
+        <p:spPr/>
+        <p:txBody>
+          <a:bodyPr/>
+          <a:lstStyle/>
+          <a:p>
+            <a:r>
+              <a:rPr lang="en-US" dirty="0" smtClean="0"/>
               <a:t>Valgrind: what is it?</a:t>
             </a:r>
             <a:endParaRPr lang="en-US" dirty="0"/>
@@ -35604,7 +35791,7 @@
 </p:sld>
 </file>
 
-<file path=ppt/slides/slide61.xml><?xml version="1.0" encoding="utf-8"?>
+<file path=ppt/slides/slide62.xml><?xml version="1.0" encoding="utf-8"?>
 <p:sld xmlns:a="http://schemas.openxmlformats.org/drawingml/2006/main" xmlns:r="http://schemas.openxmlformats.org/officeDocument/2006/relationships" xmlns:p="http://schemas.openxmlformats.org/presentationml/2006/main">
   <p:cSld>
     <p:spTree>
@@ -36331,7 +36518,7 @@
 </p:sld>
 </file>
 
-<file path=ppt/slides/slide62.xml><?xml version="1.0" encoding="utf-8"?>
+<file path=ppt/slides/slide63.xml><?xml version="1.0" encoding="utf-8"?>
 <p:sld xmlns:a="http://schemas.openxmlformats.org/drawingml/2006/main" xmlns:r="http://schemas.openxmlformats.org/officeDocument/2006/relationships" xmlns:p="http://schemas.openxmlformats.org/presentationml/2006/main">
   <p:cSld>
     <p:spTree>
@@ -36759,7 +36946,7 @@
 </p:sld>
 </file>
 
-<file path=ppt/slides/slide63.xml><?xml version="1.0" encoding="utf-8"?>
+<file path=ppt/slides/slide64.xml><?xml version="1.0" encoding="utf-8"?>
 <p:sld xmlns:a="http://schemas.openxmlformats.org/drawingml/2006/main" xmlns:r="http://schemas.openxmlformats.org/officeDocument/2006/relationships" xmlns:p="http://schemas.openxmlformats.org/presentationml/2006/main">
   <p:cSld>
     <p:spTree>
@@ -37245,7 +37432,7 @@
 </p:sld>
 </file>
 
-<file path=ppt/slides/slide64.xml><?xml version="1.0" encoding="utf-8"?>
+<file path=ppt/slides/slide65.xml><?xml version="1.0" encoding="utf-8"?>
 <p:sld xmlns:a="http://schemas.openxmlformats.org/drawingml/2006/main" xmlns:r="http://schemas.openxmlformats.org/officeDocument/2006/relationships" xmlns:p="http://schemas.openxmlformats.org/presentationml/2006/main">
   <p:cSld>
     <p:spTree>
@@ -37977,7 +38164,7 @@
 </p:sld>
 </file>
 
-<file path=ppt/slides/slide65.xml><?xml version="1.0" encoding="utf-8"?>
+<file path=ppt/slides/slide66.xml><?xml version="1.0" encoding="utf-8"?>
 <p:sld xmlns:a="http://schemas.openxmlformats.org/drawingml/2006/main" xmlns:r="http://schemas.openxmlformats.org/officeDocument/2006/relationships" xmlns:p="http://schemas.openxmlformats.org/presentationml/2006/main">
   <p:cSld>
     <p:spTree>
@@ -38252,7 +38439,7 @@
 </p:sld>
 </file>
 
-<file path=ppt/slides/slide66.xml><?xml version="1.0" encoding="utf-8"?>
+<file path=ppt/slides/slide67.xml><?xml version="1.0" encoding="utf-8"?>
 <p:sld xmlns:a="http://schemas.openxmlformats.org/drawingml/2006/main" xmlns:r="http://schemas.openxmlformats.org/officeDocument/2006/relationships" xmlns:p="http://schemas.openxmlformats.org/presentationml/2006/main">
   <p:cSld>
     <p:spTree>
@@ -38994,7 +39181,7 @@
 </p:sld>
 </file>
 
-<file path=ppt/slides/slide67.xml><?xml version="1.0" encoding="utf-8"?>
+<file path=ppt/slides/slide68.xml><?xml version="1.0" encoding="utf-8"?>
 <p:sld xmlns:a="http://schemas.openxmlformats.org/drawingml/2006/main" xmlns:r="http://schemas.openxmlformats.org/officeDocument/2006/relationships" xmlns:p="http://schemas.openxmlformats.org/presentationml/2006/main">
   <p:cSld>
     <p:spTree>
@@ -40247,7 +40434,7 @@
 </p:sld>
 </file>
 
-<file path=ppt/slides/slide68.xml><?xml version="1.0" encoding="utf-8"?>
+<file path=ppt/slides/slide69.xml><?xml version="1.0" encoding="utf-8"?>
 <p:sld xmlns:a="http://schemas.openxmlformats.org/drawingml/2006/main" xmlns:r="http://schemas.openxmlformats.org/officeDocument/2006/relationships" xmlns:p="http://schemas.openxmlformats.org/presentationml/2006/main">
   <p:cSld>
     <p:spTree>
@@ -40968,872 +41155,6 @@
     </p:tnLst>
     <p:bldLst>
       <p:bldP spid="9" grpId="0" animBg="1"/>
-    </p:bldLst>
-  </p:timing>
-</p:sld>
-</file>
-
-<file path=ppt/slides/slide69.xml><?xml version="1.0" encoding="utf-8"?>
-<p:sld xmlns:a="http://schemas.openxmlformats.org/drawingml/2006/main" xmlns:r="http://schemas.openxmlformats.org/officeDocument/2006/relationships" xmlns:p="http://schemas.openxmlformats.org/presentationml/2006/main">
-  <p:cSld>
-    <p:spTree>
-      <p:nvGrpSpPr>
-        <p:cNvPr id="1" name=""/>
-        <p:cNvGrpSpPr/>
-        <p:nvPr/>
-      </p:nvGrpSpPr>
-      <p:grpSpPr>
-        <a:xfrm>
-          <a:off x="0" y="0"/>
-          <a:ext cx="0" cy="0"/>
-          <a:chOff x="0" y="0"/>
-          <a:chExt cx="0" cy="0"/>
-        </a:xfrm>
-      </p:grpSpPr>
-      <p:sp>
-        <p:nvSpPr>
-          <p:cNvPr id="2" name="Title 1"/>
-          <p:cNvSpPr>
-            <a:spLocks noGrp="1"/>
-          </p:cNvSpPr>
-          <p:nvPr>
-            <p:ph type="title"/>
-          </p:nvPr>
-        </p:nvSpPr>
-        <p:spPr/>
-        <p:txBody>
-          <a:bodyPr>
-            <a:normAutofit/>
-          </a:bodyPr>
-          <a:lstStyle/>
-          <a:p>
-            <a:r>
-              <a:rPr lang="en-US" dirty="0" smtClean="0"/>
-              <a:t>Valgrind: more subtle</a:t>
-            </a:r>
-            <a:endParaRPr lang="en-US" dirty="0"/>
-          </a:p>
-        </p:txBody>
-      </p:sp>
-      <p:grpSp>
-        <p:nvGrpSpPr>
-          <p:cNvPr id="3" name="Group 4"/>
-          <p:cNvGrpSpPr/>
-          <p:nvPr/>
-        </p:nvGrpSpPr>
-        <p:grpSpPr>
-          <a:xfrm>
-            <a:off x="128995" y="1681063"/>
-            <a:ext cx="4875053" cy="3539430"/>
-            <a:chOff x="755576" y="1655004"/>
-            <a:chExt cx="4875053" cy="3539430"/>
-          </a:xfrm>
-        </p:grpSpPr>
-        <p:sp>
-          <p:nvSpPr>
-            <p:cNvPr id="4" name="TextBox 3"/>
-            <p:cNvSpPr txBox="1"/>
-            <p:nvPr/>
-          </p:nvSpPr>
-          <p:spPr>
-            <a:xfrm>
-              <a:off x="755576" y="1655004"/>
-              <a:ext cx="4875053" cy="3539430"/>
-            </a:xfrm>
-            <a:prstGeom prst="rect">
-              <a:avLst/>
-            </a:prstGeom>
-            <a:solidFill>
-              <a:schemeClr val="bg1">
-                <a:lumMod val="85000"/>
-              </a:schemeClr>
-            </a:solidFill>
-            <a:ln>
-              <a:solidFill>
-                <a:schemeClr val="tx1"/>
-              </a:solidFill>
-            </a:ln>
-          </p:spPr>
-          <p:txBody>
-            <a:bodyPr wrap="none" rtlCol="0">
-              <a:spAutoFit/>
-            </a:bodyPr>
-            <a:lstStyle/>
-            <a:p>
-              <a:r>
-                <a:rPr lang="en-US" sz="1600" dirty="0" smtClean="0">
-                  <a:latin typeface="Courier New" pitchFamily="49" charset="0"/>
-                  <a:cs typeface="Courier New" pitchFamily="49" charset="0"/>
-                </a:rPr>
-                <a:t> 1 #include &lt;</a:t>
-              </a:r>
-              <a:r>
-                <a:rPr lang="en-US" sz="1600" dirty="0" err="1" smtClean="0">
-                  <a:latin typeface="Courier New" pitchFamily="49" charset="0"/>
-                  <a:cs typeface="Courier New" pitchFamily="49" charset="0"/>
-                </a:rPr>
-                <a:t>math.h</a:t>
-              </a:r>
-              <a:r>
-                <a:rPr lang="en-US" sz="1600" dirty="0" smtClean="0">
-                  <a:latin typeface="Courier New" pitchFamily="49" charset="0"/>
-                  <a:cs typeface="Courier New" pitchFamily="49" charset="0"/>
-                </a:rPr>
-                <a:t>&gt;</a:t>
-              </a:r>
-            </a:p>
-            <a:p>
-              <a:r>
-                <a:rPr lang="en-US" sz="1600" dirty="0" smtClean="0">
-                  <a:latin typeface="Courier New" pitchFamily="49" charset="0"/>
-                  <a:cs typeface="Courier New" pitchFamily="49" charset="0"/>
-                </a:rPr>
-                <a:t> 2 #include &lt;</a:t>
-              </a:r>
-              <a:r>
-                <a:rPr lang="en-US" sz="1600" dirty="0" err="1" smtClean="0">
-                  <a:latin typeface="Courier New" pitchFamily="49" charset="0"/>
-                  <a:cs typeface="Courier New" pitchFamily="49" charset="0"/>
-                </a:rPr>
-                <a:t>stdio.h</a:t>
-              </a:r>
-              <a:r>
-                <a:rPr lang="en-US" sz="1600" dirty="0" smtClean="0">
-                  <a:latin typeface="Courier New" pitchFamily="49" charset="0"/>
-                  <a:cs typeface="Courier New" pitchFamily="49" charset="0"/>
-                </a:rPr>
-                <a:t>&gt;</a:t>
-              </a:r>
-            </a:p>
-            <a:p>
-              <a:r>
-                <a:rPr lang="en-US" sz="1600" dirty="0" smtClean="0">
-                  <a:latin typeface="Courier New" pitchFamily="49" charset="0"/>
-                  <a:cs typeface="Courier New" pitchFamily="49" charset="0"/>
-                </a:rPr>
-                <a:t> 3 #include &lt;</a:t>
-              </a:r>
-              <a:r>
-                <a:rPr lang="en-US" sz="1600" dirty="0" err="1" smtClean="0">
-                  <a:latin typeface="Courier New" pitchFamily="49" charset="0"/>
-                  <a:cs typeface="Courier New" pitchFamily="49" charset="0"/>
-                </a:rPr>
-                <a:t>stdlib.h</a:t>
-              </a:r>
-              <a:r>
-                <a:rPr lang="en-US" sz="1600" dirty="0" smtClean="0">
-                  <a:latin typeface="Courier New" pitchFamily="49" charset="0"/>
-                  <a:cs typeface="Courier New" pitchFamily="49" charset="0"/>
-                </a:rPr>
-                <a:t>&gt;</a:t>
-              </a:r>
-            </a:p>
-            <a:p>
-              <a:r>
-                <a:rPr lang="en-US" sz="1600" dirty="0" smtClean="0">
-                  <a:latin typeface="Courier New" pitchFamily="49" charset="0"/>
-                  <a:cs typeface="Courier New" pitchFamily="49" charset="0"/>
-                </a:rPr>
-                <a:t> 4</a:t>
-              </a:r>
-            </a:p>
-            <a:p>
-              <a:r>
-                <a:rPr lang="en-US" sz="1600" dirty="0" smtClean="0">
-                  <a:latin typeface="Courier New" pitchFamily="49" charset="0"/>
-                  <a:cs typeface="Courier New" pitchFamily="49" charset="0"/>
-                </a:rPr>
-                <a:t> 5 </a:t>
-              </a:r>
-              <a:r>
-                <a:rPr lang="en-US" sz="1600" dirty="0" err="1" smtClean="0">
-                  <a:latin typeface="Courier New" pitchFamily="49" charset="0"/>
-                  <a:cs typeface="Courier New" pitchFamily="49" charset="0"/>
-                </a:rPr>
-                <a:t>int</a:t>
-              </a:r>
-              <a:r>
-                <a:rPr lang="en-US" sz="1600" dirty="0" smtClean="0">
-                  <a:latin typeface="Courier New" pitchFamily="49" charset="0"/>
-                  <a:cs typeface="Courier New" pitchFamily="49" charset="0"/>
-                </a:rPr>
-                <a:t> main(</a:t>
-              </a:r>
-              <a:r>
-                <a:rPr lang="en-US" sz="1600" dirty="0" err="1" smtClean="0">
-                  <a:latin typeface="Courier New" pitchFamily="49" charset="0"/>
-                  <a:cs typeface="Courier New" pitchFamily="49" charset="0"/>
-                </a:rPr>
-                <a:t>int</a:t>
-              </a:r>
-              <a:r>
-                <a:rPr lang="en-US" sz="1600" dirty="0" smtClean="0">
-                  <a:latin typeface="Courier New" pitchFamily="49" charset="0"/>
-                  <a:cs typeface="Courier New" pitchFamily="49" charset="0"/>
-                </a:rPr>
-                <a:t> </a:t>
-              </a:r>
-              <a:r>
-                <a:rPr lang="en-US" sz="1600" dirty="0" err="1" smtClean="0">
-                  <a:latin typeface="Courier New" pitchFamily="49" charset="0"/>
-                  <a:cs typeface="Courier New" pitchFamily="49" charset="0"/>
-                </a:rPr>
-                <a:t>argc</a:t>
-              </a:r>
-              <a:r>
-                <a:rPr lang="en-US" sz="1600" dirty="0" smtClean="0">
-                  <a:latin typeface="Courier New" pitchFamily="49" charset="0"/>
-                  <a:cs typeface="Courier New" pitchFamily="49" charset="0"/>
-                </a:rPr>
-                <a:t>, char *</a:t>
-              </a:r>
-              <a:r>
-                <a:rPr lang="en-US" sz="1600" dirty="0" err="1" smtClean="0">
-                  <a:latin typeface="Courier New" pitchFamily="49" charset="0"/>
-                  <a:cs typeface="Courier New" pitchFamily="49" charset="0"/>
-                </a:rPr>
-                <a:t>argv</a:t>
-              </a:r>
-              <a:r>
-                <a:rPr lang="en-US" sz="1600" dirty="0" smtClean="0">
-                  <a:latin typeface="Courier New" pitchFamily="49" charset="0"/>
-                  <a:cs typeface="Courier New" pitchFamily="49" charset="0"/>
-                </a:rPr>
-                <a:t>[]) {</a:t>
-              </a:r>
-            </a:p>
-            <a:p>
-              <a:r>
-                <a:rPr lang="en-US" sz="1600" dirty="0" smtClean="0">
-                  <a:latin typeface="Courier New" pitchFamily="49" charset="0"/>
-                  <a:cs typeface="Courier New" pitchFamily="49" charset="0"/>
-                </a:rPr>
-                <a:t> 6     double a[10], sum;</a:t>
-              </a:r>
-            </a:p>
-            <a:p>
-              <a:r>
-                <a:rPr lang="en-US" sz="1600" dirty="0" smtClean="0">
-                  <a:latin typeface="Courier New" pitchFamily="49" charset="0"/>
-                  <a:cs typeface="Courier New" pitchFamily="49" charset="0"/>
-                </a:rPr>
-                <a:t> 7     </a:t>
-              </a:r>
-              <a:r>
-                <a:rPr lang="en-US" sz="1600" dirty="0" err="1" smtClean="0">
-                  <a:latin typeface="Courier New" pitchFamily="49" charset="0"/>
-                  <a:cs typeface="Courier New" pitchFamily="49" charset="0"/>
-                </a:rPr>
-                <a:t>int</a:t>
-              </a:r>
-              <a:r>
-                <a:rPr lang="en-US" sz="1600" dirty="0" smtClean="0">
-                  <a:latin typeface="Courier New" pitchFamily="49" charset="0"/>
-                  <a:cs typeface="Courier New" pitchFamily="49" charset="0"/>
-                </a:rPr>
-                <a:t> </a:t>
-              </a:r>
-              <a:r>
-                <a:rPr lang="en-US" sz="1600" dirty="0" err="1" smtClean="0">
-                  <a:latin typeface="Courier New" pitchFamily="49" charset="0"/>
-                  <a:cs typeface="Courier New" pitchFamily="49" charset="0"/>
-                </a:rPr>
-                <a:t>i</a:t>
-              </a:r>
-              <a:r>
-                <a:rPr lang="en-US" sz="1600" dirty="0" smtClean="0">
-                  <a:latin typeface="Courier New" pitchFamily="49" charset="0"/>
-                  <a:cs typeface="Courier New" pitchFamily="49" charset="0"/>
-                </a:rPr>
-                <a:t>;</a:t>
-              </a:r>
-            </a:p>
-            <a:p>
-              <a:r>
-                <a:rPr lang="en-US" sz="1600" dirty="0" smtClean="0">
-                  <a:latin typeface="Courier New" pitchFamily="49" charset="0"/>
-                  <a:cs typeface="Courier New" pitchFamily="49" charset="0"/>
-                </a:rPr>
-                <a:t> 8     for (</a:t>
-              </a:r>
-              <a:r>
-                <a:rPr lang="en-US" sz="1600" dirty="0" err="1" smtClean="0">
-                  <a:latin typeface="Courier New" pitchFamily="49" charset="0"/>
-                  <a:cs typeface="Courier New" pitchFamily="49" charset="0"/>
-                </a:rPr>
-                <a:t>i</a:t>
-              </a:r>
-              <a:r>
-                <a:rPr lang="en-US" sz="1600" dirty="0" smtClean="0">
-                  <a:latin typeface="Courier New" pitchFamily="49" charset="0"/>
-                  <a:cs typeface="Courier New" pitchFamily="49" charset="0"/>
-                </a:rPr>
-                <a:t> = 0; </a:t>
-              </a:r>
-              <a:r>
-                <a:rPr lang="en-US" sz="1600" dirty="0" err="1" smtClean="0">
-                  <a:latin typeface="Courier New" pitchFamily="49" charset="0"/>
-                  <a:cs typeface="Courier New" pitchFamily="49" charset="0"/>
-                </a:rPr>
-                <a:t>i</a:t>
-              </a:r>
-              <a:r>
-                <a:rPr lang="en-US" sz="1600" dirty="0" smtClean="0">
-                  <a:latin typeface="Courier New" pitchFamily="49" charset="0"/>
-                  <a:cs typeface="Courier New" pitchFamily="49" charset="0"/>
-                </a:rPr>
-                <a:t> &lt;= 10; </a:t>
-              </a:r>
-              <a:r>
-                <a:rPr lang="en-US" sz="1600" dirty="0" err="1" smtClean="0">
-                  <a:latin typeface="Courier New" pitchFamily="49" charset="0"/>
-                  <a:cs typeface="Courier New" pitchFamily="49" charset="0"/>
-                </a:rPr>
-                <a:t>i</a:t>
-              </a:r>
-              <a:r>
-                <a:rPr lang="en-US" sz="1600" dirty="0" smtClean="0">
-                  <a:latin typeface="Courier New" pitchFamily="49" charset="0"/>
-                  <a:cs typeface="Courier New" pitchFamily="49" charset="0"/>
-                </a:rPr>
-                <a:t>++)</a:t>
-              </a:r>
-            </a:p>
-            <a:p>
-              <a:r>
-                <a:rPr lang="en-US" sz="1600" dirty="0" smtClean="0">
-                  <a:latin typeface="Courier New" pitchFamily="49" charset="0"/>
-                  <a:cs typeface="Courier New" pitchFamily="49" charset="0"/>
-                </a:rPr>
-                <a:t> 9         a[</a:t>
-              </a:r>
-              <a:r>
-                <a:rPr lang="en-US" sz="1600" dirty="0" err="1" smtClean="0">
-                  <a:latin typeface="Courier New" pitchFamily="49" charset="0"/>
-                  <a:cs typeface="Courier New" pitchFamily="49" charset="0"/>
-                </a:rPr>
-                <a:t>i</a:t>
-              </a:r>
-              <a:r>
-                <a:rPr lang="en-US" sz="1600" dirty="0" smtClean="0">
-                  <a:latin typeface="Courier New" pitchFamily="49" charset="0"/>
-                  <a:cs typeface="Courier New" pitchFamily="49" charset="0"/>
-                </a:rPr>
-                <a:t>] = </a:t>
-              </a:r>
-              <a:r>
-                <a:rPr lang="en-US" sz="1600" dirty="0" err="1" smtClean="0">
-                  <a:latin typeface="Courier New" pitchFamily="49" charset="0"/>
-                  <a:cs typeface="Courier New" pitchFamily="49" charset="0"/>
-                </a:rPr>
-                <a:t>sqrt</a:t>
-              </a:r>
-              <a:r>
-                <a:rPr lang="en-US" sz="1600" dirty="0" smtClean="0">
-                  <a:latin typeface="Courier New" pitchFamily="49" charset="0"/>
-                  <a:cs typeface="Courier New" pitchFamily="49" charset="0"/>
-                </a:rPr>
-                <a:t>(</a:t>
-              </a:r>
-              <a:r>
-                <a:rPr lang="en-US" sz="1600" dirty="0" err="1" smtClean="0">
-                  <a:latin typeface="Courier New" pitchFamily="49" charset="0"/>
-                  <a:cs typeface="Courier New" pitchFamily="49" charset="0"/>
-                </a:rPr>
-                <a:t>i</a:t>
-              </a:r>
-              <a:r>
-                <a:rPr lang="en-US" sz="1600" dirty="0" smtClean="0">
-                  <a:latin typeface="Courier New" pitchFamily="49" charset="0"/>
-                  <a:cs typeface="Courier New" pitchFamily="49" charset="0"/>
-                </a:rPr>
-                <a:t>);</a:t>
-              </a:r>
-            </a:p>
-            <a:p>
-              <a:r>
-                <a:rPr lang="en-US" sz="1600" dirty="0" smtClean="0">
-                  <a:latin typeface="Courier New" pitchFamily="49" charset="0"/>
-                  <a:cs typeface="Courier New" pitchFamily="49" charset="0"/>
-                </a:rPr>
-                <a:t>10     for (</a:t>
-              </a:r>
-              <a:r>
-                <a:rPr lang="en-US" sz="1600" dirty="0" err="1" smtClean="0">
-                  <a:latin typeface="Courier New" pitchFamily="49" charset="0"/>
-                  <a:cs typeface="Courier New" pitchFamily="49" charset="0"/>
-                </a:rPr>
-                <a:t>i</a:t>
-              </a:r>
-              <a:r>
-                <a:rPr lang="en-US" sz="1600" dirty="0" smtClean="0">
-                  <a:latin typeface="Courier New" pitchFamily="49" charset="0"/>
-                  <a:cs typeface="Courier New" pitchFamily="49" charset="0"/>
-                </a:rPr>
-                <a:t> = 0; </a:t>
-              </a:r>
-              <a:r>
-                <a:rPr lang="en-US" sz="1600" dirty="0" err="1" smtClean="0">
-                  <a:latin typeface="Courier New" pitchFamily="49" charset="0"/>
-                  <a:cs typeface="Courier New" pitchFamily="49" charset="0"/>
-                </a:rPr>
-                <a:t>i</a:t>
-              </a:r>
-              <a:r>
-                <a:rPr lang="en-US" sz="1600" dirty="0" smtClean="0">
-                  <a:latin typeface="Courier New" pitchFamily="49" charset="0"/>
-                  <a:cs typeface="Courier New" pitchFamily="49" charset="0"/>
-                </a:rPr>
-                <a:t> &lt; 10; </a:t>
-              </a:r>
-              <a:r>
-                <a:rPr lang="en-US" sz="1600" dirty="0" err="1" smtClean="0">
-                  <a:latin typeface="Courier New" pitchFamily="49" charset="0"/>
-                  <a:cs typeface="Courier New" pitchFamily="49" charset="0"/>
-                </a:rPr>
-                <a:t>i</a:t>
-              </a:r>
-              <a:r>
-                <a:rPr lang="en-US" sz="1600" dirty="0" smtClean="0">
-                  <a:latin typeface="Courier New" pitchFamily="49" charset="0"/>
-                  <a:cs typeface="Courier New" pitchFamily="49" charset="0"/>
-                </a:rPr>
-                <a:t>++)</a:t>
-              </a:r>
-            </a:p>
-            <a:p>
-              <a:r>
-                <a:rPr lang="en-US" sz="1600" dirty="0" smtClean="0">
-                  <a:latin typeface="Courier New" pitchFamily="49" charset="0"/>
-                  <a:cs typeface="Courier New" pitchFamily="49" charset="0"/>
-                </a:rPr>
-                <a:t>11         sum += a[</a:t>
-              </a:r>
-              <a:r>
-                <a:rPr lang="en-US" sz="1600" dirty="0" err="1" smtClean="0">
-                  <a:latin typeface="Courier New" pitchFamily="49" charset="0"/>
-                  <a:cs typeface="Courier New" pitchFamily="49" charset="0"/>
-                </a:rPr>
-                <a:t>i</a:t>
-              </a:r>
-              <a:r>
-                <a:rPr lang="en-US" sz="1600" dirty="0" smtClean="0">
-                  <a:latin typeface="Courier New" pitchFamily="49" charset="0"/>
-                  <a:cs typeface="Courier New" pitchFamily="49" charset="0"/>
-                </a:rPr>
-                <a:t>];</a:t>
-              </a:r>
-            </a:p>
-            <a:p>
-              <a:r>
-                <a:rPr lang="en-US" sz="1600" dirty="0" smtClean="0">
-                  <a:latin typeface="Courier New" pitchFamily="49" charset="0"/>
-                  <a:cs typeface="Courier New" pitchFamily="49" charset="0"/>
-                </a:rPr>
-                <a:t>12     </a:t>
-              </a:r>
-              <a:r>
-                <a:rPr lang="en-US" sz="1600" dirty="0" err="1" smtClean="0">
-                  <a:latin typeface="Courier New" pitchFamily="49" charset="0"/>
-                  <a:cs typeface="Courier New" pitchFamily="49" charset="0"/>
-                </a:rPr>
-                <a:t>printf</a:t>
-              </a:r>
-              <a:r>
-                <a:rPr lang="en-US" sz="1600" dirty="0" smtClean="0">
-                  <a:latin typeface="Courier New" pitchFamily="49" charset="0"/>
-                  <a:cs typeface="Courier New" pitchFamily="49" charset="0"/>
-                </a:rPr>
-                <a:t>("sum = %lf\n", sum);</a:t>
-              </a:r>
-            </a:p>
-            <a:p>
-              <a:r>
-                <a:rPr lang="en-US" sz="1600" dirty="0" smtClean="0">
-                  <a:latin typeface="Courier New" pitchFamily="49" charset="0"/>
-                  <a:cs typeface="Courier New" pitchFamily="49" charset="0"/>
-                </a:rPr>
-                <a:t>13     return EXIT_SUCCESS;</a:t>
-              </a:r>
-            </a:p>
-            <a:p>
-              <a:r>
-                <a:rPr lang="en-US" sz="1600" dirty="0" smtClean="0">
-                  <a:latin typeface="Courier New" pitchFamily="49" charset="0"/>
-                  <a:cs typeface="Courier New" pitchFamily="49" charset="0"/>
-                </a:rPr>
-                <a:t>14 }</a:t>
-              </a:r>
-            </a:p>
-          </p:txBody>
-        </p:sp>
-        <p:sp>
-          <p:nvSpPr>
-            <p:cNvPr id="5" name="TextBox 4"/>
-            <p:cNvSpPr txBox="1"/>
-            <p:nvPr/>
-          </p:nvSpPr>
-          <p:spPr>
-            <a:xfrm>
-              <a:off x="3942346" y="4886311"/>
-              <a:ext cx="1688283" cy="307777"/>
-            </a:xfrm>
-            <a:prstGeom prst="rect">
-              <a:avLst/>
-            </a:prstGeom>
-            <a:solidFill>
-              <a:schemeClr val="bg1"/>
-            </a:solidFill>
-            <a:ln>
-              <a:solidFill>
-                <a:schemeClr val="tx1"/>
-              </a:solidFill>
-            </a:ln>
-          </p:spPr>
-          <p:txBody>
-            <a:bodyPr wrap="none" rtlCol="0">
-              <a:spAutoFit/>
-            </a:bodyPr>
-            <a:lstStyle/>
-            <a:p>
-              <a:r>
-                <a:rPr lang="en-US" sz="1400" b="1" dirty="0" smtClean="0">
-                  <a:latin typeface="Courier New" pitchFamily="49" charset="0"/>
-                  <a:cs typeface="Courier New" pitchFamily="49" charset="0"/>
-                </a:rPr>
-                <a:t>array-</a:t>
-              </a:r>
-              <a:r>
-                <a:rPr lang="en-US" sz="1400" b="1" dirty="0" err="1" smtClean="0">
-                  <a:latin typeface="Courier New" pitchFamily="49" charset="0"/>
-                  <a:cs typeface="Courier New" pitchFamily="49" charset="0"/>
-                </a:rPr>
-                <a:t>bounds.c</a:t>
-              </a:r>
-              <a:endParaRPr lang="en-US" sz="1400" b="1" dirty="0">
-                <a:latin typeface="Courier New" pitchFamily="49" charset="0"/>
-                <a:cs typeface="Courier New" pitchFamily="49" charset="0"/>
-              </a:endParaRPr>
-            </a:p>
-          </p:txBody>
-        </p:sp>
-      </p:grpSp>
-      <p:sp>
-        <p:nvSpPr>
-          <p:cNvPr id="12" name="TextBox 11"/>
-          <p:cNvSpPr txBox="1"/>
-          <p:nvPr/>
-        </p:nvSpPr>
-        <p:spPr>
-          <a:xfrm>
-            <a:off x="5220072" y="3429000"/>
-            <a:ext cx="3768980" cy="646331"/>
-          </a:xfrm>
-          <a:prstGeom prst="rect">
-            <a:avLst/>
-          </a:prstGeom>
-          <a:noFill/>
-          <a:ln>
-            <a:solidFill>
-              <a:schemeClr val="tx1"/>
-            </a:solidFill>
-          </a:ln>
-        </p:spPr>
-        <p:txBody>
-          <a:bodyPr wrap="none" rtlCol="0">
-            <a:spAutoFit/>
-          </a:bodyPr>
-          <a:lstStyle/>
-          <a:p>
-            <a:r>
-              <a:rPr lang="fr-FR" dirty="0" smtClean="0">
-                <a:latin typeface="Courier New" pitchFamily="49" charset="0"/>
-                <a:cs typeface="Courier New" pitchFamily="49" charset="0"/>
-              </a:rPr>
-              <a:t>octave:1&gt; </a:t>
-            </a:r>
-            <a:r>
-              <a:rPr lang="fr-FR" dirty="0" err="1" smtClean="0">
-                <a:latin typeface="Courier New" pitchFamily="49" charset="0"/>
-                <a:cs typeface="Courier New" pitchFamily="49" charset="0"/>
-              </a:rPr>
-              <a:t>sum</a:t>
-            </a:r>
-            <a:r>
-              <a:rPr lang="fr-FR" dirty="0" smtClean="0">
-                <a:latin typeface="Courier New" pitchFamily="49" charset="0"/>
-                <a:cs typeface="Courier New" pitchFamily="49" charset="0"/>
-              </a:rPr>
-              <a:t>(</a:t>
-            </a:r>
-            <a:r>
-              <a:rPr lang="fr-FR" dirty="0" err="1" smtClean="0">
-                <a:latin typeface="Courier New" pitchFamily="49" charset="0"/>
-                <a:cs typeface="Courier New" pitchFamily="49" charset="0"/>
-              </a:rPr>
-              <a:t>sqrt</a:t>
-            </a:r>
-            <a:r>
-              <a:rPr lang="fr-FR" dirty="0" smtClean="0">
-                <a:latin typeface="Courier New" pitchFamily="49" charset="0"/>
-                <a:cs typeface="Courier New" pitchFamily="49" charset="0"/>
-              </a:rPr>
-              <a:t>([0:9]))</a:t>
-            </a:r>
-          </a:p>
-          <a:p>
-            <a:r>
-              <a:rPr lang="fr-FR" dirty="0" smtClean="0">
-                <a:latin typeface="Courier New" pitchFamily="49" charset="0"/>
-                <a:cs typeface="Courier New" pitchFamily="49" charset="0"/>
-              </a:rPr>
-              <a:t>ans =  19.306</a:t>
-            </a:r>
-          </a:p>
-        </p:txBody>
-      </p:sp>
-      <p:sp>
-        <p:nvSpPr>
-          <p:cNvPr id="13" name="TextBox 12"/>
-          <p:cNvSpPr txBox="1"/>
-          <p:nvPr/>
-        </p:nvSpPr>
-        <p:spPr>
-          <a:xfrm>
-            <a:off x="5978292" y="1916832"/>
-            <a:ext cx="2390398" cy="646331"/>
-          </a:xfrm>
-          <a:prstGeom prst="rect">
-            <a:avLst/>
-          </a:prstGeom>
-          <a:solidFill>
-            <a:schemeClr val="tx2">
-              <a:lumMod val="20000"/>
-              <a:lumOff val="80000"/>
-            </a:schemeClr>
-          </a:solidFill>
-          <a:ln>
-            <a:solidFill>
-              <a:schemeClr val="tx1"/>
-            </a:solidFill>
-          </a:ln>
-        </p:spPr>
-        <p:txBody>
-          <a:bodyPr wrap="none" rtlCol="0">
-            <a:spAutoFit/>
-          </a:bodyPr>
-          <a:lstStyle/>
-          <a:p>
-            <a:r>
-              <a:rPr lang="en-US" dirty="0" smtClean="0">
-                <a:latin typeface="Courier New" pitchFamily="49" charset="0"/>
-                <a:cs typeface="Courier New" pitchFamily="49" charset="0"/>
-              </a:rPr>
-              <a:t>$ ./array-bounds</a:t>
-            </a:r>
-          </a:p>
-          <a:p>
-            <a:r>
-              <a:rPr lang="en-US" dirty="0" smtClean="0">
-                <a:latin typeface="Courier New" pitchFamily="49" charset="0"/>
-                <a:cs typeface="Courier New" pitchFamily="49" charset="0"/>
-              </a:rPr>
-              <a:t>sum = 22.468278</a:t>
-            </a:r>
-          </a:p>
-        </p:txBody>
-      </p:sp>
-      <p:sp>
-        <p:nvSpPr>
-          <p:cNvPr id="14" name="TextBox 13"/>
-          <p:cNvSpPr txBox="1"/>
-          <p:nvPr/>
-        </p:nvSpPr>
-        <p:spPr>
-          <a:xfrm>
-            <a:off x="6804248" y="2636912"/>
-            <a:ext cx="437940" cy="646331"/>
-          </a:xfrm>
-          <a:prstGeom prst="rect">
-            <a:avLst/>
-          </a:prstGeom>
-          <a:noFill/>
-        </p:spPr>
-        <p:txBody>
-          <a:bodyPr wrap="none" rtlCol="0">
-            <a:spAutoFit/>
-          </a:bodyPr>
-          <a:lstStyle/>
-          <a:p>
-            <a:r>
-              <a:rPr lang="en-US" sz="3600" b="1" dirty="0" smtClean="0">
-                <a:sym typeface="Symbol"/>
-              </a:rPr>
-              <a:t></a:t>
-            </a:r>
-            <a:endParaRPr lang="en-US" b="1" dirty="0"/>
-          </a:p>
-        </p:txBody>
-      </p:sp>
-      <p:sp>
-        <p:nvSpPr>
-          <p:cNvPr id="15" name="TextBox 14"/>
-          <p:cNvSpPr txBox="1"/>
-          <p:nvPr/>
-        </p:nvSpPr>
-        <p:spPr>
-          <a:xfrm>
-            <a:off x="7308304" y="2780928"/>
-            <a:ext cx="744563" cy="369332"/>
-          </a:xfrm>
-          <a:prstGeom prst="rect">
-            <a:avLst/>
-          </a:prstGeom>
-          <a:noFill/>
-        </p:spPr>
-        <p:txBody>
-          <a:bodyPr wrap="none" rtlCol="0">
-            <a:spAutoFit/>
-          </a:bodyPr>
-          <a:lstStyle/>
-          <a:p>
-            <a:r>
-              <a:rPr lang="en-US" dirty="0" smtClean="0"/>
-              <a:t>Oops!</a:t>
-            </a:r>
-            <a:endParaRPr lang="en-US" dirty="0"/>
-          </a:p>
-        </p:txBody>
-      </p:sp>
-      <p:sp>
-        <p:nvSpPr>
-          <p:cNvPr id="16" name="TextBox 15"/>
-          <p:cNvSpPr txBox="1"/>
-          <p:nvPr/>
-        </p:nvSpPr>
-        <p:spPr>
-          <a:xfrm>
-            <a:off x="1403648" y="5805264"/>
-            <a:ext cx="6382068" cy="523220"/>
-          </a:xfrm>
-          <a:prstGeom prst="rect">
-            <a:avLst/>
-          </a:prstGeom>
-          <a:noFill/>
-          <a:ln>
-            <a:solidFill>
-              <a:schemeClr val="tx1"/>
-            </a:solidFill>
-          </a:ln>
-        </p:spPr>
-        <p:txBody>
-          <a:bodyPr wrap="none" rtlCol="0">
-            <a:spAutoFit/>
-          </a:bodyPr>
-          <a:lstStyle/>
-          <a:p>
-            <a:r>
-              <a:rPr lang="en-US" sz="2800" dirty="0" smtClean="0"/>
-              <a:t>valgrind </a:t>
-            </a:r>
-            <a:r>
-              <a:rPr lang="en-US" sz="2800" dirty="0" err="1" smtClean="0"/>
-              <a:t>memcheck</a:t>
-            </a:r>
-            <a:r>
-              <a:rPr lang="en-US" sz="2800" dirty="0" smtClean="0"/>
-              <a:t>: no problem detected!</a:t>
-            </a:r>
-            <a:endParaRPr lang="en-US" sz="2800" dirty="0"/>
-          </a:p>
-        </p:txBody>
-      </p:sp>
-    </p:spTree>
-    <p:extLst>
-      <p:ext uri="{BB962C8B-B14F-4D97-AF65-F5344CB8AC3E}">
-        <p14:creationId xmlns:p14="http://schemas.microsoft.com/office/powerpoint/2010/main" val="2321211538"/>
-      </p:ext>
-    </p:extLst>
-  </p:cSld>
-  <p:clrMapOvr>
-    <a:masterClrMapping/>
-  </p:clrMapOvr>
-  <p:timing>
-    <p:tnLst>
-      <p:par>
-        <p:cTn id="1" dur="indefinite" restart="never" nodeType="tmRoot">
-          <p:childTnLst>
-            <p:seq concurrent="1" nextAc="seek">
-              <p:cTn id="2" dur="indefinite" nodeType="mainSeq">
-                <p:childTnLst>
-                  <p:par>
-                    <p:cTn id="3" fill="hold">
-                      <p:stCondLst>
-                        <p:cond delay="indefinite"/>
-                      </p:stCondLst>
-                      <p:childTnLst>
-                        <p:par>
-                          <p:cTn id="4" fill="hold">
-                            <p:stCondLst>
-                              <p:cond delay="0"/>
-                            </p:stCondLst>
-                            <p:childTnLst>
-                              <p:par>
-                                <p:cTn id="5" presetID="1" presetClass="entr" presetSubtype="0" fill="hold" grpId="0" nodeType="clickEffect">
-                                  <p:stCondLst>
-                                    <p:cond delay="0"/>
-                                  </p:stCondLst>
-                                  <p:childTnLst>
-                                    <p:set>
-                                      <p:cBhvr>
-                                        <p:cTn id="6" dur="1" fill="hold">
-                                          <p:stCondLst>
-                                            <p:cond delay="0"/>
-                                          </p:stCondLst>
-                                        </p:cTn>
-                                        <p:tgtEl>
-                                          <p:spTgt spid="16"/>
-                                        </p:tgtEl>
-                                        <p:attrNameLst>
-                                          <p:attrName>style.visibility</p:attrName>
-                                        </p:attrNameLst>
-                                      </p:cBhvr>
-                                      <p:to>
-                                        <p:strVal val="visible"/>
-                                      </p:to>
-                                    </p:set>
-                                  </p:childTnLst>
-                                </p:cTn>
-                              </p:par>
-                            </p:childTnLst>
-                          </p:cTn>
-                        </p:par>
-                      </p:childTnLst>
-                    </p:cTn>
-                  </p:par>
-                </p:childTnLst>
-              </p:cTn>
-              <p:prevCondLst>
-                <p:cond evt="onPrev" delay="0">
-                  <p:tgtEl>
-                    <p:sldTgt/>
-                  </p:tgtEl>
-                </p:cond>
-              </p:prevCondLst>
-              <p:nextCondLst>
-                <p:cond evt="onNext" delay="0">
-                  <p:tgtEl>
-                    <p:sldTgt/>
-                  </p:tgtEl>
-                </p:cond>
-              </p:nextCondLst>
-            </p:seq>
-          </p:childTnLst>
-        </p:cTn>
-      </p:par>
-    </p:tnLst>
-    <p:bldLst>
-      <p:bldP spid="16" grpId="0" animBg="1"/>
     </p:bldLst>
   </p:timing>
 </p:sld>
@@ -42312,6 +41633,872 @@
           <a:p>
             <a:r>
               <a:rPr lang="en-US" dirty="0" smtClean="0"/>
+              <a:t>Valgrind: more subtle</a:t>
+            </a:r>
+            <a:endParaRPr lang="en-US" dirty="0"/>
+          </a:p>
+        </p:txBody>
+      </p:sp>
+      <p:grpSp>
+        <p:nvGrpSpPr>
+          <p:cNvPr id="3" name="Group 4"/>
+          <p:cNvGrpSpPr/>
+          <p:nvPr/>
+        </p:nvGrpSpPr>
+        <p:grpSpPr>
+          <a:xfrm>
+            <a:off x="128995" y="1681063"/>
+            <a:ext cx="4875053" cy="3539430"/>
+            <a:chOff x="755576" y="1655004"/>
+            <a:chExt cx="4875053" cy="3539430"/>
+          </a:xfrm>
+        </p:grpSpPr>
+        <p:sp>
+          <p:nvSpPr>
+            <p:cNvPr id="4" name="TextBox 3"/>
+            <p:cNvSpPr txBox="1"/>
+            <p:nvPr/>
+          </p:nvSpPr>
+          <p:spPr>
+            <a:xfrm>
+              <a:off x="755576" y="1655004"/>
+              <a:ext cx="4875053" cy="3539430"/>
+            </a:xfrm>
+            <a:prstGeom prst="rect">
+              <a:avLst/>
+            </a:prstGeom>
+            <a:solidFill>
+              <a:schemeClr val="bg1">
+                <a:lumMod val="85000"/>
+              </a:schemeClr>
+            </a:solidFill>
+            <a:ln>
+              <a:solidFill>
+                <a:schemeClr val="tx1"/>
+              </a:solidFill>
+            </a:ln>
+          </p:spPr>
+          <p:txBody>
+            <a:bodyPr wrap="none" rtlCol="0">
+              <a:spAutoFit/>
+            </a:bodyPr>
+            <a:lstStyle/>
+            <a:p>
+              <a:r>
+                <a:rPr lang="en-US" sz="1600" dirty="0" smtClean="0">
+                  <a:latin typeface="Courier New" pitchFamily="49" charset="0"/>
+                  <a:cs typeface="Courier New" pitchFamily="49" charset="0"/>
+                </a:rPr>
+                <a:t> 1 #include &lt;</a:t>
+              </a:r>
+              <a:r>
+                <a:rPr lang="en-US" sz="1600" dirty="0" err="1" smtClean="0">
+                  <a:latin typeface="Courier New" pitchFamily="49" charset="0"/>
+                  <a:cs typeface="Courier New" pitchFamily="49" charset="0"/>
+                </a:rPr>
+                <a:t>math.h</a:t>
+              </a:r>
+              <a:r>
+                <a:rPr lang="en-US" sz="1600" dirty="0" smtClean="0">
+                  <a:latin typeface="Courier New" pitchFamily="49" charset="0"/>
+                  <a:cs typeface="Courier New" pitchFamily="49" charset="0"/>
+                </a:rPr>
+                <a:t>&gt;</a:t>
+              </a:r>
+            </a:p>
+            <a:p>
+              <a:r>
+                <a:rPr lang="en-US" sz="1600" dirty="0" smtClean="0">
+                  <a:latin typeface="Courier New" pitchFamily="49" charset="0"/>
+                  <a:cs typeface="Courier New" pitchFamily="49" charset="0"/>
+                </a:rPr>
+                <a:t> 2 #include &lt;</a:t>
+              </a:r>
+              <a:r>
+                <a:rPr lang="en-US" sz="1600" dirty="0" err="1" smtClean="0">
+                  <a:latin typeface="Courier New" pitchFamily="49" charset="0"/>
+                  <a:cs typeface="Courier New" pitchFamily="49" charset="0"/>
+                </a:rPr>
+                <a:t>stdio.h</a:t>
+              </a:r>
+              <a:r>
+                <a:rPr lang="en-US" sz="1600" dirty="0" smtClean="0">
+                  <a:latin typeface="Courier New" pitchFamily="49" charset="0"/>
+                  <a:cs typeface="Courier New" pitchFamily="49" charset="0"/>
+                </a:rPr>
+                <a:t>&gt;</a:t>
+              </a:r>
+            </a:p>
+            <a:p>
+              <a:r>
+                <a:rPr lang="en-US" sz="1600" dirty="0" smtClean="0">
+                  <a:latin typeface="Courier New" pitchFamily="49" charset="0"/>
+                  <a:cs typeface="Courier New" pitchFamily="49" charset="0"/>
+                </a:rPr>
+                <a:t> 3 #include &lt;</a:t>
+              </a:r>
+              <a:r>
+                <a:rPr lang="en-US" sz="1600" dirty="0" err="1" smtClean="0">
+                  <a:latin typeface="Courier New" pitchFamily="49" charset="0"/>
+                  <a:cs typeface="Courier New" pitchFamily="49" charset="0"/>
+                </a:rPr>
+                <a:t>stdlib.h</a:t>
+              </a:r>
+              <a:r>
+                <a:rPr lang="en-US" sz="1600" dirty="0" smtClean="0">
+                  <a:latin typeface="Courier New" pitchFamily="49" charset="0"/>
+                  <a:cs typeface="Courier New" pitchFamily="49" charset="0"/>
+                </a:rPr>
+                <a:t>&gt;</a:t>
+              </a:r>
+            </a:p>
+            <a:p>
+              <a:r>
+                <a:rPr lang="en-US" sz="1600" dirty="0" smtClean="0">
+                  <a:latin typeface="Courier New" pitchFamily="49" charset="0"/>
+                  <a:cs typeface="Courier New" pitchFamily="49" charset="0"/>
+                </a:rPr>
+                <a:t> 4</a:t>
+              </a:r>
+            </a:p>
+            <a:p>
+              <a:r>
+                <a:rPr lang="en-US" sz="1600" dirty="0" smtClean="0">
+                  <a:latin typeface="Courier New" pitchFamily="49" charset="0"/>
+                  <a:cs typeface="Courier New" pitchFamily="49" charset="0"/>
+                </a:rPr>
+                <a:t> 5 </a:t>
+              </a:r>
+              <a:r>
+                <a:rPr lang="en-US" sz="1600" dirty="0" err="1" smtClean="0">
+                  <a:latin typeface="Courier New" pitchFamily="49" charset="0"/>
+                  <a:cs typeface="Courier New" pitchFamily="49" charset="0"/>
+                </a:rPr>
+                <a:t>int</a:t>
+              </a:r>
+              <a:r>
+                <a:rPr lang="en-US" sz="1600" dirty="0" smtClean="0">
+                  <a:latin typeface="Courier New" pitchFamily="49" charset="0"/>
+                  <a:cs typeface="Courier New" pitchFamily="49" charset="0"/>
+                </a:rPr>
+                <a:t> main(</a:t>
+              </a:r>
+              <a:r>
+                <a:rPr lang="en-US" sz="1600" dirty="0" err="1" smtClean="0">
+                  <a:latin typeface="Courier New" pitchFamily="49" charset="0"/>
+                  <a:cs typeface="Courier New" pitchFamily="49" charset="0"/>
+                </a:rPr>
+                <a:t>int</a:t>
+              </a:r>
+              <a:r>
+                <a:rPr lang="en-US" sz="1600" dirty="0" smtClean="0">
+                  <a:latin typeface="Courier New" pitchFamily="49" charset="0"/>
+                  <a:cs typeface="Courier New" pitchFamily="49" charset="0"/>
+                </a:rPr>
+                <a:t> </a:t>
+              </a:r>
+              <a:r>
+                <a:rPr lang="en-US" sz="1600" dirty="0" err="1" smtClean="0">
+                  <a:latin typeface="Courier New" pitchFamily="49" charset="0"/>
+                  <a:cs typeface="Courier New" pitchFamily="49" charset="0"/>
+                </a:rPr>
+                <a:t>argc</a:t>
+              </a:r>
+              <a:r>
+                <a:rPr lang="en-US" sz="1600" dirty="0" smtClean="0">
+                  <a:latin typeface="Courier New" pitchFamily="49" charset="0"/>
+                  <a:cs typeface="Courier New" pitchFamily="49" charset="0"/>
+                </a:rPr>
+                <a:t>, char *</a:t>
+              </a:r>
+              <a:r>
+                <a:rPr lang="en-US" sz="1600" dirty="0" err="1" smtClean="0">
+                  <a:latin typeface="Courier New" pitchFamily="49" charset="0"/>
+                  <a:cs typeface="Courier New" pitchFamily="49" charset="0"/>
+                </a:rPr>
+                <a:t>argv</a:t>
+              </a:r>
+              <a:r>
+                <a:rPr lang="en-US" sz="1600" dirty="0" smtClean="0">
+                  <a:latin typeface="Courier New" pitchFamily="49" charset="0"/>
+                  <a:cs typeface="Courier New" pitchFamily="49" charset="0"/>
+                </a:rPr>
+                <a:t>[]) {</a:t>
+              </a:r>
+            </a:p>
+            <a:p>
+              <a:r>
+                <a:rPr lang="en-US" sz="1600" dirty="0" smtClean="0">
+                  <a:latin typeface="Courier New" pitchFamily="49" charset="0"/>
+                  <a:cs typeface="Courier New" pitchFamily="49" charset="0"/>
+                </a:rPr>
+                <a:t> 6     double a[10], sum;</a:t>
+              </a:r>
+            </a:p>
+            <a:p>
+              <a:r>
+                <a:rPr lang="en-US" sz="1600" dirty="0" smtClean="0">
+                  <a:latin typeface="Courier New" pitchFamily="49" charset="0"/>
+                  <a:cs typeface="Courier New" pitchFamily="49" charset="0"/>
+                </a:rPr>
+                <a:t> 7     </a:t>
+              </a:r>
+              <a:r>
+                <a:rPr lang="en-US" sz="1600" dirty="0" err="1" smtClean="0">
+                  <a:latin typeface="Courier New" pitchFamily="49" charset="0"/>
+                  <a:cs typeface="Courier New" pitchFamily="49" charset="0"/>
+                </a:rPr>
+                <a:t>int</a:t>
+              </a:r>
+              <a:r>
+                <a:rPr lang="en-US" sz="1600" dirty="0" smtClean="0">
+                  <a:latin typeface="Courier New" pitchFamily="49" charset="0"/>
+                  <a:cs typeface="Courier New" pitchFamily="49" charset="0"/>
+                </a:rPr>
+                <a:t> </a:t>
+              </a:r>
+              <a:r>
+                <a:rPr lang="en-US" sz="1600" dirty="0" err="1" smtClean="0">
+                  <a:latin typeface="Courier New" pitchFamily="49" charset="0"/>
+                  <a:cs typeface="Courier New" pitchFamily="49" charset="0"/>
+                </a:rPr>
+                <a:t>i</a:t>
+              </a:r>
+              <a:r>
+                <a:rPr lang="en-US" sz="1600" dirty="0" smtClean="0">
+                  <a:latin typeface="Courier New" pitchFamily="49" charset="0"/>
+                  <a:cs typeface="Courier New" pitchFamily="49" charset="0"/>
+                </a:rPr>
+                <a:t>;</a:t>
+              </a:r>
+            </a:p>
+            <a:p>
+              <a:r>
+                <a:rPr lang="en-US" sz="1600" dirty="0" smtClean="0">
+                  <a:latin typeface="Courier New" pitchFamily="49" charset="0"/>
+                  <a:cs typeface="Courier New" pitchFamily="49" charset="0"/>
+                </a:rPr>
+                <a:t> 8     for (</a:t>
+              </a:r>
+              <a:r>
+                <a:rPr lang="en-US" sz="1600" dirty="0" err="1" smtClean="0">
+                  <a:latin typeface="Courier New" pitchFamily="49" charset="0"/>
+                  <a:cs typeface="Courier New" pitchFamily="49" charset="0"/>
+                </a:rPr>
+                <a:t>i</a:t>
+              </a:r>
+              <a:r>
+                <a:rPr lang="en-US" sz="1600" dirty="0" smtClean="0">
+                  <a:latin typeface="Courier New" pitchFamily="49" charset="0"/>
+                  <a:cs typeface="Courier New" pitchFamily="49" charset="0"/>
+                </a:rPr>
+                <a:t> = 0; </a:t>
+              </a:r>
+              <a:r>
+                <a:rPr lang="en-US" sz="1600" dirty="0" err="1" smtClean="0">
+                  <a:latin typeface="Courier New" pitchFamily="49" charset="0"/>
+                  <a:cs typeface="Courier New" pitchFamily="49" charset="0"/>
+                </a:rPr>
+                <a:t>i</a:t>
+              </a:r>
+              <a:r>
+                <a:rPr lang="en-US" sz="1600" dirty="0" smtClean="0">
+                  <a:latin typeface="Courier New" pitchFamily="49" charset="0"/>
+                  <a:cs typeface="Courier New" pitchFamily="49" charset="0"/>
+                </a:rPr>
+                <a:t> &lt;= 10; </a:t>
+              </a:r>
+              <a:r>
+                <a:rPr lang="en-US" sz="1600" dirty="0" err="1" smtClean="0">
+                  <a:latin typeface="Courier New" pitchFamily="49" charset="0"/>
+                  <a:cs typeface="Courier New" pitchFamily="49" charset="0"/>
+                </a:rPr>
+                <a:t>i</a:t>
+              </a:r>
+              <a:r>
+                <a:rPr lang="en-US" sz="1600" dirty="0" smtClean="0">
+                  <a:latin typeface="Courier New" pitchFamily="49" charset="0"/>
+                  <a:cs typeface="Courier New" pitchFamily="49" charset="0"/>
+                </a:rPr>
+                <a:t>++)</a:t>
+              </a:r>
+            </a:p>
+            <a:p>
+              <a:r>
+                <a:rPr lang="en-US" sz="1600" dirty="0" smtClean="0">
+                  <a:latin typeface="Courier New" pitchFamily="49" charset="0"/>
+                  <a:cs typeface="Courier New" pitchFamily="49" charset="0"/>
+                </a:rPr>
+                <a:t> 9         a[</a:t>
+              </a:r>
+              <a:r>
+                <a:rPr lang="en-US" sz="1600" dirty="0" err="1" smtClean="0">
+                  <a:latin typeface="Courier New" pitchFamily="49" charset="0"/>
+                  <a:cs typeface="Courier New" pitchFamily="49" charset="0"/>
+                </a:rPr>
+                <a:t>i</a:t>
+              </a:r>
+              <a:r>
+                <a:rPr lang="en-US" sz="1600" dirty="0" smtClean="0">
+                  <a:latin typeface="Courier New" pitchFamily="49" charset="0"/>
+                  <a:cs typeface="Courier New" pitchFamily="49" charset="0"/>
+                </a:rPr>
+                <a:t>] = </a:t>
+              </a:r>
+              <a:r>
+                <a:rPr lang="en-US" sz="1600" dirty="0" err="1" smtClean="0">
+                  <a:latin typeface="Courier New" pitchFamily="49" charset="0"/>
+                  <a:cs typeface="Courier New" pitchFamily="49" charset="0"/>
+                </a:rPr>
+                <a:t>sqrt</a:t>
+              </a:r>
+              <a:r>
+                <a:rPr lang="en-US" sz="1600" dirty="0" smtClean="0">
+                  <a:latin typeface="Courier New" pitchFamily="49" charset="0"/>
+                  <a:cs typeface="Courier New" pitchFamily="49" charset="0"/>
+                </a:rPr>
+                <a:t>(</a:t>
+              </a:r>
+              <a:r>
+                <a:rPr lang="en-US" sz="1600" dirty="0" err="1" smtClean="0">
+                  <a:latin typeface="Courier New" pitchFamily="49" charset="0"/>
+                  <a:cs typeface="Courier New" pitchFamily="49" charset="0"/>
+                </a:rPr>
+                <a:t>i</a:t>
+              </a:r>
+              <a:r>
+                <a:rPr lang="en-US" sz="1600" dirty="0" smtClean="0">
+                  <a:latin typeface="Courier New" pitchFamily="49" charset="0"/>
+                  <a:cs typeface="Courier New" pitchFamily="49" charset="0"/>
+                </a:rPr>
+                <a:t>);</a:t>
+              </a:r>
+            </a:p>
+            <a:p>
+              <a:r>
+                <a:rPr lang="en-US" sz="1600" dirty="0" smtClean="0">
+                  <a:latin typeface="Courier New" pitchFamily="49" charset="0"/>
+                  <a:cs typeface="Courier New" pitchFamily="49" charset="0"/>
+                </a:rPr>
+                <a:t>10     for (</a:t>
+              </a:r>
+              <a:r>
+                <a:rPr lang="en-US" sz="1600" dirty="0" err="1" smtClean="0">
+                  <a:latin typeface="Courier New" pitchFamily="49" charset="0"/>
+                  <a:cs typeface="Courier New" pitchFamily="49" charset="0"/>
+                </a:rPr>
+                <a:t>i</a:t>
+              </a:r>
+              <a:r>
+                <a:rPr lang="en-US" sz="1600" dirty="0" smtClean="0">
+                  <a:latin typeface="Courier New" pitchFamily="49" charset="0"/>
+                  <a:cs typeface="Courier New" pitchFamily="49" charset="0"/>
+                </a:rPr>
+                <a:t> = 0; </a:t>
+              </a:r>
+              <a:r>
+                <a:rPr lang="en-US" sz="1600" dirty="0" err="1" smtClean="0">
+                  <a:latin typeface="Courier New" pitchFamily="49" charset="0"/>
+                  <a:cs typeface="Courier New" pitchFamily="49" charset="0"/>
+                </a:rPr>
+                <a:t>i</a:t>
+              </a:r>
+              <a:r>
+                <a:rPr lang="en-US" sz="1600" dirty="0" smtClean="0">
+                  <a:latin typeface="Courier New" pitchFamily="49" charset="0"/>
+                  <a:cs typeface="Courier New" pitchFamily="49" charset="0"/>
+                </a:rPr>
+                <a:t> &lt; 10; </a:t>
+              </a:r>
+              <a:r>
+                <a:rPr lang="en-US" sz="1600" dirty="0" err="1" smtClean="0">
+                  <a:latin typeface="Courier New" pitchFamily="49" charset="0"/>
+                  <a:cs typeface="Courier New" pitchFamily="49" charset="0"/>
+                </a:rPr>
+                <a:t>i</a:t>
+              </a:r>
+              <a:r>
+                <a:rPr lang="en-US" sz="1600" dirty="0" smtClean="0">
+                  <a:latin typeface="Courier New" pitchFamily="49" charset="0"/>
+                  <a:cs typeface="Courier New" pitchFamily="49" charset="0"/>
+                </a:rPr>
+                <a:t>++)</a:t>
+              </a:r>
+            </a:p>
+            <a:p>
+              <a:r>
+                <a:rPr lang="en-US" sz="1600" dirty="0" smtClean="0">
+                  <a:latin typeface="Courier New" pitchFamily="49" charset="0"/>
+                  <a:cs typeface="Courier New" pitchFamily="49" charset="0"/>
+                </a:rPr>
+                <a:t>11         sum += a[</a:t>
+              </a:r>
+              <a:r>
+                <a:rPr lang="en-US" sz="1600" dirty="0" err="1" smtClean="0">
+                  <a:latin typeface="Courier New" pitchFamily="49" charset="0"/>
+                  <a:cs typeface="Courier New" pitchFamily="49" charset="0"/>
+                </a:rPr>
+                <a:t>i</a:t>
+              </a:r>
+              <a:r>
+                <a:rPr lang="en-US" sz="1600" dirty="0" smtClean="0">
+                  <a:latin typeface="Courier New" pitchFamily="49" charset="0"/>
+                  <a:cs typeface="Courier New" pitchFamily="49" charset="0"/>
+                </a:rPr>
+                <a:t>];</a:t>
+              </a:r>
+            </a:p>
+            <a:p>
+              <a:r>
+                <a:rPr lang="en-US" sz="1600" dirty="0" smtClean="0">
+                  <a:latin typeface="Courier New" pitchFamily="49" charset="0"/>
+                  <a:cs typeface="Courier New" pitchFamily="49" charset="0"/>
+                </a:rPr>
+                <a:t>12     </a:t>
+              </a:r>
+              <a:r>
+                <a:rPr lang="en-US" sz="1600" dirty="0" err="1" smtClean="0">
+                  <a:latin typeface="Courier New" pitchFamily="49" charset="0"/>
+                  <a:cs typeface="Courier New" pitchFamily="49" charset="0"/>
+                </a:rPr>
+                <a:t>printf</a:t>
+              </a:r>
+              <a:r>
+                <a:rPr lang="en-US" sz="1600" dirty="0" smtClean="0">
+                  <a:latin typeface="Courier New" pitchFamily="49" charset="0"/>
+                  <a:cs typeface="Courier New" pitchFamily="49" charset="0"/>
+                </a:rPr>
+                <a:t>("sum = %lf\n", sum);</a:t>
+              </a:r>
+            </a:p>
+            <a:p>
+              <a:r>
+                <a:rPr lang="en-US" sz="1600" dirty="0" smtClean="0">
+                  <a:latin typeface="Courier New" pitchFamily="49" charset="0"/>
+                  <a:cs typeface="Courier New" pitchFamily="49" charset="0"/>
+                </a:rPr>
+                <a:t>13     return EXIT_SUCCESS;</a:t>
+              </a:r>
+            </a:p>
+            <a:p>
+              <a:r>
+                <a:rPr lang="en-US" sz="1600" dirty="0" smtClean="0">
+                  <a:latin typeface="Courier New" pitchFamily="49" charset="0"/>
+                  <a:cs typeface="Courier New" pitchFamily="49" charset="0"/>
+                </a:rPr>
+                <a:t>14 }</a:t>
+              </a:r>
+            </a:p>
+          </p:txBody>
+        </p:sp>
+        <p:sp>
+          <p:nvSpPr>
+            <p:cNvPr id="5" name="TextBox 4"/>
+            <p:cNvSpPr txBox="1"/>
+            <p:nvPr/>
+          </p:nvSpPr>
+          <p:spPr>
+            <a:xfrm>
+              <a:off x="3942346" y="4886311"/>
+              <a:ext cx="1688283" cy="307777"/>
+            </a:xfrm>
+            <a:prstGeom prst="rect">
+              <a:avLst/>
+            </a:prstGeom>
+            <a:solidFill>
+              <a:schemeClr val="bg1"/>
+            </a:solidFill>
+            <a:ln>
+              <a:solidFill>
+                <a:schemeClr val="tx1"/>
+              </a:solidFill>
+            </a:ln>
+          </p:spPr>
+          <p:txBody>
+            <a:bodyPr wrap="none" rtlCol="0">
+              <a:spAutoFit/>
+            </a:bodyPr>
+            <a:lstStyle/>
+            <a:p>
+              <a:r>
+                <a:rPr lang="en-US" sz="1400" b="1" dirty="0" smtClean="0">
+                  <a:latin typeface="Courier New" pitchFamily="49" charset="0"/>
+                  <a:cs typeface="Courier New" pitchFamily="49" charset="0"/>
+                </a:rPr>
+                <a:t>array-</a:t>
+              </a:r>
+              <a:r>
+                <a:rPr lang="en-US" sz="1400" b="1" dirty="0" err="1" smtClean="0">
+                  <a:latin typeface="Courier New" pitchFamily="49" charset="0"/>
+                  <a:cs typeface="Courier New" pitchFamily="49" charset="0"/>
+                </a:rPr>
+                <a:t>bounds.c</a:t>
+              </a:r>
+              <a:endParaRPr lang="en-US" sz="1400" b="1" dirty="0">
+                <a:latin typeface="Courier New" pitchFamily="49" charset="0"/>
+                <a:cs typeface="Courier New" pitchFamily="49" charset="0"/>
+              </a:endParaRPr>
+            </a:p>
+          </p:txBody>
+        </p:sp>
+      </p:grpSp>
+      <p:sp>
+        <p:nvSpPr>
+          <p:cNvPr id="12" name="TextBox 11"/>
+          <p:cNvSpPr txBox="1"/>
+          <p:nvPr/>
+        </p:nvSpPr>
+        <p:spPr>
+          <a:xfrm>
+            <a:off x="5220072" y="3429000"/>
+            <a:ext cx="3768980" cy="646331"/>
+          </a:xfrm>
+          <a:prstGeom prst="rect">
+            <a:avLst/>
+          </a:prstGeom>
+          <a:noFill/>
+          <a:ln>
+            <a:solidFill>
+              <a:schemeClr val="tx1"/>
+            </a:solidFill>
+          </a:ln>
+        </p:spPr>
+        <p:txBody>
+          <a:bodyPr wrap="none" rtlCol="0">
+            <a:spAutoFit/>
+          </a:bodyPr>
+          <a:lstStyle/>
+          <a:p>
+            <a:r>
+              <a:rPr lang="fr-FR" dirty="0" smtClean="0">
+                <a:latin typeface="Courier New" pitchFamily="49" charset="0"/>
+                <a:cs typeface="Courier New" pitchFamily="49" charset="0"/>
+              </a:rPr>
+              <a:t>octave:1&gt; </a:t>
+            </a:r>
+            <a:r>
+              <a:rPr lang="fr-FR" dirty="0" err="1" smtClean="0">
+                <a:latin typeface="Courier New" pitchFamily="49" charset="0"/>
+                <a:cs typeface="Courier New" pitchFamily="49" charset="0"/>
+              </a:rPr>
+              <a:t>sum</a:t>
+            </a:r>
+            <a:r>
+              <a:rPr lang="fr-FR" dirty="0" smtClean="0">
+                <a:latin typeface="Courier New" pitchFamily="49" charset="0"/>
+                <a:cs typeface="Courier New" pitchFamily="49" charset="0"/>
+              </a:rPr>
+              <a:t>(</a:t>
+            </a:r>
+            <a:r>
+              <a:rPr lang="fr-FR" dirty="0" err="1" smtClean="0">
+                <a:latin typeface="Courier New" pitchFamily="49" charset="0"/>
+                <a:cs typeface="Courier New" pitchFamily="49" charset="0"/>
+              </a:rPr>
+              <a:t>sqrt</a:t>
+            </a:r>
+            <a:r>
+              <a:rPr lang="fr-FR" dirty="0" smtClean="0">
+                <a:latin typeface="Courier New" pitchFamily="49" charset="0"/>
+                <a:cs typeface="Courier New" pitchFamily="49" charset="0"/>
+              </a:rPr>
+              <a:t>([0:9]))</a:t>
+            </a:r>
+          </a:p>
+          <a:p>
+            <a:r>
+              <a:rPr lang="fr-FR" dirty="0" smtClean="0">
+                <a:latin typeface="Courier New" pitchFamily="49" charset="0"/>
+                <a:cs typeface="Courier New" pitchFamily="49" charset="0"/>
+              </a:rPr>
+              <a:t>ans =  19.306</a:t>
+            </a:r>
+          </a:p>
+        </p:txBody>
+      </p:sp>
+      <p:sp>
+        <p:nvSpPr>
+          <p:cNvPr id="13" name="TextBox 12"/>
+          <p:cNvSpPr txBox="1"/>
+          <p:nvPr/>
+        </p:nvSpPr>
+        <p:spPr>
+          <a:xfrm>
+            <a:off x="5978292" y="1916832"/>
+            <a:ext cx="2390398" cy="646331"/>
+          </a:xfrm>
+          <a:prstGeom prst="rect">
+            <a:avLst/>
+          </a:prstGeom>
+          <a:solidFill>
+            <a:schemeClr val="tx2">
+              <a:lumMod val="20000"/>
+              <a:lumOff val="80000"/>
+            </a:schemeClr>
+          </a:solidFill>
+          <a:ln>
+            <a:solidFill>
+              <a:schemeClr val="tx1"/>
+            </a:solidFill>
+          </a:ln>
+        </p:spPr>
+        <p:txBody>
+          <a:bodyPr wrap="none" rtlCol="0">
+            <a:spAutoFit/>
+          </a:bodyPr>
+          <a:lstStyle/>
+          <a:p>
+            <a:r>
+              <a:rPr lang="en-US" dirty="0" smtClean="0">
+                <a:latin typeface="Courier New" pitchFamily="49" charset="0"/>
+                <a:cs typeface="Courier New" pitchFamily="49" charset="0"/>
+              </a:rPr>
+              <a:t>$ ./array-bounds</a:t>
+            </a:r>
+          </a:p>
+          <a:p>
+            <a:r>
+              <a:rPr lang="en-US" dirty="0" smtClean="0">
+                <a:latin typeface="Courier New" pitchFamily="49" charset="0"/>
+                <a:cs typeface="Courier New" pitchFamily="49" charset="0"/>
+              </a:rPr>
+              <a:t>sum = 22.468278</a:t>
+            </a:r>
+          </a:p>
+        </p:txBody>
+      </p:sp>
+      <p:sp>
+        <p:nvSpPr>
+          <p:cNvPr id="14" name="TextBox 13"/>
+          <p:cNvSpPr txBox="1"/>
+          <p:nvPr/>
+        </p:nvSpPr>
+        <p:spPr>
+          <a:xfrm>
+            <a:off x="6804248" y="2636912"/>
+            <a:ext cx="437940" cy="646331"/>
+          </a:xfrm>
+          <a:prstGeom prst="rect">
+            <a:avLst/>
+          </a:prstGeom>
+          <a:noFill/>
+        </p:spPr>
+        <p:txBody>
+          <a:bodyPr wrap="none" rtlCol="0">
+            <a:spAutoFit/>
+          </a:bodyPr>
+          <a:lstStyle/>
+          <a:p>
+            <a:r>
+              <a:rPr lang="en-US" sz="3600" b="1" dirty="0" smtClean="0">
+                <a:sym typeface="Symbol"/>
+              </a:rPr>
+              <a:t></a:t>
+            </a:r>
+            <a:endParaRPr lang="en-US" b="1" dirty="0"/>
+          </a:p>
+        </p:txBody>
+      </p:sp>
+      <p:sp>
+        <p:nvSpPr>
+          <p:cNvPr id="15" name="TextBox 14"/>
+          <p:cNvSpPr txBox="1"/>
+          <p:nvPr/>
+        </p:nvSpPr>
+        <p:spPr>
+          <a:xfrm>
+            <a:off x="7308304" y="2780928"/>
+            <a:ext cx="744563" cy="369332"/>
+          </a:xfrm>
+          <a:prstGeom prst="rect">
+            <a:avLst/>
+          </a:prstGeom>
+          <a:noFill/>
+        </p:spPr>
+        <p:txBody>
+          <a:bodyPr wrap="none" rtlCol="0">
+            <a:spAutoFit/>
+          </a:bodyPr>
+          <a:lstStyle/>
+          <a:p>
+            <a:r>
+              <a:rPr lang="en-US" dirty="0" smtClean="0"/>
+              <a:t>Oops!</a:t>
+            </a:r>
+            <a:endParaRPr lang="en-US" dirty="0"/>
+          </a:p>
+        </p:txBody>
+      </p:sp>
+      <p:sp>
+        <p:nvSpPr>
+          <p:cNvPr id="16" name="TextBox 15"/>
+          <p:cNvSpPr txBox="1"/>
+          <p:nvPr/>
+        </p:nvSpPr>
+        <p:spPr>
+          <a:xfrm>
+            <a:off x="1403648" y="5805264"/>
+            <a:ext cx="6382068" cy="523220"/>
+          </a:xfrm>
+          <a:prstGeom prst="rect">
+            <a:avLst/>
+          </a:prstGeom>
+          <a:noFill/>
+          <a:ln>
+            <a:solidFill>
+              <a:schemeClr val="tx1"/>
+            </a:solidFill>
+          </a:ln>
+        </p:spPr>
+        <p:txBody>
+          <a:bodyPr wrap="none" rtlCol="0">
+            <a:spAutoFit/>
+          </a:bodyPr>
+          <a:lstStyle/>
+          <a:p>
+            <a:r>
+              <a:rPr lang="en-US" sz="2800" dirty="0" smtClean="0"/>
+              <a:t>valgrind </a:t>
+            </a:r>
+            <a:r>
+              <a:rPr lang="en-US" sz="2800" dirty="0" err="1" smtClean="0"/>
+              <a:t>memcheck</a:t>
+            </a:r>
+            <a:r>
+              <a:rPr lang="en-US" sz="2800" dirty="0" smtClean="0"/>
+              <a:t>: no problem detected!</a:t>
+            </a:r>
+            <a:endParaRPr lang="en-US" sz="2800" dirty="0"/>
+          </a:p>
+        </p:txBody>
+      </p:sp>
+    </p:spTree>
+    <p:extLst>
+      <p:ext uri="{BB962C8B-B14F-4D97-AF65-F5344CB8AC3E}">
+        <p14:creationId xmlns:p14="http://schemas.microsoft.com/office/powerpoint/2010/main" val="2321211538"/>
+      </p:ext>
+    </p:extLst>
+  </p:cSld>
+  <p:clrMapOvr>
+    <a:masterClrMapping/>
+  </p:clrMapOvr>
+  <p:timing>
+    <p:tnLst>
+      <p:par>
+        <p:cTn id="1" dur="indefinite" restart="never" nodeType="tmRoot">
+          <p:childTnLst>
+            <p:seq concurrent="1" nextAc="seek">
+              <p:cTn id="2" dur="indefinite" nodeType="mainSeq">
+                <p:childTnLst>
+                  <p:par>
+                    <p:cTn id="3" fill="hold">
+                      <p:stCondLst>
+                        <p:cond delay="indefinite"/>
+                      </p:stCondLst>
+                      <p:childTnLst>
+                        <p:par>
+                          <p:cTn id="4" fill="hold">
+                            <p:stCondLst>
+                              <p:cond delay="0"/>
+                            </p:stCondLst>
+                            <p:childTnLst>
+                              <p:par>
+                                <p:cTn id="5" presetID="1" presetClass="entr" presetSubtype="0" fill="hold" grpId="0" nodeType="clickEffect">
+                                  <p:stCondLst>
+                                    <p:cond delay="0"/>
+                                  </p:stCondLst>
+                                  <p:childTnLst>
+                                    <p:set>
+                                      <p:cBhvr>
+                                        <p:cTn id="6" dur="1" fill="hold">
+                                          <p:stCondLst>
+                                            <p:cond delay="0"/>
+                                          </p:stCondLst>
+                                        </p:cTn>
+                                        <p:tgtEl>
+                                          <p:spTgt spid="16"/>
+                                        </p:tgtEl>
+                                        <p:attrNameLst>
+                                          <p:attrName>style.visibility</p:attrName>
+                                        </p:attrNameLst>
+                                      </p:cBhvr>
+                                      <p:to>
+                                        <p:strVal val="visible"/>
+                                      </p:to>
+                                    </p:set>
+                                  </p:childTnLst>
+                                </p:cTn>
+                              </p:par>
+                            </p:childTnLst>
+                          </p:cTn>
+                        </p:par>
+                      </p:childTnLst>
+                    </p:cTn>
+                  </p:par>
+                </p:childTnLst>
+              </p:cTn>
+              <p:prevCondLst>
+                <p:cond evt="onPrev" delay="0">
+                  <p:tgtEl>
+                    <p:sldTgt/>
+                  </p:tgtEl>
+                </p:cond>
+              </p:prevCondLst>
+              <p:nextCondLst>
+                <p:cond evt="onNext" delay="0">
+                  <p:tgtEl>
+                    <p:sldTgt/>
+                  </p:tgtEl>
+                </p:cond>
+              </p:nextCondLst>
+            </p:seq>
+          </p:childTnLst>
+        </p:cTn>
+      </p:par>
+    </p:tnLst>
+    <p:bldLst>
+      <p:bldP spid="16" grpId="0" animBg="1"/>
+    </p:bldLst>
+  </p:timing>
+</p:sld>
+</file>
+
+<file path=ppt/slides/slide71.xml><?xml version="1.0" encoding="utf-8"?>
+<p:sld xmlns:a="http://schemas.openxmlformats.org/drawingml/2006/main" xmlns:r="http://schemas.openxmlformats.org/officeDocument/2006/relationships" xmlns:p="http://schemas.openxmlformats.org/presentationml/2006/main">
+  <p:cSld>
+    <p:spTree>
+      <p:nvGrpSpPr>
+        <p:cNvPr id="1" name=""/>
+        <p:cNvGrpSpPr/>
+        <p:nvPr/>
+      </p:nvGrpSpPr>
+      <p:grpSpPr>
+        <a:xfrm>
+          <a:off x="0" y="0"/>
+          <a:ext cx="0" cy="0"/>
+          <a:chOff x="0" y="0"/>
+          <a:chExt cx="0" cy="0"/>
+        </a:xfrm>
+      </p:grpSpPr>
+      <p:sp>
+        <p:nvSpPr>
+          <p:cNvPr id="2" name="Title 1"/>
+          <p:cNvSpPr>
+            <a:spLocks noGrp="1"/>
+          </p:cNvSpPr>
+          <p:nvPr>
+            <p:ph type="title"/>
+          </p:nvPr>
+        </p:nvSpPr>
+        <p:spPr/>
+        <p:txBody>
+          <a:bodyPr>
+            <a:normAutofit/>
+          </a:bodyPr>
+          <a:lstStyle/>
+          <a:p>
+            <a:r>
+              <a:rPr lang="en-US" dirty="0" smtClean="0"/>
               <a:t>Valgrind: array bounds overrun</a:t>
             </a:r>
             <a:endParaRPr lang="en-US" dirty="0"/>
@@ -42891,7 +43078,7 @@
 </p:sld>
 </file>
 
-<file path=ppt/slides/slide71.xml><?xml version="1.0" encoding="utf-8"?>
+<file path=ppt/slides/slide72.xml><?xml version="1.0" encoding="utf-8"?>
 <p:sld xmlns:a="http://schemas.openxmlformats.org/drawingml/2006/main" xmlns:r="http://schemas.openxmlformats.org/officeDocument/2006/relationships" xmlns:p="http://schemas.openxmlformats.org/presentationml/2006/main">
   <p:cSld>
     <p:spTree>
@@ -42970,7 +43157,7 @@
 </p:sld>
 </file>
 
-<file path=ppt/slides/slide72.xml><?xml version="1.0" encoding="utf-8"?>
+<file path=ppt/slides/slide73.xml><?xml version="1.0" encoding="utf-8"?>
 <p:sld xmlns:a="http://schemas.openxmlformats.org/drawingml/2006/main" xmlns:r="http://schemas.openxmlformats.org/officeDocument/2006/relationships" xmlns:p="http://schemas.openxmlformats.org/presentationml/2006/main">
   <p:cSld>
     <p:spTree>
@@ -43674,7 +43861,7 @@
 </p:sld>
 </file>
 
-<file path=ppt/slides/slide73.xml><?xml version="1.0" encoding="utf-8"?>
+<file path=ppt/slides/slide74.xml><?xml version="1.0" encoding="utf-8"?>
 <p:sld xmlns:a="http://schemas.openxmlformats.org/drawingml/2006/main" xmlns:r="http://schemas.openxmlformats.org/officeDocument/2006/relationships" xmlns:p="http://schemas.openxmlformats.org/presentationml/2006/main">
   <p:cSld>
     <p:spTree>
@@ -43753,7 +43940,7 @@
 </p:sld>
 </file>
 
-<file path=ppt/slides/slide74.xml><?xml version="1.0" encoding="utf-8"?>
+<file path=ppt/slides/slide75.xml><?xml version="1.0" encoding="utf-8"?>
 <p:sld xmlns:a="http://schemas.openxmlformats.org/drawingml/2006/main" xmlns:r="http://schemas.openxmlformats.org/officeDocument/2006/relationships" xmlns:p="http://schemas.openxmlformats.org/presentationml/2006/main">
   <p:cSld>
     <p:spTree>
@@ -44205,7 +44392,7 @@
 </p:sld>
 </file>
 
-<file path=ppt/slides/slide75.xml><?xml version="1.0" encoding="utf-8"?>
+<file path=ppt/slides/slide76.xml><?xml version="1.0" encoding="utf-8"?>
 <p:sld xmlns:a="http://schemas.openxmlformats.org/drawingml/2006/main" xmlns:r="http://schemas.openxmlformats.org/officeDocument/2006/relationships" xmlns:p="http://schemas.openxmlformats.org/presentationml/2006/main">
   <p:cSld>
     <p:spTree>
@@ -44894,7 +45081,7 @@
 </p:sld>
 </file>
 
-<file path=ppt/slides/slide76.xml><?xml version="1.0" encoding="utf-8"?>
+<file path=ppt/slides/slide77.xml><?xml version="1.0" encoding="utf-8"?>
 <p:sld xmlns:a="http://schemas.openxmlformats.org/drawingml/2006/main" xmlns:r="http://schemas.openxmlformats.org/officeDocument/2006/relationships" xmlns:p="http://schemas.openxmlformats.org/presentationml/2006/main">
   <p:cSld>
     <p:spTree>

</xml_diff>

<commit_message>
Added slide on examining core files
</commit_message>
<xml_diff>
--- a/Debugging/debugging.pptx
+++ b/Debugging/debugging.pptx
@@ -64,24 +64,25 @@
     <p:sldId id="283" r:id="rId58"/>
     <p:sldId id="284" r:id="rId59"/>
     <p:sldId id="303" r:id="rId60"/>
-    <p:sldId id="286" r:id="rId61"/>
-    <p:sldId id="287" r:id="rId62"/>
-    <p:sldId id="288" r:id="rId63"/>
-    <p:sldId id="289" r:id="rId64"/>
-    <p:sldId id="290" r:id="rId65"/>
-    <p:sldId id="291" r:id="rId66"/>
-    <p:sldId id="292" r:id="rId67"/>
-    <p:sldId id="293" r:id="rId68"/>
-    <p:sldId id="294" r:id="rId69"/>
-    <p:sldId id="295" r:id="rId70"/>
-    <p:sldId id="296" r:id="rId71"/>
-    <p:sldId id="297" r:id="rId72"/>
-    <p:sldId id="327" r:id="rId73"/>
-    <p:sldId id="328" r:id="rId74"/>
-    <p:sldId id="299" r:id="rId75"/>
-    <p:sldId id="300" r:id="rId76"/>
-    <p:sldId id="332" r:id="rId77"/>
-    <p:sldId id="298" r:id="rId78"/>
+    <p:sldId id="336" r:id="rId61"/>
+    <p:sldId id="286" r:id="rId62"/>
+    <p:sldId id="287" r:id="rId63"/>
+    <p:sldId id="288" r:id="rId64"/>
+    <p:sldId id="289" r:id="rId65"/>
+    <p:sldId id="290" r:id="rId66"/>
+    <p:sldId id="291" r:id="rId67"/>
+    <p:sldId id="292" r:id="rId68"/>
+    <p:sldId id="293" r:id="rId69"/>
+    <p:sldId id="294" r:id="rId70"/>
+    <p:sldId id="295" r:id="rId71"/>
+    <p:sldId id="296" r:id="rId72"/>
+    <p:sldId id="297" r:id="rId73"/>
+    <p:sldId id="327" r:id="rId74"/>
+    <p:sldId id="328" r:id="rId75"/>
+    <p:sldId id="299" r:id="rId76"/>
+    <p:sldId id="300" r:id="rId77"/>
+    <p:sldId id="332" r:id="rId78"/>
+    <p:sldId id="298" r:id="rId79"/>
   </p:sldIdLst>
   <p:sldSz cx="9144000" cy="6858000" type="screen4x3"/>
   <p:notesSz cx="6858000" cy="9144000"/>
@@ -260,6 +261,7 @@
             <p14:sldId id="283"/>
             <p14:sldId id="284"/>
             <p14:sldId id="303"/>
+            <p14:sldId id="336"/>
           </p14:sldIdLst>
         </p14:section>
         <p14:section name="Valgrind" id="{EFD2BD48-6C1E-4F8D-A1EC-1E0CDBE2B40B}">
@@ -35606,21 +35608,25 @@
           <a:lstStyle/>
           <a:p>
             <a:r>
+              <a:rPr lang="en-US" dirty="0" err="1" smtClean="0"/>
+              <a:t>gdb</a:t>
+            </a:r>
+            <a:r>
               <a:rPr lang="en-US" dirty="0" smtClean="0"/>
-              <a:t>valgrind</a:t>
-            </a:r>
-            <a:endParaRPr lang="en-US" dirty="0"/>
+              <a:t>: post mortem</a:t>
+            </a:r>
+            <a:endParaRPr lang="nl-BE" dirty="0"/>
           </a:p>
         </p:txBody>
       </p:sp>
       <p:sp>
         <p:nvSpPr>
-          <p:cNvPr id="3" name="Text Placeholder 2"/>
+          <p:cNvPr id="3" name="Content Placeholder 2"/>
           <p:cNvSpPr>
             <a:spLocks noGrp="1"/>
           </p:cNvSpPr>
           <p:nvPr>
-            <p:ph type="body" idx="1"/>
+            <p:ph idx="1"/>
           </p:nvPr>
         </p:nvSpPr>
         <p:spPr/>
@@ -35628,27 +35634,107 @@
           <a:bodyPr/>
           <a:lstStyle/>
           <a:p>
-            <a:endParaRPr lang="en-US"/>
+            <a:r>
+              <a:rPr lang="en-US" dirty="0" smtClean="0"/>
+              <a:t>Examine state of crashed program</a:t>
+            </a:r>
+            <a:br>
+              <a:rPr lang="en-US" dirty="0" smtClean="0"/>
+            </a:br>
+            <a:r>
+              <a:rPr lang="en-US" dirty="0" smtClean="0">
+                <a:latin typeface="Courier New" panose="02070309020205020404" pitchFamily="49" charset="0"/>
+                <a:cs typeface="Courier New" panose="02070309020205020404" pitchFamily="49" charset="0"/>
+              </a:rPr>
+              <a:t>$ </a:t>
+            </a:r>
+            <a:r>
+              <a:rPr lang="en-US" dirty="0" err="1" smtClean="0">
+                <a:latin typeface="Courier New" panose="02070309020205020404" pitchFamily="49" charset="0"/>
+                <a:cs typeface="Courier New" panose="02070309020205020404" pitchFamily="49" charset="0"/>
+              </a:rPr>
+              <a:t>gdb</a:t>
+            </a:r>
+            <a:r>
+              <a:rPr lang="en-US" dirty="0" smtClean="0">
+                <a:latin typeface="Courier New" panose="02070309020205020404" pitchFamily="49" charset="0"/>
+                <a:cs typeface="Courier New" panose="02070309020205020404" pitchFamily="49" charset="0"/>
+              </a:rPr>
+              <a:t> &lt;executable&gt; &lt;core-file&gt;</a:t>
+            </a:r>
+          </a:p>
+          <a:p>
+            <a:pPr lvl="1"/>
+            <a:r>
+              <a:rPr lang="en-US" dirty="0" err="1" smtClean="0"/>
+              <a:t>Backtrace</a:t>
+            </a:r>
+            <a:r>
+              <a:rPr lang="en-US" dirty="0" smtClean="0"/>
+              <a:t> to see call stack</a:t>
+            </a:r>
+          </a:p>
+          <a:p>
+            <a:pPr lvl="1"/>
+            <a:r>
+              <a:rPr lang="en-US" dirty="0" smtClean="0"/>
+              <a:t>Inspect values of variables</a:t>
+            </a:r>
+          </a:p>
+          <a:p>
+            <a:r>
+              <a:rPr lang="en-US" dirty="0" smtClean="0"/>
+              <a:t>Requires core file, if necessary, set </a:t>
+            </a:r>
+            <a:r>
+              <a:rPr lang="en-US" dirty="0" err="1" smtClean="0"/>
+              <a:t>ulimit</a:t>
+            </a:r>
+            <a:r>
+              <a:rPr lang="en-US" dirty="0" smtClean="0"/>
+              <a:t/>
+            </a:r>
+            <a:br>
+              <a:rPr lang="en-US" dirty="0" smtClean="0"/>
+            </a:br>
+            <a:r>
+              <a:rPr lang="en-US" dirty="0" smtClean="0">
+                <a:latin typeface="Courier New" panose="02070309020205020404" pitchFamily="49" charset="0"/>
+                <a:cs typeface="Courier New" panose="02070309020205020404" pitchFamily="49" charset="0"/>
+              </a:rPr>
+              <a:t>$ </a:t>
+            </a:r>
+            <a:r>
+              <a:rPr lang="en-US" dirty="0" err="1" smtClean="0">
+                <a:latin typeface="Courier New" panose="02070309020205020404" pitchFamily="49" charset="0"/>
+                <a:cs typeface="Courier New" panose="02070309020205020404" pitchFamily="49" charset="0"/>
+              </a:rPr>
+              <a:t>ulimit</a:t>
+            </a:r>
+            <a:r>
+              <a:rPr lang="en-US" dirty="0" smtClean="0">
+                <a:latin typeface="Courier New" panose="02070309020205020404" pitchFamily="49" charset="0"/>
+                <a:cs typeface="Courier New" panose="02070309020205020404" pitchFamily="49" charset="0"/>
+              </a:rPr>
+              <a:t> -c 0</a:t>
+            </a:r>
+            <a:endParaRPr lang="nl-BE" dirty="0">
+              <a:latin typeface="Courier New" panose="02070309020205020404" pitchFamily="49" charset="0"/>
+              <a:cs typeface="Courier New" panose="02070309020205020404" pitchFamily="49" charset="0"/>
+            </a:endParaRPr>
           </a:p>
         </p:txBody>
       </p:sp>
     </p:spTree>
     <p:extLst>
       <p:ext uri="{BB962C8B-B14F-4D97-AF65-F5344CB8AC3E}">
-        <p14:creationId xmlns:p14="http://schemas.microsoft.com/office/powerpoint/2010/main" val="3137797742"/>
+        <p14:creationId xmlns:p14="http://schemas.microsoft.com/office/powerpoint/2010/main" val="3039618545"/>
       </p:ext>
     </p:extLst>
   </p:cSld>
   <p:clrMapOvr>
     <a:masterClrMapping/>
   </p:clrMapOvr>
-  <p:timing>
-    <p:tnLst>
-      <p:par>
-        <p:cTn id="1" dur="indefinite" restart="never" nodeType="tmRoot"/>
-      </p:par>
-    </p:tnLst>
-  </p:timing>
 </p:sld>
 </file>
 
@@ -35686,6 +35772,85 @@
           <a:p>
             <a:r>
               <a:rPr lang="en-US" dirty="0" smtClean="0"/>
+              <a:t>valgrind</a:t>
+            </a:r>
+            <a:endParaRPr lang="en-US" dirty="0"/>
+          </a:p>
+        </p:txBody>
+      </p:sp>
+      <p:sp>
+        <p:nvSpPr>
+          <p:cNvPr id="3" name="Text Placeholder 2"/>
+          <p:cNvSpPr>
+            <a:spLocks noGrp="1"/>
+          </p:cNvSpPr>
+          <p:nvPr>
+            <p:ph type="body" idx="1"/>
+          </p:nvPr>
+        </p:nvSpPr>
+        <p:spPr/>
+        <p:txBody>
+          <a:bodyPr/>
+          <a:lstStyle/>
+          <a:p>
+            <a:endParaRPr lang="en-US"/>
+          </a:p>
+        </p:txBody>
+      </p:sp>
+    </p:spTree>
+    <p:extLst>
+      <p:ext uri="{BB962C8B-B14F-4D97-AF65-F5344CB8AC3E}">
+        <p14:creationId xmlns:p14="http://schemas.microsoft.com/office/powerpoint/2010/main" val="3137797742"/>
+      </p:ext>
+    </p:extLst>
+  </p:cSld>
+  <p:clrMapOvr>
+    <a:masterClrMapping/>
+  </p:clrMapOvr>
+  <p:timing>
+    <p:tnLst>
+      <p:par>
+        <p:cTn id="1" dur="indefinite" restart="never" nodeType="tmRoot"/>
+      </p:par>
+    </p:tnLst>
+  </p:timing>
+</p:sld>
+</file>
+
+<file path=ppt/slides/slide62.xml><?xml version="1.0" encoding="utf-8"?>
+<p:sld xmlns:a="http://schemas.openxmlformats.org/drawingml/2006/main" xmlns:r="http://schemas.openxmlformats.org/officeDocument/2006/relationships" xmlns:p="http://schemas.openxmlformats.org/presentationml/2006/main">
+  <p:cSld>
+    <p:spTree>
+      <p:nvGrpSpPr>
+        <p:cNvPr id="1" name=""/>
+        <p:cNvGrpSpPr/>
+        <p:nvPr/>
+      </p:nvGrpSpPr>
+      <p:grpSpPr>
+        <a:xfrm>
+          <a:off x="0" y="0"/>
+          <a:ext cx="0" cy="0"/>
+          <a:chOff x="0" y="0"/>
+          <a:chExt cx="0" cy="0"/>
+        </a:xfrm>
+      </p:grpSpPr>
+      <p:sp>
+        <p:nvSpPr>
+          <p:cNvPr id="2" name="Title 1"/>
+          <p:cNvSpPr>
+            <a:spLocks noGrp="1"/>
+          </p:cNvSpPr>
+          <p:nvPr>
+            <p:ph type="title"/>
+          </p:nvPr>
+        </p:nvSpPr>
+        <p:spPr/>
+        <p:txBody>
+          <a:bodyPr/>
+          <a:lstStyle/>
+          <a:p>
+            <a:r>
+              <a:rPr lang="en-US" dirty="0" smtClean="0"/>
               <a:t>Valgrind: what is it?</a:t>
             </a:r>
             <a:endParaRPr lang="en-US" dirty="0"/>
@@ -35791,7 +35956,7 @@
 </p:sld>
 </file>
 
-<file path=ppt/slides/slide62.xml><?xml version="1.0" encoding="utf-8"?>
+<file path=ppt/slides/slide63.xml><?xml version="1.0" encoding="utf-8"?>
 <p:sld xmlns:a="http://schemas.openxmlformats.org/drawingml/2006/main" xmlns:r="http://schemas.openxmlformats.org/officeDocument/2006/relationships" xmlns:p="http://schemas.openxmlformats.org/presentationml/2006/main">
   <p:cSld>
     <p:spTree>
@@ -36518,7 +36683,7 @@
 </p:sld>
 </file>
 
-<file path=ppt/slides/slide63.xml><?xml version="1.0" encoding="utf-8"?>
+<file path=ppt/slides/slide64.xml><?xml version="1.0" encoding="utf-8"?>
 <p:sld xmlns:a="http://schemas.openxmlformats.org/drawingml/2006/main" xmlns:r="http://schemas.openxmlformats.org/officeDocument/2006/relationships" xmlns:p="http://schemas.openxmlformats.org/presentationml/2006/main">
   <p:cSld>
     <p:spTree>
@@ -36946,7 +37111,7 @@
 </p:sld>
 </file>
 
-<file path=ppt/slides/slide64.xml><?xml version="1.0" encoding="utf-8"?>
+<file path=ppt/slides/slide65.xml><?xml version="1.0" encoding="utf-8"?>
 <p:sld xmlns:a="http://schemas.openxmlformats.org/drawingml/2006/main" xmlns:r="http://schemas.openxmlformats.org/officeDocument/2006/relationships" xmlns:p="http://schemas.openxmlformats.org/presentationml/2006/main">
   <p:cSld>
     <p:spTree>
@@ -37432,7 +37597,7 @@
 </p:sld>
 </file>
 
-<file path=ppt/slides/slide65.xml><?xml version="1.0" encoding="utf-8"?>
+<file path=ppt/slides/slide66.xml><?xml version="1.0" encoding="utf-8"?>
 <p:sld xmlns:a="http://schemas.openxmlformats.org/drawingml/2006/main" xmlns:r="http://schemas.openxmlformats.org/officeDocument/2006/relationships" xmlns:p="http://schemas.openxmlformats.org/presentationml/2006/main">
   <p:cSld>
     <p:spTree>
@@ -38164,7 +38329,7 @@
 </p:sld>
 </file>
 
-<file path=ppt/slides/slide66.xml><?xml version="1.0" encoding="utf-8"?>
+<file path=ppt/slides/slide67.xml><?xml version="1.0" encoding="utf-8"?>
 <p:sld xmlns:a="http://schemas.openxmlformats.org/drawingml/2006/main" xmlns:r="http://schemas.openxmlformats.org/officeDocument/2006/relationships" xmlns:p="http://schemas.openxmlformats.org/presentationml/2006/main">
   <p:cSld>
     <p:spTree>
@@ -38439,7 +38604,7 @@
 </p:sld>
 </file>
 
-<file path=ppt/slides/slide67.xml><?xml version="1.0" encoding="utf-8"?>
+<file path=ppt/slides/slide68.xml><?xml version="1.0" encoding="utf-8"?>
 <p:sld xmlns:a="http://schemas.openxmlformats.org/drawingml/2006/main" xmlns:r="http://schemas.openxmlformats.org/officeDocument/2006/relationships" xmlns:p="http://schemas.openxmlformats.org/presentationml/2006/main">
   <p:cSld>
     <p:spTree>
@@ -39181,7 +39346,7 @@
 </p:sld>
 </file>
 
-<file path=ppt/slides/slide68.xml><?xml version="1.0" encoding="utf-8"?>
+<file path=ppt/slides/slide69.xml><?xml version="1.0" encoding="utf-8"?>
 <p:sld xmlns:a="http://schemas.openxmlformats.org/drawingml/2006/main" xmlns:r="http://schemas.openxmlformats.org/officeDocument/2006/relationships" xmlns:p="http://schemas.openxmlformats.org/presentationml/2006/main">
   <p:cSld>
     <p:spTree>
@@ -40430,732 +40595,6 @@
         </p:cTn>
       </p:par>
     </p:tnLst>
-  </p:timing>
-</p:sld>
-</file>
-
-<file path=ppt/slides/slide69.xml><?xml version="1.0" encoding="utf-8"?>
-<p:sld xmlns:a="http://schemas.openxmlformats.org/drawingml/2006/main" xmlns:r="http://schemas.openxmlformats.org/officeDocument/2006/relationships" xmlns:p="http://schemas.openxmlformats.org/presentationml/2006/main">
-  <p:cSld>
-    <p:spTree>
-      <p:nvGrpSpPr>
-        <p:cNvPr id="1" name=""/>
-        <p:cNvGrpSpPr/>
-        <p:nvPr/>
-      </p:nvGrpSpPr>
-      <p:grpSpPr>
-        <a:xfrm>
-          <a:off x="0" y="0"/>
-          <a:ext cx="0" cy="0"/>
-          <a:chOff x="0" y="0"/>
-          <a:chExt cx="0" cy="0"/>
-        </a:xfrm>
-      </p:grpSpPr>
-      <p:sp>
-        <p:nvSpPr>
-          <p:cNvPr id="2" name="Title 1"/>
-          <p:cNvSpPr>
-            <a:spLocks noGrp="1"/>
-          </p:cNvSpPr>
-          <p:nvPr>
-            <p:ph type="title"/>
-          </p:nvPr>
-        </p:nvSpPr>
-        <p:spPr/>
-        <p:txBody>
-          <a:bodyPr>
-            <a:normAutofit/>
-          </a:bodyPr>
-          <a:lstStyle/>
-          <a:p>
-            <a:r>
-              <a:rPr lang="en-US" dirty="0" smtClean="0"/>
-              <a:t>Valgrind: array bounds overrun</a:t>
-            </a:r>
-            <a:endParaRPr lang="en-US" dirty="0"/>
-          </a:p>
-        </p:txBody>
-      </p:sp>
-      <p:grpSp>
-        <p:nvGrpSpPr>
-          <p:cNvPr id="3" name="Group 4"/>
-          <p:cNvGrpSpPr/>
-          <p:nvPr/>
-        </p:nvGrpSpPr>
-        <p:grpSpPr>
-          <a:xfrm>
-            <a:off x="725799" y="1681063"/>
-            <a:ext cx="6232796" cy="2308324"/>
-            <a:chOff x="755576" y="1655004"/>
-            <a:chExt cx="6232796" cy="2308324"/>
-          </a:xfrm>
-        </p:grpSpPr>
-        <p:sp>
-          <p:nvSpPr>
-            <p:cNvPr id="4" name="TextBox 3"/>
-            <p:cNvSpPr txBox="1"/>
-            <p:nvPr/>
-          </p:nvSpPr>
-          <p:spPr>
-            <a:xfrm>
-              <a:off x="755576" y="1655004"/>
-              <a:ext cx="6232796" cy="2308324"/>
-            </a:xfrm>
-            <a:prstGeom prst="rect">
-              <a:avLst/>
-            </a:prstGeom>
-            <a:solidFill>
-              <a:schemeClr val="bg1">
-                <a:lumMod val="85000"/>
-              </a:schemeClr>
-            </a:solidFill>
-            <a:ln>
-              <a:solidFill>
-                <a:schemeClr val="tx1"/>
-              </a:solidFill>
-            </a:ln>
-          </p:spPr>
-          <p:txBody>
-            <a:bodyPr wrap="none" rtlCol="0">
-              <a:spAutoFit/>
-            </a:bodyPr>
-            <a:lstStyle/>
-            <a:p>
-              <a:r>
-                <a:rPr lang="en-US" sz="1600" dirty="0" smtClean="0">
-                  <a:latin typeface="Courier New" pitchFamily="49" charset="0"/>
-                  <a:cs typeface="Courier New" pitchFamily="49" charset="0"/>
-                </a:rPr>
-                <a:t> 1 #include &lt;</a:t>
-              </a:r>
-              <a:r>
-                <a:rPr lang="en-US" sz="1600" dirty="0" err="1" smtClean="0">
-                  <a:latin typeface="Courier New" pitchFamily="49" charset="0"/>
-                  <a:cs typeface="Courier New" pitchFamily="49" charset="0"/>
-                </a:rPr>
-                <a:t>stdio.h</a:t>
-              </a:r>
-              <a:r>
-                <a:rPr lang="en-US" sz="1600" dirty="0" smtClean="0">
-                  <a:latin typeface="Courier New" pitchFamily="49" charset="0"/>
-                  <a:cs typeface="Courier New" pitchFamily="49" charset="0"/>
-                </a:rPr>
-                <a:t>&gt;</a:t>
-              </a:r>
-            </a:p>
-            <a:p>
-              <a:r>
-                <a:rPr lang="en-US" sz="1600" dirty="0" smtClean="0">
-                  <a:latin typeface="Courier New" pitchFamily="49" charset="0"/>
-                  <a:cs typeface="Courier New" pitchFamily="49" charset="0"/>
-                </a:rPr>
-                <a:t> 2 #include &lt;</a:t>
-              </a:r>
-              <a:r>
-                <a:rPr lang="en-US" sz="1600" dirty="0" err="1" smtClean="0">
-                  <a:latin typeface="Courier New" pitchFamily="49" charset="0"/>
-                  <a:cs typeface="Courier New" pitchFamily="49" charset="0"/>
-                </a:rPr>
-                <a:t>stdlib.h</a:t>
-              </a:r>
-              <a:r>
-                <a:rPr lang="en-US" sz="1600" dirty="0" smtClean="0">
-                  <a:latin typeface="Courier New" pitchFamily="49" charset="0"/>
-                  <a:cs typeface="Courier New" pitchFamily="49" charset="0"/>
-                </a:rPr>
-                <a:t>&gt;</a:t>
-              </a:r>
-            </a:p>
-            <a:p>
-              <a:r>
-                <a:rPr lang="en-US" sz="1600" dirty="0" smtClean="0">
-                  <a:latin typeface="Courier New" pitchFamily="49" charset="0"/>
-                  <a:cs typeface="Courier New" pitchFamily="49" charset="0"/>
-                </a:rPr>
-                <a:t> 3</a:t>
-              </a:r>
-            </a:p>
-            <a:p>
-              <a:r>
-                <a:rPr lang="en-US" sz="1600" dirty="0" smtClean="0">
-                  <a:latin typeface="Courier New" pitchFamily="49" charset="0"/>
-                  <a:cs typeface="Courier New" pitchFamily="49" charset="0"/>
-                </a:rPr>
-                <a:t> 4 </a:t>
-              </a:r>
-              <a:r>
-                <a:rPr lang="en-US" sz="1600" dirty="0" err="1" smtClean="0">
-                  <a:latin typeface="Courier New" pitchFamily="49" charset="0"/>
-                  <a:cs typeface="Courier New" pitchFamily="49" charset="0"/>
-                </a:rPr>
-                <a:t>int</a:t>
-              </a:r>
-              <a:r>
-                <a:rPr lang="en-US" sz="1600" dirty="0" smtClean="0">
-                  <a:latin typeface="Courier New" pitchFamily="49" charset="0"/>
-                  <a:cs typeface="Courier New" pitchFamily="49" charset="0"/>
-                </a:rPr>
-                <a:t> main(</a:t>
-              </a:r>
-              <a:r>
-                <a:rPr lang="en-US" sz="1600" dirty="0" err="1" smtClean="0">
-                  <a:latin typeface="Courier New" pitchFamily="49" charset="0"/>
-                  <a:cs typeface="Courier New" pitchFamily="49" charset="0"/>
-                </a:rPr>
-                <a:t>int</a:t>
-              </a:r>
-              <a:r>
-                <a:rPr lang="en-US" sz="1600" dirty="0" smtClean="0">
-                  <a:latin typeface="Courier New" pitchFamily="49" charset="0"/>
-                  <a:cs typeface="Courier New" pitchFamily="49" charset="0"/>
-                </a:rPr>
-                <a:t> </a:t>
-              </a:r>
-              <a:r>
-                <a:rPr lang="en-US" sz="1600" dirty="0" err="1" smtClean="0">
-                  <a:latin typeface="Courier New" pitchFamily="49" charset="0"/>
-                  <a:cs typeface="Courier New" pitchFamily="49" charset="0"/>
-                </a:rPr>
-                <a:t>argc</a:t>
-              </a:r>
-              <a:r>
-                <a:rPr lang="en-US" sz="1600" dirty="0" smtClean="0">
-                  <a:latin typeface="Courier New" pitchFamily="49" charset="0"/>
-                  <a:cs typeface="Courier New" pitchFamily="49" charset="0"/>
-                </a:rPr>
-                <a:t>, char *</a:t>
-              </a:r>
-              <a:r>
-                <a:rPr lang="en-US" sz="1600" dirty="0" err="1" smtClean="0">
-                  <a:latin typeface="Courier New" pitchFamily="49" charset="0"/>
-                  <a:cs typeface="Courier New" pitchFamily="49" charset="0"/>
-                </a:rPr>
-                <a:t>argv</a:t>
-              </a:r>
-              <a:r>
-                <a:rPr lang="en-US" sz="1600" dirty="0" smtClean="0">
-                  <a:latin typeface="Courier New" pitchFamily="49" charset="0"/>
-                  <a:cs typeface="Courier New" pitchFamily="49" charset="0"/>
-                </a:rPr>
-                <a:t>[]) {</a:t>
-              </a:r>
-            </a:p>
-            <a:p>
-              <a:r>
-                <a:rPr lang="en-US" sz="1600" dirty="0" smtClean="0">
-                  <a:latin typeface="Courier New" pitchFamily="49" charset="0"/>
-                  <a:cs typeface="Courier New" pitchFamily="49" charset="0"/>
-                </a:rPr>
-                <a:t> 5     </a:t>
-              </a:r>
-              <a:r>
-                <a:rPr lang="en-US" sz="1600" dirty="0" err="1" smtClean="0">
-                  <a:latin typeface="Courier New" pitchFamily="49" charset="0"/>
-                  <a:cs typeface="Courier New" pitchFamily="49" charset="0"/>
-                </a:rPr>
-                <a:t>int</a:t>
-              </a:r>
-              <a:r>
-                <a:rPr lang="en-US" sz="1600" dirty="0" smtClean="0">
-                  <a:latin typeface="Courier New" pitchFamily="49" charset="0"/>
-                  <a:cs typeface="Courier New" pitchFamily="49" charset="0"/>
-                </a:rPr>
-                <a:t> *x = (</a:t>
-              </a:r>
-              <a:r>
-                <a:rPr lang="en-US" sz="1600" dirty="0" err="1" smtClean="0">
-                  <a:latin typeface="Courier New" pitchFamily="49" charset="0"/>
-                  <a:cs typeface="Courier New" pitchFamily="49" charset="0"/>
-                </a:rPr>
-                <a:t>int</a:t>
-              </a:r>
-              <a:r>
-                <a:rPr lang="en-US" sz="1600" dirty="0" smtClean="0">
-                  <a:latin typeface="Courier New" pitchFamily="49" charset="0"/>
-                  <a:cs typeface="Courier New" pitchFamily="49" charset="0"/>
-                </a:rPr>
-                <a:t> *) </a:t>
-              </a:r>
-              <a:r>
-                <a:rPr lang="en-US" sz="1600" dirty="0" err="1" smtClean="0">
-                  <a:latin typeface="Courier New" pitchFamily="49" charset="0"/>
-                  <a:cs typeface="Courier New" pitchFamily="49" charset="0"/>
-                </a:rPr>
-                <a:t>calloc</a:t>
-              </a:r>
-              <a:r>
-                <a:rPr lang="en-US" sz="1600" dirty="0" smtClean="0">
-                  <a:latin typeface="Courier New" pitchFamily="49" charset="0"/>
-                  <a:cs typeface="Courier New" pitchFamily="49" charset="0"/>
-                </a:rPr>
-                <a:t>(10, </a:t>
-              </a:r>
-              <a:r>
-                <a:rPr lang="en-US" sz="1600" dirty="0" err="1" smtClean="0">
-                  <a:latin typeface="Courier New" pitchFamily="49" charset="0"/>
-                  <a:cs typeface="Courier New" pitchFamily="49" charset="0"/>
-                </a:rPr>
-                <a:t>sizeof</a:t>
-              </a:r>
-              <a:r>
-                <a:rPr lang="en-US" sz="1600" dirty="0" smtClean="0">
-                  <a:latin typeface="Courier New" pitchFamily="49" charset="0"/>
-                  <a:cs typeface="Courier New" pitchFamily="49" charset="0"/>
-                </a:rPr>
-                <a:t>(</a:t>
-              </a:r>
-              <a:r>
-                <a:rPr lang="en-US" sz="1600" dirty="0" err="1" smtClean="0">
-                  <a:latin typeface="Courier New" pitchFamily="49" charset="0"/>
-                  <a:cs typeface="Courier New" pitchFamily="49" charset="0"/>
-                </a:rPr>
-                <a:t>int</a:t>
-              </a:r>
-              <a:r>
-                <a:rPr lang="en-US" sz="1600" dirty="0" smtClean="0">
-                  <a:latin typeface="Courier New" pitchFamily="49" charset="0"/>
-                  <a:cs typeface="Courier New" pitchFamily="49" charset="0"/>
-                </a:rPr>
-                <a:t>));</a:t>
-              </a:r>
-            </a:p>
-            <a:p>
-              <a:r>
-                <a:rPr lang="en-US" sz="1600" dirty="0" smtClean="0">
-                  <a:latin typeface="Courier New" pitchFamily="49" charset="0"/>
-                  <a:cs typeface="Courier New" pitchFamily="49" charset="0"/>
-                </a:rPr>
-                <a:t> 6     x[10] = 12;</a:t>
-              </a:r>
-            </a:p>
-            <a:p>
-              <a:r>
-                <a:rPr lang="en-US" sz="1600" dirty="0" smtClean="0">
-                  <a:latin typeface="Courier New" pitchFamily="49" charset="0"/>
-                  <a:cs typeface="Courier New" pitchFamily="49" charset="0"/>
-                </a:rPr>
-                <a:t> 7     free(x);</a:t>
-              </a:r>
-            </a:p>
-            <a:p>
-              <a:r>
-                <a:rPr lang="en-US" sz="1600" dirty="0" smtClean="0">
-                  <a:latin typeface="Courier New" pitchFamily="49" charset="0"/>
-                  <a:cs typeface="Courier New" pitchFamily="49" charset="0"/>
-                </a:rPr>
-                <a:t> 8    return EXIT_SUCCESS;</a:t>
-              </a:r>
-            </a:p>
-            <a:p>
-              <a:r>
-                <a:rPr lang="en-US" sz="1600" dirty="0" smtClean="0">
-                  <a:latin typeface="Courier New" pitchFamily="49" charset="0"/>
-                  <a:cs typeface="Courier New" pitchFamily="49" charset="0"/>
-                </a:rPr>
-                <a:t> 9 }</a:t>
-              </a:r>
-            </a:p>
-          </p:txBody>
-        </p:sp>
-        <p:sp>
-          <p:nvSpPr>
-            <p:cNvPr id="5" name="TextBox 4"/>
-            <p:cNvSpPr txBox="1"/>
-            <p:nvPr/>
-          </p:nvSpPr>
-          <p:spPr>
-            <a:xfrm>
-              <a:off x="5182357" y="3653472"/>
-              <a:ext cx="1795684" cy="307777"/>
-            </a:xfrm>
-            <a:prstGeom prst="rect">
-              <a:avLst/>
-            </a:prstGeom>
-            <a:solidFill>
-              <a:schemeClr val="bg1"/>
-            </a:solidFill>
-            <a:ln>
-              <a:solidFill>
-                <a:schemeClr val="tx1"/>
-              </a:solidFill>
-            </a:ln>
-          </p:spPr>
-          <p:txBody>
-            <a:bodyPr wrap="none" rtlCol="0">
-              <a:spAutoFit/>
-            </a:bodyPr>
-            <a:lstStyle/>
-            <a:p>
-              <a:r>
-                <a:rPr lang="en-US" sz="1400" b="1" dirty="0" smtClean="0">
-                  <a:latin typeface="Courier New" pitchFamily="49" charset="0"/>
-                  <a:cs typeface="Courier New" pitchFamily="49" charset="0"/>
-                </a:rPr>
-                <a:t>array-</a:t>
-              </a:r>
-              <a:r>
-                <a:rPr lang="en-US" sz="1400" b="1" dirty="0" err="1" smtClean="0">
-                  <a:latin typeface="Courier New" pitchFamily="49" charset="0"/>
-                  <a:cs typeface="Courier New" pitchFamily="49" charset="0"/>
-                </a:rPr>
-                <a:t>overrun.c</a:t>
-              </a:r>
-              <a:endParaRPr lang="en-US" sz="1400" b="1" dirty="0">
-                <a:latin typeface="Courier New" pitchFamily="49" charset="0"/>
-                <a:cs typeface="Courier New" pitchFamily="49" charset="0"/>
-              </a:endParaRPr>
-            </a:p>
-          </p:txBody>
-        </p:sp>
-      </p:grpSp>
-      <p:grpSp>
-        <p:nvGrpSpPr>
-          <p:cNvPr id="6" name="Group 7"/>
-          <p:cNvGrpSpPr/>
-          <p:nvPr/>
-        </p:nvGrpSpPr>
-        <p:grpSpPr>
-          <a:xfrm>
-            <a:off x="3275856" y="2996952"/>
-            <a:ext cx="2997399" cy="369332"/>
-            <a:chOff x="2628652" y="3851756"/>
-            <a:chExt cx="2997399" cy="369332"/>
-          </a:xfrm>
-        </p:grpSpPr>
-        <p:cxnSp>
-          <p:nvCxnSpPr>
-            <p:cNvPr id="10" name="Straight Arrow Connector 9"/>
-            <p:cNvCxnSpPr/>
-            <p:nvPr/>
-          </p:nvCxnSpPr>
-          <p:spPr>
-            <a:xfrm rot="10800000">
-              <a:off x="2628652" y="4005064"/>
-              <a:ext cx="647204" cy="1588"/>
-            </a:xfrm>
-            <a:prstGeom prst="straightConnector1">
-              <a:avLst/>
-            </a:prstGeom>
-            <a:ln w="22225">
-              <a:solidFill>
-                <a:schemeClr val="tx1"/>
-              </a:solidFill>
-              <a:tailEnd type="stealth" w="lg" len="lg"/>
-            </a:ln>
-          </p:spPr>
-          <p:style>
-            <a:lnRef idx="1">
-              <a:schemeClr val="accent1"/>
-            </a:lnRef>
-            <a:fillRef idx="0">
-              <a:schemeClr val="accent1"/>
-            </a:fillRef>
-            <a:effectRef idx="0">
-              <a:schemeClr val="accent1"/>
-            </a:effectRef>
-            <a:fontRef idx="minor">
-              <a:schemeClr val="tx1"/>
-            </a:fontRef>
-          </p:style>
-        </p:cxnSp>
-        <p:sp>
-          <p:nvSpPr>
-            <p:cNvPr id="11" name="TextBox 10"/>
-            <p:cNvSpPr txBox="1"/>
-            <p:nvPr/>
-          </p:nvSpPr>
-          <p:spPr>
-            <a:xfrm>
-              <a:off x="3275856" y="3851756"/>
-              <a:ext cx="2350195" cy="369332"/>
-            </a:xfrm>
-            <a:prstGeom prst="rect">
-              <a:avLst/>
-            </a:prstGeom>
-            <a:solidFill>
-              <a:schemeClr val="bg1"/>
-            </a:solidFill>
-            <a:ln>
-              <a:solidFill>
-                <a:schemeClr val="tx1"/>
-              </a:solidFill>
-            </a:ln>
-          </p:spPr>
-          <p:txBody>
-            <a:bodyPr wrap="none" rtlCol="0">
-              <a:spAutoFit/>
-            </a:bodyPr>
-            <a:lstStyle/>
-            <a:p>
-              <a:r>
-                <a:rPr lang="en-US" dirty="0" smtClean="0">
-                  <a:latin typeface="Courier New" pitchFamily="49" charset="0"/>
-                  <a:cs typeface="Courier New" pitchFamily="49" charset="0"/>
-                </a:rPr>
-                <a:t>a[10]</a:t>
-              </a:r>
-              <a:r>
-                <a:rPr lang="en-US" dirty="0" smtClean="0"/>
-                <a:t> is not allocated</a:t>
-              </a:r>
-              <a:endParaRPr lang="en-US" dirty="0"/>
-            </a:p>
-          </p:txBody>
-        </p:sp>
-      </p:grpSp>
-      <p:sp>
-        <p:nvSpPr>
-          <p:cNvPr id="9" name="TextBox 8"/>
-          <p:cNvSpPr txBox="1"/>
-          <p:nvPr/>
-        </p:nvSpPr>
-        <p:spPr>
-          <a:xfrm>
-            <a:off x="77881" y="4293096"/>
-            <a:ext cx="8948283" cy="1815882"/>
-          </a:xfrm>
-          <a:prstGeom prst="rect">
-            <a:avLst/>
-          </a:prstGeom>
-          <a:solidFill>
-            <a:schemeClr val="accent5">
-              <a:lumMod val="40000"/>
-              <a:lumOff val="60000"/>
-            </a:schemeClr>
-          </a:solidFill>
-          <a:ln>
-            <a:solidFill>
-              <a:schemeClr val="tx1"/>
-            </a:solidFill>
-          </a:ln>
-        </p:spPr>
-        <p:txBody>
-          <a:bodyPr wrap="none" rtlCol="0">
-            <a:spAutoFit/>
-          </a:bodyPr>
-          <a:lstStyle/>
-          <a:p>
-            <a:r>
-              <a:rPr lang="en-US" sz="1600" dirty="0" smtClean="0">
-                <a:latin typeface="Courier New" pitchFamily="49" charset="0"/>
-                <a:cs typeface="Courier New" pitchFamily="49" charset="0"/>
-              </a:rPr>
-              <a:t>==1652==</a:t>
-            </a:r>
-          </a:p>
-          <a:p>
-            <a:r>
-              <a:rPr lang="en-US" sz="1600" dirty="0" smtClean="0">
-                <a:latin typeface="Courier New" pitchFamily="49" charset="0"/>
-                <a:cs typeface="Courier New" pitchFamily="49" charset="0"/>
-              </a:rPr>
-              <a:t>==1652== Invalid write of size 4</a:t>
-            </a:r>
-          </a:p>
-          <a:p>
-            <a:r>
-              <a:rPr lang="en-US" sz="1600" dirty="0" smtClean="0">
-                <a:latin typeface="Courier New" pitchFamily="49" charset="0"/>
-                <a:cs typeface="Courier New" pitchFamily="49" charset="0"/>
-              </a:rPr>
-              <a:t>==1652==    at 0x804841C: main (array-overrun.c:6)</a:t>
-            </a:r>
-          </a:p>
-          <a:p>
-            <a:r>
-              <a:rPr lang="en-US" sz="1600" dirty="0" smtClean="0">
-                <a:latin typeface="Courier New" pitchFamily="49" charset="0"/>
-                <a:cs typeface="Courier New" pitchFamily="49" charset="0"/>
-              </a:rPr>
-              <a:t>==1652==  Address 0x41a1050 is 0 bytes after a block of size 40 </a:t>
-            </a:r>
-            <a:r>
-              <a:rPr lang="en-US" sz="1600" dirty="0" err="1" smtClean="0">
-                <a:latin typeface="Courier New" pitchFamily="49" charset="0"/>
-                <a:cs typeface="Courier New" pitchFamily="49" charset="0"/>
-              </a:rPr>
-              <a:t>alloc'd</a:t>
-            </a:r>
-            <a:endParaRPr lang="en-US" sz="1600" dirty="0" smtClean="0">
-              <a:latin typeface="Courier New" pitchFamily="49" charset="0"/>
-              <a:cs typeface="Courier New" pitchFamily="49" charset="0"/>
-            </a:endParaRPr>
-          </a:p>
-          <a:p>
-            <a:r>
-              <a:rPr lang="en-US" sz="1600" dirty="0" smtClean="0">
-                <a:latin typeface="Courier New" pitchFamily="49" charset="0"/>
-                <a:cs typeface="Courier New" pitchFamily="49" charset="0"/>
-              </a:rPr>
-              <a:t>==1652==    at 0x4025315: </a:t>
-            </a:r>
-            <a:r>
-              <a:rPr lang="en-US" sz="1600" dirty="0" err="1" smtClean="0">
-                <a:latin typeface="Courier New" pitchFamily="49" charset="0"/>
-                <a:cs typeface="Courier New" pitchFamily="49" charset="0"/>
-              </a:rPr>
-              <a:t>calloc</a:t>
-            </a:r>
-            <a:r>
-              <a:rPr lang="en-US" sz="1600" dirty="0" smtClean="0">
-                <a:latin typeface="Courier New" pitchFamily="49" charset="0"/>
-                <a:cs typeface="Courier New" pitchFamily="49" charset="0"/>
-              </a:rPr>
-              <a:t> (vg_replace_malloc.c:467)</a:t>
-            </a:r>
-          </a:p>
-          <a:p>
-            <a:r>
-              <a:rPr lang="en-US" sz="1600" dirty="0" smtClean="0">
-                <a:latin typeface="Courier New" pitchFamily="49" charset="0"/>
-                <a:cs typeface="Courier New" pitchFamily="49" charset="0"/>
-              </a:rPr>
-              <a:t>==1652==    by 0x8048410: main (array-overrun.c:5)</a:t>
-            </a:r>
-          </a:p>
-          <a:p>
-            <a:r>
-              <a:rPr lang="en-US" sz="1600" dirty="0" smtClean="0">
-                <a:latin typeface="Courier New" pitchFamily="49" charset="0"/>
-                <a:cs typeface="Courier New" pitchFamily="49" charset="0"/>
-              </a:rPr>
-              <a:t>==1652==</a:t>
-            </a:r>
-          </a:p>
-        </p:txBody>
-      </p:sp>
-    </p:spTree>
-    <p:extLst>
-      <p:ext uri="{BB962C8B-B14F-4D97-AF65-F5344CB8AC3E}">
-        <p14:creationId xmlns:p14="http://schemas.microsoft.com/office/powerpoint/2010/main" val="3227553636"/>
-      </p:ext>
-    </p:extLst>
-  </p:cSld>
-  <p:clrMapOvr>
-    <a:masterClrMapping/>
-  </p:clrMapOvr>
-  <p:timing>
-    <p:tnLst>
-      <p:par>
-        <p:cTn id="1" dur="indefinite" restart="never" nodeType="tmRoot">
-          <p:childTnLst>
-            <p:seq concurrent="1" nextAc="seek">
-              <p:cTn id="2" dur="indefinite" nodeType="mainSeq">
-                <p:childTnLst>
-                  <p:par>
-                    <p:cTn id="3" fill="hold">
-                      <p:stCondLst>
-                        <p:cond delay="indefinite"/>
-                      </p:stCondLst>
-                      <p:childTnLst>
-                        <p:par>
-                          <p:cTn id="4" fill="hold">
-                            <p:stCondLst>
-                              <p:cond delay="0"/>
-                            </p:stCondLst>
-                            <p:childTnLst>
-                              <p:par>
-                                <p:cTn id="5" presetID="1" presetClass="entr" presetSubtype="0" fill="hold" grpId="0" nodeType="clickEffect">
-                                  <p:stCondLst>
-                                    <p:cond delay="0"/>
-                                  </p:stCondLst>
-                                  <p:childTnLst>
-                                    <p:set>
-                                      <p:cBhvr>
-                                        <p:cTn id="6" dur="1" fill="hold">
-                                          <p:stCondLst>
-                                            <p:cond delay="0"/>
-                                          </p:stCondLst>
-                                        </p:cTn>
-                                        <p:tgtEl>
-                                          <p:spTgt spid="9"/>
-                                        </p:tgtEl>
-                                        <p:attrNameLst>
-                                          <p:attrName>style.visibility</p:attrName>
-                                        </p:attrNameLst>
-                                      </p:cBhvr>
-                                      <p:to>
-                                        <p:strVal val="visible"/>
-                                      </p:to>
-                                    </p:set>
-                                  </p:childTnLst>
-                                </p:cTn>
-                              </p:par>
-                            </p:childTnLst>
-                          </p:cTn>
-                        </p:par>
-                      </p:childTnLst>
-                    </p:cTn>
-                  </p:par>
-                  <p:par>
-                    <p:cTn id="7" fill="hold">
-                      <p:stCondLst>
-                        <p:cond delay="indefinite"/>
-                      </p:stCondLst>
-                      <p:childTnLst>
-                        <p:par>
-                          <p:cTn id="8" fill="hold">
-                            <p:stCondLst>
-                              <p:cond delay="0"/>
-                            </p:stCondLst>
-                            <p:childTnLst>
-                              <p:par>
-                                <p:cTn id="9" presetID="1" presetClass="entr" presetSubtype="0" fill="hold" nodeType="clickEffect">
-                                  <p:stCondLst>
-                                    <p:cond delay="0"/>
-                                  </p:stCondLst>
-                                  <p:childTnLst>
-                                    <p:set>
-                                      <p:cBhvr>
-                                        <p:cTn id="10" dur="1" fill="hold">
-                                          <p:stCondLst>
-                                            <p:cond delay="0"/>
-                                          </p:stCondLst>
-                                        </p:cTn>
-                                        <p:tgtEl>
-                                          <p:spTgt spid="6"/>
-                                        </p:tgtEl>
-                                        <p:attrNameLst>
-                                          <p:attrName>style.visibility</p:attrName>
-                                        </p:attrNameLst>
-                                      </p:cBhvr>
-                                      <p:to>
-                                        <p:strVal val="visible"/>
-                                      </p:to>
-                                    </p:set>
-                                  </p:childTnLst>
-                                </p:cTn>
-                              </p:par>
-                            </p:childTnLst>
-                          </p:cTn>
-                        </p:par>
-                      </p:childTnLst>
-                    </p:cTn>
-                  </p:par>
-                </p:childTnLst>
-              </p:cTn>
-              <p:prevCondLst>
-                <p:cond evt="onPrev" delay="0">
-                  <p:tgtEl>
-                    <p:sldTgt/>
-                  </p:tgtEl>
-                </p:cond>
-              </p:prevCondLst>
-              <p:nextCondLst>
-                <p:cond evt="onNext" delay="0">
-                  <p:tgtEl>
-                    <p:sldTgt/>
-                  </p:tgtEl>
-                </p:cond>
-              </p:nextCondLst>
-            </p:seq>
-          </p:childTnLst>
-        </p:cTn>
-      </p:par>
-    </p:tnLst>
-    <p:bldLst>
-      <p:bldP spid="9" grpId="0" animBg="1"/>
-    </p:bldLst>
   </p:timing>
 </p:sld>
 </file>
@@ -41633,6 +41072,732 @@
           <a:p>
             <a:r>
               <a:rPr lang="en-US" dirty="0" smtClean="0"/>
+              <a:t>Valgrind: array bounds overrun</a:t>
+            </a:r>
+            <a:endParaRPr lang="en-US" dirty="0"/>
+          </a:p>
+        </p:txBody>
+      </p:sp>
+      <p:grpSp>
+        <p:nvGrpSpPr>
+          <p:cNvPr id="3" name="Group 4"/>
+          <p:cNvGrpSpPr/>
+          <p:nvPr/>
+        </p:nvGrpSpPr>
+        <p:grpSpPr>
+          <a:xfrm>
+            <a:off x="725799" y="1681063"/>
+            <a:ext cx="6232796" cy="2308324"/>
+            <a:chOff x="755576" y="1655004"/>
+            <a:chExt cx="6232796" cy="2308324"/>
+          </a:xfrm>
+        </p:grpSpPr>
+        <p:sp>
+          <p:nvSpPr>
+            <p:cNvPr id="4" name="TextBox 3"/>
+            <p:cNvSpPr txBox="1"/>
+            <p:nvPr/>
+          </p:nvSpPr>
+          <p:spPr>
+            <a:xfrm>
+              <a:off x="755576" y="1655004"/>
+              <a:ext cx="6232796" cy="2308324"/>
+            </a:xfrm>
+            <a:prstGeom prst="rect">
+              <a:avLst/>
+            </a:prstGeom>
+            <a:solidFill>
+              <a:schemeClr val="bg1">
+                <a:lumMod val="85000"/>
+              </a:schemeClr>
+            </a:solidFill>
+            <a:ln>
+              <a:solidFill>
+                <a:schemeClr val="tx1"/>
+              </a:solidFill>
+            </a:ln>
+          </p:spPr>
+          <p:txBody>
+            <a:bodyPr wrap="none" rtlCol="0">
+              <a:spAutoFit/>
+            </a:bodyPr>
+            <a:lstStyle/>
+            <a:p>
+              <a:r>
+                <a:rPr lang="en-US" sz="1600" dirty="0" smtClean="0">
+                  <a:latin typeface="Courier New" pitchFamily="49" charset="0"/>
+                  <a:cs typeface="Courier New" pitchFamily="49" charset="0"/>
+                </a:rPr>
+                <a:t> 1 #include &lt;</a:t>
+              </a:r>
+              <a:r>
+                <a:rPr lang="en-US" sz="1600" dirty="0" err="1" smtClean="0">
+                  <a:latin typeface="Courier New" pitchFamily="49" charset="0"/>
+                  <a:cs typeface="Courier New" pitchFamily="49" charset="0"/>
+                </a:rPr>
+                <a:t>stdio.h</a:t>
+              </a:r>
+              <a:r>
+                <a:rPr lang="en-US" sz="1600" dirty="0" smtClean="0">
+                  <a:latin typeface="Courier New" pitchFamily="49" charset="0"/>
+                  <a:cs typeface="Courier New" pitchFamily="49" charset="0"/>
+                </a:rPr>
+                <a:t>&gt;</a:t>
+              </a:r>
+            </a:p>
+            <a:p>
+              <a:r>
+                <a:rPr lang="en-US" sz="1600" dirty="0" smtClean="0">
+                  <a:latin typeface="Courier New" pitchFamily="49" charset="0"/>
+                  <a:cs typeface="Courier New" pitchFamily="49" charset="0"/>
+                </a:rPr>
+                <a:t> 2 #include &lt;</a:t>
+              </a:r>
+              <a:r>
+                <a:rPr lang="en-US" sz="1600" dirty="0" err="1" smtClean="0">
+                  <a:latin typeface="Courier New" pitchFamily="49" charset="0"/>
+                  <a:cs typeface="Courier New" pitchFamily="49" charset="0"/>
+                </a:rPr>
+                <a:t>stdlib.h</a:t>
+              </a:r>
+              <a:r>
+                <a:rPr lang="en-US" sz="1600" dirty="0" smtClean="0">
+                  <a:latin typeface="Courier New" pitchFamily="49" charset="0"/>
+                  <a:cs typeface="Courier New" pitchFamily="49" charset="0"/>
+                </a:rPr>
+                <a:t>&gt;</a:t>
+              </a:r>
+            </a:p>
+            <a:p>
+              <a:r>
+                <a:rPr lang="en-US" sz="1600" dirty="0" smtClean="0">
+                  <a:latin typeface="Courier New" pitchFamily="49" charset="0"/>
+                  <a:cs typeface="Courier New" pitchFamily="49" charset="0"/>
+                </a:rPr>
+                <a:t> 3</a:t>
+              </a:r>
+            </a:p>
+            <a:p>
+              <a:r>
+                <a:rPr lang="en-US" sz="1600" dirty="0" smtClean="0">
+                  <a:latin typeface="Courier New" pitchFamily="49" charset="0"/>
+                  <a:cs typeface="Courier New" pitchFamily="49" charset="0"/>
+                </a:rPr>
+                <a:t> 4 </a:t>
+              </a:r>
+              <a:r>
+                <a:rPr lang="en-US" sz="1600" dirty="0" err="1" smtClean="0">
+                  <a:latin typeface="Courier New" pitchFamily="49" charset="0"/>
+                  <a:cs typeface="Courier New" pitchFamily="49" charset="0"/>
+                </a:rPr>
+                <a:t>int</a:t>
+              </a:r>
+              <a:r>
+                <a:rPr lang="en-US" sz="1600" dirty="0" smtClean="0">
+                  <a:latin typeface="Courier New" pitchFamily="49" charset="0"/>
+                  <a:cs typeface="Courier New" pitchFamily="49" charset="0"/>
+                </a:rPr>
+                <a:t> main(</a:t>
+              </a:r>
+              <a:r>
+                <a:rPr lang="en-US" sz="1600" dirty="0" err="1" smtClean="0">
+                  <a:latin typeface="Courier New" pitchFamily="49" charset="0"/>
+                  <a:cs typeface="Courier New" pitchFamily="49" charset="0"/>
+                </a:rPr>
+                <a:t>int</a:t>
+              </a:r>
+              <a:r>
+                <a:rPr lang="en-US" sz="1600" dirty="0" smtClean="0">
+                  <a:latin typeface="Courier New" pitchFamily="49" charset="0"/>
+                  <a:cs typeface="Courier New" pitchFamily="49" charset="0"/>
+                </a:rPr>
+                <a:t> </a:t>
+              </a:r>
+              <a:r>
+                <a:rPr lang="en-US" sz="1600" dirty="0" err="1" smtClean="0">
+                  <a:latin typeface="Courier New" pitchFamily="49" charset="0"/>
+                  <a:cs typeface="Courier New" pitchFamily="49" charset="0"/>
+                </a:rPr>
+                <a:t>argc</a:t>
+              </a:r>
+              <a:r>
+                <a:rPr lang="en-US" sz="1600" dirty="0" smtClean="0">
+                  <a:latin typeface="Courier New" pitchFamily="49" charset="0"/>
+                  <a:cs typeface="Courier New" pitchFamily="49" charset="0"/>
+                </a:rPr>
+                <a:t>, char *</a:t>
+              </a:r>
+              <a:r>
+                <a:rPr lang="en-US" sz="1600" dirty="0" err="1" smtClean="0">
+                  <a:latin typeface="Courier New" pitchFamily="49" charset="0"/>
+                  <a:cs typeface="Courier New" pitchFamily="49" charset="0"/>
+                </a:rPr>
+                <a:t>argv</a:t>
+              </a:r>
+              <a:r>
+                <a:rPr lang="en-US" sz="1600" dirty="0" smtClean="0">
+                  <a:latin typeface="Courier New" pitchFamily="49" charset="0"/>
+                  <a:cs typeface="Courier New" pitchFamily="49" charset="0"/>
+                </a:rPr>
+                <a:t>[]) {</a:t>
+              </a:r>
+            </a:p>
+            <a:p>
+              <a:r>
+                <a:rPr lang="en-US" sz="1600" dirty="0" smtClean="0">
+                  <a:latin typeface="Courier New" pitchFamily="49" charset="0"/>
+                  <a:cs typeface="Courier New" pitchFamily="49" charset="0"/>
+                </a:rPr>
+                <a:t> 5     </a:t>
+              </a:r>
+              <a:r>
+                <a:rPr lang="en-US" sz="1600" dirty="0" err="1" smtClean="0">
+                  <a:latin typeface="Courier New" pitchFamily="49" charset="0"/>
+                  <a:cs typeface="Courier New" pitchFamily="49" charset="0"/>
+                </a:rPr>
+                <a:t>int</a:t>
+              </a:r>
+              <a:r>
+                <a:rPr lang="en-US" sz="1600" dirty="0" smtClean="0">
+                  <a:latin typeface="Courier New" pitchFamily="49" charset="0"/>
+                  <a:cs typeface="Courier New" pitchFamily="49" charset="0"/>
+                </a:rPr>
+                <a:t> *x = (</a:t>
+              </a:r>
+              <a:r>
+                <a:rPr lang="en-US" sz="1600" dirty="0" err="1" smtClean="0">
+                  <a:latin typeface="Courier New" pitchFamily="49" charset="0"/>
+                  <a:cs typeface="Courier New" pitchFamily="49" charset="0"/>
+                </a:rPr>
+                <a:t>int</a:t>
+              </a:r>
+              <a:r>
+                <a:rPr lang="en-US" sz="1600" dirty="0" smtClean="0">
+                  <a:latin typeface="Courier New" pitchFamily="49" charset="0"/>
+                  <a:cs typeface="Courier New" pitchFamily="49" charset="0"/>
+                </a:rPr>
+                <a:t> *) </a:t>
+              </a:r>
+              <a:r>
+                <a:rPr lang="en-US" sz="1600" dirty="0" err="1" smtClean="0">
+                  <a:latin typeface="Courier New" pitchFamily="49" charset="0"/>
+                  <a:cs typeface="Courier New" pitchFamily="49" charset="0"/>
+                </a:rPr>
+                <a:t>calloc</a:t>
+              </a:r>
+              <a:r>
+                <a:rPr lang="en-US" sz="1600" dirty="0" smtClean="0">
+                  <a:latin typeface="Courier New" pitchFamily="49" charset="0"/>
+                  <a:cs typeface="Courier New" pitchFamily="49" charset="0"/>
+                </a:rPr>
+                <a:t>(10, </a:t>
+              </a:r>
+              <a:r>
+                <a:rPr lang="en-US" sz="1600" dirty="0" err="1" smtClean="0">
+                  <a:latin typeface="Courier New" pitchFamily="49" charset="0"/>
+                  <a:cs typeface="Courier New" pitchFamily="49" charset="0"/>
+                </a:rPr>
+                <a:t>sizeof</a:t>
+              </a:r>
+              <a:r>
+                <a:rPr lang="en-US" sz="1600" dirty="0" smtClean="0">
+                  <a:latin typeface="Courier New" pitchFamily="49" charset="0"/>
+                  <a:cs typeface="Courier New" pitchFamily="49" charset="0"/>
+                </a:rPr>
+                <a:t>(</a:t>
+              </a:r>
+              <a:r>
+                <a:rPr lang="en-US" sz="1600" dirty="0" err="1" smtClean="0">
+                  <a:latin typeface="Courier New" pitchFamily="49" charset="0"/>
+                  <a:cs typeface="Courier New" pitchFamily="49" charset="0"/>
+                </a:rPr>
+                <a:t>int</a:t>
+              </a:r>
+              <a:r>
+                <a:rPr lang="en-US" sz="1600" dirty="0" smtClean="0">
+                  <a:latin typeface="Courier New" pitchFamily="49" charset="0"/>
+                  <a:cs typeface="Courier New" pitchFamily="49" charset="0"/>
+                </a:rPr>
+                <a:t>));</a:t>
+              </a:r>
+            </a:p>
+            <a:p>
+              <a:r>
+                <a:rPr lang="en-US" sz="1600" dirty="0" smtClean="0">
+                  <a:latin typeface="Courier New" pitchFamily="49" charset="0"/>
+                  <a:cs typeface="Courier New" pitchFamily="49" charset="0"/>
+                </a:rPr>
+                <a:t> 6     x[10] = 12;</a:t>
+              </a:r>
+            </a:p>
+            <a:p>
+              <a:r>
+                <a:rPr lang="en-US" sz="1600" dirty="0" smtClean="0">
+                  <a:latin typeface="Courier New" pitchFamily="49" charset="0"/>
+                  <a:cs typeface="Courier New" pitchFamily="49" charset="0"/>
+                </a:rPr>
+                <a:t> 7     free(x);</a:t>
+              </a:r>
+            </a:p>
+            <a:p>
+              <a:r>
+                <a:rPr lang="en-US" sz="1600" dirty="0" smtClean="0">
+                  <a:latin typeface="Courier New" pitchFamily="49" charset="0"/>
+                  <a:cs typeface="Courier New" pitchFamily="49" charset="0"/>
+                </a:rPr>
+                <a:t> 8    return EXIT_SUCCESS;</a:t>
+              </a:r>
+            </a:p>
+            <a:p>
+              <a:r>
+                <a:rPr lang="en-US" sz="1600" dirty="0" smtClean="0">
+                  <a:latin typeface="Courier New" pitchFamily="49" charset="0"/>
+                  <a:cs typeface="Courier New" pitchFamily="49" charset="0"/>
+                </a:rPr>
+                <a:t> 9 }</a:t>
+              </a:r>
+            </a:p>
+          </p:txBody>
+        </p:sp>
+        <p:sp>
+          <p:nvSpPr>
+            <p:cNvPr id="5" name="TextBox 4"/>
+            <p:cNvSpPr txBox="1"/>
+            <p:nvPr/>
+          </p:nvSpPr>
+          <p:spPr>
+            <a:xfrm>
+              <a:off x="5182357" y="3653472"/>
+              <a:ext cx="1795684" cy="307777"/>
+            </a:xfrm>
+            <a:prstGeom prst="rect">
+              <a:avLst/>
+            </a:prstGeom>
+            <a:solidFill>
+              <a:schemeClr val="bg1"/>
+            </a:solidFill>
+            <a:ln>
+              <a:solidFill>
+                <a:schemeClr val="tx1"/>
+              </a:solidFill>
+            </a:ln>
+          </p:spPr>
+          <p:txBody>
+            <a:bodyPr wrap="none" rtlCol="0">
+              <a:spAutoFit/>
+            </a:bodyPr>
+            <a:lstStyle/>
+            <a:p>
+              <a:r>
+                <a:rPr lang="en-US" sz="1400" b="1" dirty="0" smtClean="0">
+                  <a:latin typeface="Courier New" pitchFamily="49" charset="0"/>
+                  <a:cs typeface="Courier New" pitchFamily="49" charset="0"/>
+                </a:rPr>
+                <a:t>array-</a:t>
+              </a:r>
+              <a:r>
+                <a:rPr lang="en-US" sz="1400" b="1" dirty="0" err="1" smtClean="0">
+                  <a:latin typeface="Courier New" pitchFamily="49" charset="0"/>
+                  <a:cs typeface="Courier New" pitchFamily="49" charset="0"/>
+                </a:rPr>
+                <a:t>overrun.c</a:t>
+              </a:r>
+              <a:endParaRPr lang="en-US" sz="1400" b="1" dirty="0">
+                <a:latin typeface="Courier New" pitchFamily="49" charset="0"/>
+                <a:cs typeface="Courier New" pitchFamily="49" charset="0"/>
+              </a:endParaRPr>
+            </a:p>
+          </p:txBody>
+        </p:sp>
+      </p:grpSp>
+      <p:grpSp>
+        <p:nvGrpSpPr>
+          <p:cNvPr id="6" name="Group 7"/>
+          <p:cNvGrpSpPr/>
+          <p:nvPr/>
+        </p:nvGrpSpPr>
+        <p:grpSpPr>
+          <a:xfrm>
+            <a:off x="3275856" y="2996952"/>
+            <a:ext cx="2997399" cy="369332"/>
+            <a:chOff x="2628652" y="3851756"/>
+            <a:chExt cx="2997399" cy="369332"/>
+          </a:xfrm>
+        </p:grpSpPr>
+        <p:cxnSp>
+          <p:nvCxnSpPr>
+            <p:cNvPr id="10" name="Straight Arrow Connector 9"/>
+            <p:cNvCxnSpPr/>
+            <p:nvPr/>
+          </p:nvCxnSpPr>
+          <p:spPr>
+            <a:xfrm rot="10800000">
+              <a:off x="2628652" y="4005064"/>
+              <a:ext cx="647204" cy="1588"/>
+            </a:xfrm>
+            <a:prstGeom prst="straightConnector1">
+              <a:avLst/>
+            </a:prstGeom>
+            <a:ln w="22225">
+              <a:solidFill>
+                <a:schemeClr val="tx1"/>
+              </a:solidFill>
+              <a:tailEnd type="stealth" w="lg" len="lg"/>
+            </a:ln>
+          </p:spPr>
+          <p:style>
+            <a:lnRef idx="1">
+              <a:schemeClr val="accent1"/>
+            </a:lnRef>
+            <a:fillRef idx="0">
+              <a:schemeClr val="accent1"/>
+            </a:fillRef>
+            <a:effectRef idx="0">
+              <a:schemeClr val="accent1"/>
+            </a:effectRef>
+            <a:fontRef idx="minor">
+              <a:schemeClr val="tx1"/>
+            </a:fontRef>
+          </p:style>
+        </p:cxnSp>
+        <p:sp>
+          <p:nvSpPr>
+            <p:cNvPr id="11" name="TextBox 10"/>
+            <p:cNvSpPr txBox="1"/>
+            <p:nvPr/>
+          </p:nvSpPr>
+          <p:spPr>
+            <a:xfrm>
+              <a:off x="3275856" y="3851756"/>
+              <a:ext cx="2350195" cy="369332"/>
+            </a:xfrm>
+            <a:prstGeom prst="rect">
+              <a:avLst/>
+            </a:prstGeom>
+            <a:solidFill>
+              <a:schemeClr val="bg1"/>
+            </a:solidFill>
+            <a:ln>
+              <a:solidFill>
+                <a:schemeClr val="tx1"/>
+              </a:solidFill>
+            </a:ln>
+          </p:spPr>
+          <p:txBody>
+            <a:bodyPr wrap="none" rtlCol="0">
+              <a:spAutoFit/>
+            </a:bodyPr>
+            <a:lstStyle/>
+            <a:p>
+              <a:r>
+                <a:rPr lang="en-US" dirty="0" smtClean="0">
+                  <a:latin typeface="Courier New" pitchFamily="49" charset="0"/>
+                  <a:cs typeface="Courier New" pitchFamily="49" charset="0"/>
+                </a:rPr>
+                <a:t>a[10]</a:t>
+              </a:r>
+              <a:r>
+                <a:rPr lang="en-US" dirty="0" smtClean="0"/>
+                <a:t> is not allocated</a:t>
+              </a:r>
+              <a:endParaRPr lang="en-US" dirty="0"/>
+            </a:p>
+          </p:txBody>
+        </p:sp>
+      </p:grpSp>
+      <p:sp>
+        <p:nvSpPr>
+          <p:cNvPr id="9" name="TextBox 8"/>
+          <p:cNvSpPr txBox="1"/>
+          <p:nvPr/>
+        </p:nvSpPr>
+        <p:spPr>
+          <a:xfrm>
+            <a:off x="77881" y="4293096"/>
+            <a:ext cx="8948283" cy="1815882"/>
+          </a:xfrm>
+          <a:prstGeom prst="rect">
+            <a:avLst/>
+          </a:prstGeom>
+          <a:solidFill>
+            <a:schemeClr val="accent5">
+              <a:lumMod val="40000"/>
+              <a:lumOff val="60000"/>
+            </a:schemeClr>
+          </a:solidFill>
+          <a:ln>
+            <a:solidFill>
+              <a:schemeClr val="tx1"/>
+            </a:solidFill>
+          </a:ln>
+        </p:spPr>
+        <p:txBody>
+          <a:bodyPr wrap="none" rtlCol="0">
+            <a:spAutoFit/>
+          </a:bodyPr>
+          <a:lstStyle/>
+          <a:p>
+            <a:r>
+              <a:rPr lang="en-US" sz="1600" dirty="0" smtClean="0">
+                <a:latin typeface="Courier New" pitchFamily="49" charset="0"/>
+                <a:cs typeface="Courier New" pitchFamily="49" charset="0"/>
+              </a:rPr>
+              <a:t>==1652==</a:t>
+            </a:r>
+          </a:p>
+          <a:p>
+            <a:r>
+              <a:rPr lang="en-US" sz="1600" dirty="0" smtClean="0">
+                <a:latin typeface="Courier New" pitchFamily="49" charset="0"/>
+                <a:cs typeface="Courier New" pitchFamily="49" charset="0"/>
+              </a:rPr>
+              <a:t>==1652== Invalid write of size 4</a:t>
+            </a:r>
+          </a:p>
+          <a:p>
+            <a:r>
+              <a:rPr lang="en-US" sz="1600" dirty="0" smtClean="0">
+                <a:latin typeface="Courier New" pitchFamily="49" charset="0"/>
+                <a:cs typeface="Courier New" pitchFamily="49" charset="0"/>
+              </a:rPr>
+              <a:t>==1652==    at 0x804841C: main (array-overrun.c:6)</a:t>
+            </a:r>
+          </a:p>
+          <a:p>
+            <a:r>
+              <a:rPr lang="en-US" sz="1600" dirty="0" smtClean="0">
+                <a:latin typeface="Courier New" pitchFamily="49" charset="0"/>
+                <a:cs typeface="Courier New" pitchFamily="49" charset="0"/>
+              </a:rPr>
+              <a:t>==1652==  Address 0x41a1050 is 0 bytes after a block of size 40 </a:t>
+            </a:r>
+            <a:r>
+              <a:rPr lang="en-US" sz="1600" dirty="0" err="1" smtClean="0">
+                <a:latin typeface="Courier New" pitchFamily="49" charset="0"/>
+                <a:cs typeface="Courier New" pitchFamily="49" charset="0"/>
+              </a:rPr>
+              <a:t>alloc'd</a:t>
+            </a:r>
+            <a:endParaRPr lang="en-US" sz="1600" dirty="0" smtClean="0">
+              <a:latin typeface="Courier New" pitchFamily="49" charset="0"/>
+              <a:cs typeface="Courier New" pitchFamily="49" charset="0"/>
+            </a:endParaRPr>
+          </a:p>
+          <a:p>
+            <a:r>
+              <a:rPr lang="en-US" sz="1600" dirty="0" smtClean="0">
+                <a:latin typeface="Courier New" pitchFamily="49" charset="0"/>
+                <a:cs typeface="Courier New" pitchFamily="49" charset="0"/>
+              </a:rPr>
+              <a:t>==1652==    at 0x4025315: </a:t>
+            </a:r>
+            <a:r>
+              <a:rPr lang="en-US" sz="1600" dirty="0" err="1" smtClean="0">
+                <a:latin typeface="Courier New" pitchFamily="49" charset="0"/>
+                <a:cs typeface="Courier New" pitchFamily="49" charset="0"/>
+              </a:rPr>
+              <a:t>calloc</a:t>
+            </a:r>
+            <a:r>
+              <a:rPr lang="en-US" sz="1600" dirty="0" smtClean="0">
+                <a:latin typeface="Courier New" pitchFamily="49" charset="0"/>
+                <a:cs typeface="Courier New" pitchFamily="49" charset="0"/>
+              </a:rPr>
+              <a:t> (vg_replace_malloc.c:467)</a:t>
+            </a:r>
+          </a:p>
+          <a:p>
+            <a:r>
+              <a:rPr lang="en-US" sz="1600" dirty="0" smtClean="0">
+                <a:latin typeface="Courier New" pitchFamily="49" charset="0"/>
+                <a:cs typeface="Courier New" pitchFamily="49" charset="0"/>
+              </a:rPr>
+              <a:t>==1652==    by 0x8048410: main (array-overrun.c:5)</a:t>
+            </a:r>
+          </a:p>
+          <a:p>
+            <a:r>
+              <a:rPr lang="en-US" sz="1600" dirty="0" smtClean="0">
+                <a:latin typeface="Courier New" pitchFamily="49" charset="0"/>
+                <a:cs typeface="Courier New" pitchFamily="49" charset="0"/>
+              </a:rPr>
+              <a:t>==1652==</a:t>
+            </a:r>
+          </a:p>
+        </p:txBody>
+      </p:sp>
+    </p:spTree>
+    <p:extLst>
+      <p:ext uri="{BB962C8B-B14F-4D97-AF65-F5344CB8AC3E}">
+        <p14:creationId xmlns:p14="http://schemas.microsoft.com/office/powerpoint/2010/main" val="3227553636"/>
+      </p:ext>
+    </p:extLst>
+  </p:cSld>
+  <p:clrMapOvr>
+    <a:masterClrMapping/>
+  </p:clrMapOvr>
+  <p:timing>
+    <p:tnLst>
+      <p:par>
+        <p:cTn id="1" dur="indefinite" restart="never" nodeType="tmRoot">
+          <p:childTnLst>
+            <p:seq concurrent="1" nextAc="seek">
+              <p:cTn id="2" dur="indefinite" nodeType="mainSeq">
+                <p:childTnLst>
+                  <p:par>
+                    <p:cTn id="3" fill="hold">
+                      <p:stCondLst>
+                        <p:cond delay="indefinite"/>
+                      </p:stCondLst>
+                      <p:childTnLst>
+                        <p:par>
+                          <p:cTn id="4" fill="hold">
+                            <p:stCondLst>
+                              <p:cond delay="0"/>
+                            </p:stCondLst>
+                            <p:childTnLst>
+                              <p:par>
+                                <p:cTn id="5" presetID="1" presetClass="entr" presetSubtype="0" fill="hold" grpId="0" nodeType="clickEffect">
+                                  <p:stCondLst>
+                                    <p:cond delay="0"/>
+                                  </p:stCondLst>
+                                  <p:childTnLst>
+                                    <p:set>
+                                      <p:cBhvr>
+                                        <p:cTn id="6" dur="1" fill="hold">
+                                          <p:stCondLst>
+                                            <p:cond delay="0"/>
+                                          </p:stCondLst>
+                                        </p:cTn>
+                                        <p:tgtEl>
+                                          <p:spTgt spid="9"/>
+                                        </p:tgtEl>
+                                        <p:attrNameLst>
+                                          <p:attrName>style.visibility</p:attrName>
+                                        </p:attrNameLst>
+                                      </p:cBhvr>
+                                      <p:to>
+                                        <p:strVal val="visible"/>
+                                      </p:to>
+                                    </p:set>
+                                  </p:childTnLst>
+                                </p:cTn>
+                              </p:par>
+                            </p:childTnLst>
+                          </p:cTn>
+                        </p:par>
+                      </p:childTnLst>
+                    </p:cTn>
+                  </p:par>
+                  <p:par>
+                    <p:cTn id="7" fill="hold">
+                      <p:stCondLst>
+                        <p:cond delay="indefinite"/>
+                      </p:stCondLst>
+                      <p:childTnLst>
+                        <p:par>
+                          <p:cTn id="8" fill="hold">
+                            <p:stCondLst>
+                              <p:cond delay="0"/>
+                            </p:stCondLst>
+                            <p:childTnLst>
+                              <p:par>
+                                <p:cTn id="9" presetID="1" presetClass="entr" presetSubtype="0" fill="hold" nodeType="clickEffect">
+                                  <p:stCondLst>
+                                    <p:cond delay="0"/>
+                                  </p:stCondLst>
+                                  <p:childTnLst>
+                                    <p:set>
+                                      <p:cBhvr>
+                                        <p:cTn id="10" dur="1" fill="hold">
+                                          <p:stCondLst>
+                                            <p:cond delay="0"/>
+                                          </p:stCondLst>
+                                        </p:cTn>
+                                        <p:tgtEl>
+                                          <p:spTgt spid="6"/>
+                                        </p:tgtEl>
+                                        <p:attrNameLst>
+                                          <p:attrName>style.visibility</p:attrName>
+                                        </p:attrNameLst>
+                                      </p:cBhvr>
+                                      <p:to>
+                                        <p:strVal val="visible"/>
+                                      </p:to>
+                                    </p:set>
+                                  </p:childTnLst>
+                                </p:cTn>
+                              </p:par>
+                            </p:childTnLst>
+                          </p:cTn>
+                        </p:par>
+                      </p:childTnLst>
+                    </p:cTn>
+                  </p:par>
+                </p:childTnLst>
+              </p:cTn>
+              <p:prevCondLst>
+                <p:cond evt="onPrev" delay="0">
+                  <p:tgtEl>
+                    <p:sldTgt/>
+                  </p:tgtEl>
+                </p:cond>
+              </p:prevCondLst>
+              <p:nextCondLst>
+                <p:cond evt="onNext" delay="0">
+                  <p:tgtEl>
+                    <p:sldTgt/>
+                  </p:tgtEl>
+                </p:cond>
+              </p:nextCondLst>
+            </p:seq>
+          </p:childTnLst>
+        </p:cTn>
+      </p:par>
+    </p:tnLst>
+    <p:bldLst>
+      <p:bldP spid="9" grpId="0" animBg="1"/>
+    </p:bldLst>
+  </p:timing>
+</p:sld>
+</file>
+
+<file path=ppt/slides/slide71.xml><?xml version="1.0" encoding="utf-8"?>
+<p:sld xmlns:a="http://schemas.openxmlformats.org/drawingml/2006/main" xmlns:r="http://schemas.openxmlformats.org/officeDocument/2006/relationships" xmlns:p="http://schemas.openxmlformats.org/presentationml/2006/main">
+  <p:cSld>
+    <p:spTree>
+      <p:nvGrpSpPr>
+        <p:cNvPr id="1" name=""/>
+        <p:cNvGrpSpPr/>
+        <p:nvPr/>
+      </p:nvGrpSpPr>
+      <p:grpSpPr>
+        <a:xfrm>
+          <a:off x="0" y="0"/>
+          <a:ext cx="0" cy="0"/>
+          <a:chOff x="0" y="0"/>
+          <a:chExt cx="0" cy="0"/>
+        </a:xfrm>
+      </p:grpSpPr>
+      <p:sp>
+        <p:nvSpPr>
+          <p:cNvPr id="2" name="Title 1"/>
+          <p:cNvSpPr>
+            <a:spLocks noGrp="1"/>
+          </p:cNvSpPr>
+          <p:nvPr>
+            <p:ph type="title"/>
+          </p:nvPr>
+        </p:nvSpPr>
+        <p:spPr/>
+        <p:txBody>
+          <a:bodyPr>
+            <a:normAutofit/>
+          </a:bodyPr>
+          <a:lstStyle/>
+          <a:p>
+            <a:r>
+              <a:rPr lang="en-US" dirty="0" smtClean="0"/>
               <a:t>Valgrind: more subtle</a:t>
             </a:r>
             <a:endParaRPr lang="en-US" dirty="0"/>
@@ -42463,7 +42628,7 @@
 </p:sld>
 </file>
 
-<file path=ppt/slides/slide71.xml><?xml version="1.0" encoding="utf-8"?>
+<file path=ppt/slides/slide72.xml><?xml version="1.0" encoding="utf-8"?>
 <p:sld xmlns:a="http://schemas.openxmlformats.org/drawingml/2006/main" xmlns:r="http://schemas.openxmlformats.org/officeDocument/2006/relationships" xmlns:p="http://schemas.openxmlformats.org/presentationml/2006/main">
   <p:cSld>
     <p:spTree>
@@ -43078,7 +43243,7 @@
 </p:sld>
 </file>
 
-<file path=ppt/slides/slide72.xml><?xml version="1.0" encoding="utf-8"?>
+<file path=ppt/slides/slide73.xml><?xml version="1.0" encoding="utf-8"?>
 <p:sld xmlns:a="http://schemas.openxmlformats.org/drawingml/2006/main" xmlns:r="http://schemas.openxmlformats.org/officeDocument/2006/relationships" xmlns:p="http://schemas.openxmlformats.org/presentationml/2006/main">
   <p:cSld>
     <p:spTree>
@@ -43157,7 +43322,7 @@
 </p:sld>
 </file>
 
-<file path=ppt/slides/slide73.xml><?xml version="1.0" encoding="utf-8"?>
+<file path=ppt/slides/slide74.xml><?xml version="1.0" encoding="utf-8"?>
 <p:sld xmlns:a="http://schemas.openxmlformats.org/drawingml/2006/main" xmlns:r="http://schemas.openxmlformats.org/officeDocument/2006/relationships" xmlns:p="http://schemas.openxmlformats.org/presentationml/2006/main">
   <p:cSld>
     <p:spTree>
@@ -43861,7 +44026,7 @@
 </p:sld>
 </file>
 
-<file path=ppt/slides/slide74.xml><?xml version="1.0" encoding="utf-8"?>
+<file path=ppt/slides/slide75.xml><?xml version="1.0" encoding="utf-8"?>
 <p:sld xmlns:a="http://schemas.openxmlformats.org/drawingml/2006/main" xmlns:r="http://schemas.openxmlformats.org/officeDocument/2006/relationships" xmlns:p="http://schemas.openxmlformats.org/presentationml/2006/main">
   <p:cSld>
     <p:spTree>
@@ -43940,7 +44105,7 @@
 </p:sld>
 </file>
 
-<file path=ppt/slides/slide75.xml><?xml version="1.0" encoding="utf-8"?>
+<file path=ppt/slides/slide76.xml><?xml version="1.0" encoding="utf-8"?>
 <p:sld xmlns:a="http://schemas.openxmlformats.org/drawingml/2006/main" xmlns:r="http://schemas.openxmlformats.org/officeDocument/2006/relationships" xmlns:p="http://schemas.openxmlformats.org/presentationml/2006/main">
   <p:cSld>
     <p:spTree>
@@ -44392,7 +44557,7 @@
 </p:sld>
 </file>
 
-<file path=ppt/slides/slide76.xml><?xml version="1.0" encoding="utf-8"?>
+<file path=ppt/slides/slide77.xml><?xml version="1.0" encoding="utf-8"?>
 <p:sld xmlns:a="http://schemas.openxmlformats.org/drawingml/2006/main" xmlns:r="http://schemas.openxmlformats.org/officeDocument/2006/relationships" xmlns:p="http://schemas.openxmlformats.org/presentationml/2006/main">
   <p:cSld>
     <p:spTree>
@@ -45081,7 +45246,7 @@
 </p:sld>
 </file>
 
-<file path=ppt/slides/slide77.xml><?xml version="1.0" encoding="utf-8"?>
+<file path=ppt/slides/slide78.xml><?xml version="1.0" encoding="utf-8"?>
 <p:sld xmlns:a="http://schemas.openxmlformats.org/drawingml/2006/main" xmlns:r="http://schemas.openxmlformats.org/officeDocument/2006/relationships" xmlns:p="http://schemas.openxmlformats.org/presentationml/2006/main">
   <p:cSld>
     <p:spTree>

</xml_diff>

<commit_message>
Fixed mistake in ulimit value; added slide with references
</commit_message>
<xml_diff>
--- a/Debugging/debugging.pptx
+++ b/Debugging/debugging.pptx
@@ -82,7 +82,8 @@
     <p:sldId id="299" r:id="rId76"/>
     <p:sldId id="300" r:id="rId77"/>
     <p:sldId id="332" r:id="rId78"/>
-    <p:sldId id="298" r:id="rId79"/>
+    <p:sldId id="337" r:id="rId79"/>
+    <p:sldId id="298" r:id="rId80"/>
   </p:sldIdLst>
   <p:sldSz cx="9144000" cy="6858000" type="screen4x3"/>
   <p:notesSz cx="6858000" cy="9144000"/>
@@ -291,6 +292,7 @@
             <p14:sldId id="299"/>
             <p14:sldId id="300"/>
             <p14:sldId id="332"/>
+            <p14:sldId id="337"/>
             <p14:sldId id="298"/>
           </p14:sldIdLst>
         </p14:section>
@@ -495,7 +497,7 @@
           <a:p>
             <a:fld id="{E04DB63C-8DFF-407A-A12E-32A5188618B9}" type="datetimeFigureOut">
               <a:rPr lang="nl-BE" smtClean="0"/>
-              <a:t>2017-01-17</a:t>
+              <a:t>2017-01-18</a:t>
             </a:fld>
             <a:endParaRPr lang="nl-BE"/>
           </a:p>
@@ -665,7 +667,7 @@
           <a:p>
             <a:fld id="{E04DB63C-8DFF-407A-A12E-32A5188618B9}" type="datetimeFigureOut">
               <a:rPr lang="nl-BE" smtClean="0"/>
-              <a:t>2017-01-17</a:t>
+              <a:t>2017-01-18</a:t>
             </a:fld>
             <a:endParaRPr lang="nl-BE"/>
           </a:p>
@@ -845,7 +847,7 @@
           <a:p>
             <a:fld id="{E04DB63C-8DFF-407A-A12E-32A5188618B9}" type="datetimeFigureOut">
               <a:rPr lang="nl-BE" smtClean="0"/>
-              <a:t>2017-01-17</a:t>
+              <a:t>2017-01-18</a:t>
             </a:fld>
             <a:endParaRPr lang="nl-BE"/>
           </a:p>
@@ -1015,7 +1017,7 @@
           <a:p>
             <a:fld id="{E04DB63C-8DFF-407A-A12E-32A5188618B9}" type="datetimeFigureOut">
               <a:rPr lang="nl-BE" smtClean="0"/>
-              <a:t>2017-01-17</a:t>
+              <a:t>2017-01-18</a:t>
             </a:fld>
             <a:endParaRPr lang="nl-BE"/>
           </a:p>
@@ -1261,7 +1263,7 @@
           <a:p>
             <a:fld id="{E04DB63C-8DFF-407A-A12E-32A5188618B9}" type="datetimeFigureOut">
               <a:rPr lang="nl-BE" smtClean="0"/>
-              <a:t>2017-01-17</a:t>
+              <a:t>2017-01-18</a:t>
             </a:fld>
             <a:endParaRPr lang="nl-BE"/>
           </a:p>
@@ -1549,7 +1551,7 @@
           <a:p>
             <a:fld id="{E04DB63C-8DFF-407A-A12E-32A5188618B9}" type="datetimeFigureOut">
               <a:rPr lang="nl-BE" smtClean="0"/>
-              <a:t>2017-01-17</a:t>
+              <a:t>2017-01-18</a:t>
             </a:fld>
             <a:endParaRPr lang="nl-BE"/>
           </a:p>
@@ -1971,7 +1973,7 @@
           <a:p>
             <a:fld id="{E04DB63C-8DFF-407A-A12E-32A5188618B9}" type="datetimeFigureOut">
               <a:rPr lang="nl-BE" smtClean="0"/>
-              <a:t>2017-01-17</a:t>
+              <a:t>2017-01-18</a:t>
             </a:fld>
             <a:endParaRPr lang="nl-BE"/>
           </a:p>
@@ -2089,7 +2091,7 @@
           <a:p>
             <a:fld id="{E04DB63C-8DFF-407A-A12E-32A5188618B9}" type="datetimeFigureOut">
               <a:rPr lang="nl-BE" smtClean="0"/>
-              <a:t>2017-01-17</a:t>
+              <a:t>2017-01-18</a:t>
             </a:fld>
             <a:endParaRPr lang="nl-BE"/>
           </a:p>
@@ -2184,7 +2186,7 @@
           <a:p>
             <a:fld id="{E04DB63C-8DFF-407A-A12E-32A5188618B9}" type="datetimeFigureOut">
               <a:rPr lang="nl-BE" smtClean="0"/>
-              <a:t>2017-01-17</a:t>
+              <a:t>2017-01-18</a:t>
             </a:fld>
             <a:endParaRPr lang="nl-BE"/>
           </a:p>
@@ -2461,7 +2463,7 @@
           <a:p>
             <a:fld id="{E04DB63C-8DFF-407A-A12E-32A5188618B9}" type="datetimeFigureOut">
               <a:rPr lang="nl-BE" smtClean="0"/>
-              <a:t>2017-01-17</a:t>
+              <a:t>2017-01-18</a:t>
             </a:fld>
             <a:endParaRPr lang="nl-BE"/>
           </a:p>
@@ -2714,7 +2716,7 @@
           <a:p>
             <a:fld id="{E04DB63C-8DFF-407A-A12E-32A5188618B9}" type="datetimeFigureOut">
               <a:rPr lang="nl-BE" smtClean="0"/>
-              <a:t>2017-01-17</a:t>
+              <a:t>2017-01-18</a:t>
             </a:fld>
             <a:endParaRPr lang="nl-BE"/>
           </a:p>
@@ -2927,7 +2929,7 @@
           <a:p>
             <a:fld id="{E04DB63C-8DFF-407A-A12E-32A5188618B9}" type="datetimeFigureOut">
               <a:rPr lang="nl-BE" smtClean="0"/>
-              <a:t>2017-01-17</a:t>
+              <a:t>2017-01-18</a:t>
             </a:fld>
             <a:endParaRPr lang="nl-BE"/>
           </a:p>
@@ -35851,8 +35853,20 @@
             </a:r>
             <a:r>
               <a:rPr lang="en-US" dirty="0" smtClean="0"/>
-              <a:t> to see call stack</a:t>
-            </a:r>
+              <a:t> to see call </a:t>
+            </a:r>
+            <a:r>
+              <a:rPr lang="en-US" dirty="0" smtClean="0"/>
+              <a:t>stack</a:t>
+            </a:r>
+          </a:p>
+          <a:p>
+            <a:pPr lvl="1"/>
+            <a:r>
+              <a:rPr lang="en-US" dirty="0" smtClean="0"/>
+              <a:t>Switch frames/threads</a:t>
+            </a:r>
+            <a:endParaRPr lang="en-US" dirty="0" smtClean="0"/>
           </a:p>
           <a:p>
             <a:pPr lvl="1"/>
@@ -35896,7 +35910,14 @@
                 <a:latin typeface="Courier New" panose="02070309020205020404" pitchFamily="49" charset="0"/>
                 <a:cs typeface="Courier New" panose="02070309020205020404" pitchFamily="49" charset="0"/>
               </a:rPr>
-              <a:t> -c 0</a:t>
+              <a:t> -c </a:t>
+            </a:r>
+            <a:r>
+              <a:rPr lang="en-US" dirty="0" smtClean="0">
+                <a:latin typeface="Courier New" panose="02070309020205020404" pitchFamily="49" charset="0"/>
+                <a:cs typeface="Courier New" panose="02070309020205020404" pitchFamily="49" charset="0"/>
+              </a:rPr>
+              <a:t>unlimited</a:t>
             </a:r>
             <a:endParaRPr lang="nl-BE" dirty="0">
               <a:latin typeface="Courier New" panose="02070309020205020404" pitchFamily="49" charset="0"/>
@@ -35913,7 +35934,7 @@
         </p:nvSpPr>
         <p:spPr>
           <a:xfrm>
-            <a:off x="2411760" y="5085184"/>
+            <a:off x="2411760" y="5445224"/>
             <a:ext cx="3753913" cy="461665"/>
           </a:xfrm>
           <a:prstGeom prst="rect">
@@ -36070,33 +36091,15 @@
                                   </p:childTnLst>
                                 </p:cTn>
                               </p:par>
-                            </p:childTnLst>
-                          </p:cTn>
-                        </p:par>
-                      </p:childTnLst>
-                    </p:cTn>
-                  </p:par>
-                  <p:par>
-                    <p:cTn id="11" fill="hold">
-                      <p:stCondLst>
-                        <p:cond delay="indefinite"/>
-                      </p:stCondLst>
-                      <p:childTnLst>
-                        <p:par>
-                          <p:cTn id="12" fill="hold">
-                            <p:stCondLst>
-                              <p:cond delay="0"/>
-                            </p:stCondLst>
-                            <p:childTnLst>
                               <p:par>
-                                <p:cTn id="13" presetID="1" presetClass="entr" presetSubtype="0" fill="hold" grpId="0" nodeType="clickEffect">
+                                <p:cTn id="11" presetID="1" presetClass="entr" presetSubtype="0" fill="hold" grpId="0" nodeType="withEffect">
                                   <p:stCondLst>
                                     <p:cond delay="0"/>
                                   </p:stCondLst>
                                   <p:childTnLst>
                                     <p:set>
                                       <p:cBhvr>
-                                        <p:cTn id="14" dur="1" fill="hold">
+                                        <p:cTn id="12" dur="1" fill="hold">
                                           <p:stCondLst>
                                             <p:cond delay="0"/>
                                           </p:stCondLst>
@@ -36126,26 +36129,75 @@
                     </p:cTn>
                   </p:par>
                   <p:par>
-                    <p:cTn id="15" fill="hold">
+                    <p:cTn id="13" fill="hold">
                       <p:stCondLst>
                         <p:cond delay="indefinite"/>
                       </p:stCondLst>
                       <p:childTnLst>
                         <p:par>
-                          <p:cTn id="16" fill="hold">
+                          <p:cTn id="14" fill="hold">
                             <p:stCondLst>
                               <p:cond delay="0"/>
                             </p:stCondLst>
                             <p:childTnLst>
                               <p:par>
-                                <p:cTn id="17" presetID="1" presetClass="entr" presetSubtype="0" fill="hold" grpId="0" nodeType="clickEffect">
+                                <p:cTn id="15" presetID="1" presetClass="entr" presetSubtype="0" fill="hold" grpId="0" nodeType="clickEffect">
                                   <p:stCondLst>
                                     <p:cond delay="0"/>
                                   </p:stCondLst>
                                   <p:childTnLst>
                                     <p:set>
                                       <p:cBhvr>
-                                        <p:cTn id="18" dur="1" fill="hold">
+                                        <p:cTn id="16" dur="1" fill="hold">
+                                          <p:stCondLst>
+                                            <p:cond delay="0"/>
+                                          </p:stCondLst>
+                                        </p:cTn>
+                                        <p:tgtEl>
+                                          <p:spTgt spid="3">
+                                            <p:txEl>
+                                              <p:pRg st="4" end="4"/>
+                                            </p:txEl>
+                                          </p:spTgt>
+                                        </p:tgtEl>
+                                        <p:attrNameLst>
+                                          <p:attrName>style.visibility</p:attrName>
+                                        </p:attrNameLst>
+                                      </p:cBhvr>
+                                      <p:to>
+                                        <p:strVal val="visible"/>
+                                      </p:to>
+                                    </p:set>
+                                  </p:childTnLst>
+                                </p:cTn>
+                              </p:par>
+                            </p:childTnLst>
+                          </p:cTn>
+                        </p:par>
+                      </p:childTnLst>
+                    </p:cTn>
+                  </p:par>
+                  <p:par>
+                    <p:cTn id="17" fill="hold">
+                      <p:stCondLst>
+                        <p:cond delay="indefinite"/>
+                      </p:stCondLst>
+                      <p:childTnLst>
+                        <p:par>
+                          <p:cTn id="18" fill="hold">
+                            <p:stCondLst>
+                              <p:cond delay="0"/>
+                            </p:stCondLst>
+                            <p:childTnLst>
+                              <p:par>
+                                <p:cTn id="19" presetID="1" presetClass="entr" presetSubtype="0" fill="hold" grpId="0" nodeType="clickEffect">
+                                  <p:stCondLst>
+                                    <p:cond delay="0"/>
+                                  </p:stCondLst>
+                                  <p:childTnLst>
+                                    <p:set>
+                                      <p:cBhvr>
+                                        <p:cTn id="20" dur="1" fill="hold">
                                           <p:stCondLst>
                                             <p:cond delay="0"/>
                                           </p:stCondLst>
@@ -45071,7 +45123,7 @@
         <p:spPr/>
         <p:txBody>
           <a:bodyPr>
-            <a:normAutofit fontScale="77500" lnSpcReduction="20000"/>
+            <a:normAutofit fontScale="70000" lnSpcReduction="20000"/>
           </a:bodyPr>
           <a:lstStyle/>
           <a:p>
@@ -45142,7 +45194,15 @@
           <a:p>
             <a:r>
               <a:rPr lang="en-US" dirty="0" smtClean="0"/>
-              <a:t>Tracing tools</a:t>
+              <a:t>MPI t</a:t>
+            </a:r>
+            <a:r>
+              <a:rPr lang="en-US" dirty="0" smtClean="0"/>
+              <a:t>racing </a:t>
+            </a:r>
+            <a:r>
+              <a:rPr lang="en-US" dirty="0" smtClean="0"/>
+              <a:t>tools</a:t>
             </a:r>
           </a:p>
           <a:p>
@@ -45186,8 +45246,8 @@
               <a:t>Intel </a:t>
             </a:r>
             <a:r>
-              <a:rPr lang="en-US" dirty="0" err="1" smtClean="0"/>
-              <a:t>vTune</a:t>
+              <a:rPr lang="en-US" dirty="0" smtClean="0"/>
+              <a:t>Inspector</a:t>
             </a:r>
             <a:endParaRPr lang="en-US" dirty="0" smtClean="0"/>
           </a:p>
@@ -45195,7 +45255,18 @@
             <a:pPr lvl="2"/>
             <a:r>
               <a:rPr lang="en-US" dirty="0" smtClean="0"/>
-              <a:t>Detects race conditions</a:t>
+              <a:t>Detects race </a:t>
+            </a:r>
+            <a:r>
+              <a:rPr lang="en-US" dirty="0" smtClean="0"/>
+              <a:t>conditions</a:t>
+            </a:r>
+          </a:p>
+          <a:p>
+            <a:pPr lvl="2"/>
+            <a:r>
+              <a:rPr lang="en-US" dirty="0" smtClean="0"/>
+              <a:t>Detects memory leaks</a:t>
             </a:r>
             <a:endParaRPr lang="nl-BE" dirty="0"/>
           </a:p>
@@ -45673,6 +45744,37 @@
                                   </p:childTnLst>
                                 </p:cTn>
                               </p:par>
+                              <p:par>
+                                <p:cTn id="35" presetID="1" presetClass="entr" presetSubtype="0" fill="hold" grpId="0" nodeType="withEffect">
+                                  <p:stCondLst>
+                                    <p:cond delay="0"/>
+                                  </p:stCondLst>
+                                  <p:childTnLst>
+                                    <p:set>
+                                      <p:cBhvr>
+                                        <p:cTn id="36" dur="1" fill="hold">
+                                          <p:stCondLst>
+                                            <p:cond delay="0"/>
+                                          </p:stCondLst>
+                                        </p:cTn>
+                                        <p:tgtEl>
+                                          <p:spTgt spid="3">
+                                            <p:txEl>
+                                              <p:pRg st="13" end="13"/>
+                                            </p:txEl>
+                                          </p:spTgt>
+                                        </p:tgtEl>
+                                        <p:attrNameLst>
+                                          <p:attrName>style.visibility</p:attrName>
+                                        </p:attrNameLst>
+                                      </p:cBhvr>
+                                      <p:to>
+                                        <p:strVal val="visible"/>
+                                      </p:to>
+                                    </p:set>
+                                  </p:childTnLst>
+                                </p:cTn>
+                              </p:par>
                             </p:childTnLst>
                           </p:cTn>
                         </p:par>
@@ -45708,6 +45810,168 @@
 </file>
 
 <file path=ppt/slides/slide78.xml><?xml version="1.0" encoding="utf-8"?>
+<p:sld xmlns:a="http://schemas.openxmlformats.org/drawingml/2006/main" xmlns:r="http://schemas.openxmlformats.org/officeDocument/2006/relationships" xmlns:p="http://schemas.openxmlformats.org/presentationml/2006/main">
+  <p:cSld>
+    <p:spTree>
+      <p:nvGrpSpPr>
+        <p:cNvPr id="1" name=""/>
+        <p:cNvGrpSpPr/>
+        <p:nvPr/>
+      </p:nvGrpSpPr>
+      <p:grpSpPr>
+        <a:xfrm>
+          <a:off x="0" y="0"/>
+          <a:ext cx="0" cy="0"/>
+          <a:chOff x="0" y="0"/>
+          <a:chExt cx="0" cy="0"/>
+        </a:xfrm>
+      </p:grpSpPr>
+      <p:sp>
+        <p:nvSpPr>
+          <p:cNvPr id="2" name="Title 1"/>
+          <p:cNvSpPr>
+            <a:spLocks noGrp="1"/>
+          </p:cNvSpPr>
+          <p:nvPr>
+            <p:ph type="title"/>
+          </p:nvPr>
+        </p:nvSpPr>
+        <p:spPr/>
+        <p:txBody>
+          <a:bodyPr/>
+          <a:lstStyle/>
+          <a:p>
+            <a:r>
+              <a:rPr lang="en-US" dirty="0" smtClean="0"/>
+              <a:t>References</a:t>
+            </a:r>
+            <a:endParaRPr lang="nl-BE" dirty="0"/>
+          </a:p>
+        </p:txBody>
+      </p:sp>
+      <p:sp>
+        <p:nvSpPr>
+          <p:cNvPr id="3" name="Content Placeholder 2"/>
+          <p:cNvSpPr>
+            <a:spLocks noGrp="1"/>
+          </p:cNvSpPr>
+          <p:nvPr>
+            <p:ph idx="1"/>
+          </p:nvPr>
+        </p:nvSpPr>
+        <p:spPr/>
+        <p:txBody>
+          <a:bodyPr/>
+          <a:lstStyle/>
+          <a:p>
+            <a:r>
+              <a:rPr lang="en-US" i="1" dirty="0" smtClean="0"/>
+              <a:t>The art of debugging with </a:t>
+            </a:r>
+            <a:r>
+              <a:rPr lang="en-US" i="1" dirty="0" err="1" smtClean="0"/>
+              <a:t>gdb</a:t>
+            </a:r>
+            <a:r>
+              <a:rPr lang="en-US" i="1" dirty="0" smtClean="0"/>
+              <a:t>, </a:t>
+            </a:r>
+            <a:r>
+              <a:rPr lang="en-US" i="1" dirty="0" err="1" smtClean="0"/>
+              <a:t>ddd</a:t>
+            </a:r>
+            <a:r>
+              <a:rPr lang="en-US" i="1" dirty="0" smtClean="0"/>
+              <a:t>, and Eclipse</a:t>
+            </a:r>
+            <a:r>
+              <a:rPr lang="en-US" dirty="0" smtClean="0"/>
+              <a:t/>
+            </a:r>
+            <a:br>
+              <a:rPr lang="en-US" dirty="0" smtClean="0"/>
+            </a:br>
+            <a:r>
+              <a:rPr lang="en-US" dirty="0" smtClean="0"/>
+              <a:t>Norman </a:t>
+            </a:r>
+            <a:r>
+              <a:rPr lang="en-US" dirty="0" err="1" smtClean="0"/>
+              <a:t>Matloff</a:t>
+            </a:r>
+            <a:r>
+              <a:rPr lang="en-US" dirty="0" smtClean="0"/>
+              <a:t> &amp; Peter Jay </a:t>
+            </a:r>
+            <a:r>
+              <a:rPr lang="en-US" dirty="0" err="1" smtClean="0"/>
+              <a:t>Salzman</a:t>
+            </a:r>
+            <a:r>
+              <a:rPr lang="en-US" dirty="0" smtClean="0"/>
+              <a:t/>
+            </a:r>
+            <a:br>
+              <a:rPr lang="en-US" dirty="0" smtClean="0"/>
+            </a:br>
+            <a:r>
+              <a:rPr lang="en-US" dirty="0" smtClean="0"/>
+              <a:t>No Starch Press, 2008</a:t>
+            </a:r>
+          </a:p>
+          <a:p>
+            <a:r>
+              <a:rPr lang="en-US" i="1" dirty="0" smtClean="0"/>
+              <a:t>Effective debugging: 66 specific ways to debug software and systems</a:t>
+            </a:r>
+            <a:r>
+              <a:rPr lang="en-US" dirty="0" smtClean="0"/>
+              <a:t/>
+            </a:r>
+            <a:br>
+              <a:rPr lang="en-US" dirty="0" smtClean="0"/>
+            </a:br>
+            <a:r>
+              <a:rPr lang="en-US" dirty="0" err="1" smtClean="0"/>
+              <a:t>Diomidis</a:t>
+            </a:r>
+            <a:r>
+              <a:rPr lang="en-US" dirty="0" smtClean="0"/>
+              <a:t> </a:t>
+            </a:r>
+            <a:r>
+              <a:rPr lang="en-US" dirty="0" err="1" smtClean="0"/>
+              <a:t>Spinellis</a:t>
+            </a:r>
+            <a:r>
+              <a:rPr lang="en-US" dirty="0" smtClean="0"/>
+              <a:t/>
+            </a:r>
+            <a:br>
+              <a:rPr lang="en-US" dirty="0" smtClean="0"/>
+            </a:br>
+            <a:r>
+              <a:rPr lang="en-US" dirty="0" smtClean="0"/>
+              <a:t>Addison-Wesley, 2010</a:t>
+            </a:r>
+            <a:endParaRPr lang="nl-BE" dirty="0"/>
+          </a:p>
+        </p:txBody>
+      </p:sp>
+    </p:spTree>
+    <p:extLst>
+      <p:ext uri="{BB962C8B-B14F-4D97-AF65-F5344CB8AC3E}">
+        <p14:creationId xmlns:p14="http://schemas.microsoft.com/office/powerpoint/2010/main" val="2276374007"/>
+      </p:ext>
+    </p:extLst>
+  </p:cSld>
+  <p:clrMapOvr>
+    <a:masterClrMapping/>
+  </p:clrMapOvr>
+</p:sld>
+</file>
+
+<file path=ppt/slides/slide79.xml><?xml version="1.0" encoding="utf-8"?>
 <p:sld xmlns:a="http://schemas.openxmlformats.org/drawingml/2006/main" xmlns:r="http://schemas.openxmlformats.org/officeDocument/2006/relationships" xmlns:p="http://schemas.openxmlformats.org/presentationml/2006/main">
   <p:cSld>
     <p:spTree>

</xml_diff>

<commit_message>
Add compiler section heading
</commit_message>
<xml_diff>
--- a/Debugging/debugging.pptx
+++ b/Debugging/debugging.pptx
@@ -195,6 +195,10 @@
             <p14:sldId id="285"/>
             <p14:sldId id="323"/>
             <p14:sldId id="258"/>
+          </p14:sldIdLst>
+        </p14:section>
+        <p14:section name="Compilers" id="{717123CE-37C4-4258-B0BB-83C0F356218F}">
+          <p14:sldIdLst>
             <p14:sldId id="304"/>
             <p14:sldId id="305"/>
             <p14:sldId id="334"/>
@@ -497,7 +501,7 @@
           <a:p>
             <a:fld id="{E04DB63C-8DFF-407A-A12E-32A5188618B9}" type="datetimeFigureOut">
               <a:rPr lang="nl-BE" smtClean="0"/>
-              <a:t>2017-01-20</a:t>
+              <a:t>21/08/2017</a:t>
             </a:fld>
             <a:endParaRPr lang="nl-BE"/>
           </a:p>
@@ -667,7 +671,7 @@
           <a:p>
             <a:fld id="{E04DB63C-8DFF-407A-A12E-32A5188618B9}" type="datetimeFigureOut">
               <a:rPr lang="nl-BE" smtClean="0"/>
-              <a:t>2017-01-20</a:t>
+              <a:t>21/08/2017</a:t>
             </a:fld>
             <a:endParaRPr lang="nl-BE"/>
           </a:p>
@@ -847,7 +851,7 @@
           <a:p>
             <a:fld id="{E04DB63C-8DFF-407A-A12E-32A5188618B9}" type="datetimeFigureOut">
               <a:rPr lang="nl-BE" smtClean="0"/>
-              <a:t>2017-01-20</a:t>
+              <a:t>21/08/2017</a:t>
             </a:fld>
             <a:endParaRPr lang="nl-BE"/>
           </a:p>
@@ -1017,7 +1021,7 @@
           <a:p>
             <a:fld id="{E04DB63C-8DFF-407A-A12E-32A5188618B9}" type="datetimeFigureOut">
               <a:rPr lang="nl-BE" smtClean="0"/>
-              <a:t>2017-01-20</a:t>
+              <a:t>21/08/2017</a:t>
             </a:fld>
             <a:endParaRPr lang="nl-BE"/>
           </a:p>
@@ -1263,7 +1267,7 @@
           <a:p>
             <a:fld id="{E04DB63C-8DFF-407A-A12E-32A5188618B9}" type="datetimeFigureOut">
               <a:rPr lang="nl-BE" smtClean="0"/>
-              <a:t>2017-01-20</a:t>
+              <a:t>21/08/2017</a:t>
             </a:fld>
             <a:endParaRPr lang="nl-BE"/>
           </a:p>
@@ -1551,7 +1555,7 @@
           <a:p>
             <a:fld id="{E04DB63C-8DFF-407A-A12E-32A5188618B9}" type="datetimeFigureOut">
               <a:rPr lang="nl-BE" smtClean="0"/>
-              <a:t>2017-01-20</a:t>
+              <a:t>21/08/2017</a:t>
             </a:fld>
             <a:endParaRPr lang="nl-BE"/>
           </a:p>
@@ -1973,7 +1977,7 @@
           <a:p>
             <a:fld id="{E04DB63C-8DFF-407A-A12E-32A5188618B9}" type="datetimeFigureOut">
               <a:rPr lang="nl-BE" smtClean="0"/>
-              <a:t>2017-01-20</a:t>
+              <a:t>21/08/2017</a:t>
             </a:fld>
             <a:endParaRPr lang="nl-BE"/>
           </a:p>
@@ -2091,7 +2095,7 @@
           <a:p>
             <a:fld id="{E04DB63C-8DFF-407A-A12E-32A5188618B9}" type="datetimeFigureOut">
               <a:rPr lang="nl-BE" smtClean="0"/>
-              <a:t>2017-01-20</a:t>
+              <a:t>21/08/2017</a:t>
             </a:fld>
             <a:endParaRPr lang="nl-BE"/>
           </a:p>
@@ -2186,7 +2190,7 @@
           <a:p>
             <a:fld id="{E04DB63C-8DFF-407A-A12E-32A5188618B9}" type="datetimeFigureOut">
               <a:rPr lang="nl-BE" smtClean="0"/>
-              <a:t>2017-01-20</a:t>
+              <a:t>21/08/2017</a:t>
             </a:fld>
             <a:endParaRPr lang="nl-BE"/>
           </a:p>
@@ -2463,7 +2467,7 @@
           <a:p>
             <a:fld id="{E04DB63C-8DFF-407A-A12E-32A5188618B9}" type="datetimeFigureOut">
               <a:rPr lang="nl-BE" smtClean="0"/>
-              <a:t>2017-01-20</a:t>
+              <a:t>21/08/2017</a:t>
             </a:fld>
             <a:endParaRPr lang="nl-BE"/>
           </a:p>
@@ -2716,7 +2720,7 @@
           <a:p>
             <a:fld id="{E04DB63C-8DFF-407A-A12E-32A5188618B9}" type="datetimeFigureOut">
               <a:rPr lang="nl-BE" smtClean="0"/>
-              <a:t>2017-01-20</a:t>
+              <a:t>21/08/2017</a:t>
             </a:fld>
             <a:endParaRPr lang="nl-BE"/>
           </a:p>
@@ -2929,7 +2933,7 @@
           <a:p>
             <a:fld id="{E04DB63C-8DFF-407A-A12E-32A5188618B9}" type="datetimeFigureOut">
               <a:rPr lang="nl-BE" smtClean="0"/>
-              <a:t>2017-01-20</a:t>
+              <a:t>21/08/2017</a:t>
             </a:fld>
             <a:endParaRPr lang="nl-BE"/>
           </a:p>

</xml_diff>

<commit_message>
Add blog post URL
</commit_message>
<xml_diff>
--- a/Debugging/debugging.pptx
+++ b/Debugging/debugging.pptx
@@ -29643,7 +29643,7 @@
         <p:spPr/>
         <p:txBody>
           <a:bodyPr>
-            <a:normAutofit fontScale="85000" lnSpcReduction="20000"/>
+            <a:normAutofit fontScale="77500" lnSpcReduction="20000"/>
           </a:bodyPr>
           <a:lstStyle/>
           <a:p>
@@ -29736,6 +29736,28 @@
                 <a:sym typeface="Symbol" panose="05050102010706020507" pitchFamily="18" charset="2"/>
               </a:rPr>
               <a:t>US$ 440 million</a:t>
+            </a:r>
+          </a:p>
+          <a:p>
+            <a:r>
+              <a:rPr lang="en-US" dirty="0">
+                <a:sym typeface="Symbol" panose="05050102010706020507" pitchFamily="18" charset="2"/>
+                <a:hlinkClick r:id="rId2"/>
+              </a:rPr>
+              <a:t>https://raygun.com/blog/10-costly-software-errors-history</a:t>
+            </a:r>
+            <a:r>
+              <a:rPr lang="en-US" dirty="0" smtClean="0">
+                <a:sym typeface="Symbol" panose="05050102010706020507" pitchFamily="18" charset="2"/>
+                <a:hlinkClick r:id="rId2"/>
+              </a:rPr>
+              <a:t>/</a:t>
+            </a:r>
+            <a:r>
+              <a:rPr lang="en-US" dirty="0" smtClean="0">
+                <a:sym typeface="Symbol" panose="05050102010706020507" pitchFamily="18" charset="2"/>
+              </a:rPr>
+              <a:t> </a:t>
             </a:r>
           </a:p>
           <a:p>
@@ -30132,6 +30154,55 @@
                                           <p:spTgt spid="3">
                                             <p:txEl>
                                               <p:pRg st="8" end="8"/>
+                                            </p:txEl>
+                                          </p:spTgt>
+                                        </p:tgtEl>
+                                        <p:attrNameLst>
+                                          <p:attrName>style.visibility</p:attrName>
+                                        </p:attrNameLst>
+                                      </p:cBhvr>
+                                      <p:to>
+                                        <p:strVal val="visible"/>
+                                      </p:to>
+                                    </p:set>
+                                  </p:childTnLst>
+                                </p:cTn>
+                              </p:par>
+                            </p:childTnLst>
+                          </p:cTn>
+                        </p:par>
+                      </p:childTnLst>
+                    </p:cTn>
+                  </p:par>
+                  <p:par>
+                    <p:cTn id="33" fill="hold">
+                      <p:stCondLst>
+                        <p:cond delay="indefinite"/>
+                      </p:stCondLst>
+                      <p:childTnLst>
+                        <p:par>
+                          <p:cTn id="34" fill="hold">
+                            <p:stCondLst>
+                              <p:cond delay="0"/>
+                            </p:stCondLst>
+                            <p:childTnLst>
+                              <p:par>
+                                <p:cTn id="35" presetID="1" presetClass="entr" presetSubtype="0" fill="hold" grpId="0" nodeType="clickEffect">
+                                  <p:stCondLst>
+                                    <p:cond delay="0"/>
+                                  </p:stCondLst>
+                                  <p:childTnLst>
+                                    <p:set>
+                                      <p:cBhvr>
+                                        <p:cTn id="36" dur="1" fill="hold">
+                                          <p:stCondLst>
+                                            <p:cond delay="0"/>
+                                          </p:stCondLst>
+                                        </p:cTn>
+                                        <p:tgtEl>
+                                          <p:spTgt spid="3">
+                                            <p:txEl>
+                                              <p:pRg st="9" end="9"/>
                                             </p:txEl>
                                           </p:spTgt>
                                         </p:tgtEl>

</xml_diff>

<commit_message>
Improve formatting, add bug example slide
</commit_message>
<xml_diff>
--- a/Debugging/debugging.pptx
+++ b/Debugging/debugging.pptx
@@ -223,6 +223,10 @@
             <p14:sldId id="325"/>
             <p14:sldId id="306"/>
             <p14:sldId id="307"/>
+          </p14:sldIdLst>
+        </p14:section>
+        <p14:section name="Assertions" id="{718F4070-14B8-4B1B-BDFE-675A971E841B}">
+          <p14:sldIdLst>
             <p14:sldId id="308"/>
             <p14:sldId id="309"/>
             <p14:sldId id="310"/>
@@ -5057,10 +5061,46 @@
           <a:p>
             <a:r>
               <a:rPr lang="en-US" dirty="0" smtClean="0"/>
-              <a:t>In subroutines and functions: declare arguments with intent(in/out/</a:t>
-            </a:r>
-            <a:r>
-              <a:rPr lang="en-US" dirty="0" err="1" smtClean="0"/>
+              <a:t>In subroutines and functions: declare arguments with </a:t>
+            </a:r>
+            <a:r>
+              <a:rPr lang="en-US" dirty="0" smtClean="0">
+                <a:latin typeface="Courier New" panose="02070309020205020404" pitchFamily="49" charset="0"/>
+                <a:cs typeface="Courier New" panose="02070309020205020404" pitchFamily="49" charset="0"/>
+              </a:rPr>
+              <a:t>intent</a:t>
+            </a:r>
+            <a:r>
+              <a:rPr lang="en-US" dirty="0" smtClean="0"/>
+              <a:t> (</a:t>
+            </a:r>
+            <a:r>
+              <a:rPr lang="en-US" dirty="0" smtClean="0">
+                <a:latin typeface="Courier New" panose="02070309020205020404" pitchFamily="49" charset="0"/>
+                <a:cs typeface="Courier New" panose="02070309020205020404" pitchFamily="49" charset="0"/>
+              </a:rPr>
+              <a:t>in</a:t>
+            </a:r>
+            <a:r>
+              <a:rPr lang="en-US" dirty="0" smtClean="0"/>
+              <a:t>/</a:t>
+            </a:r>
+            <a:r>
+              <a:rPr lang="en-US" dirty="0" smtClean="0">
+                <a:latin typeface="Courier New" panose="02070309020205020404" pitchFamily="49" charset="0"/>
+                <a:cs typeface="Courier New" panose="02070309020205020404" pitchFamily="49" charset="0"/>
+              </a:rPr>
+              <a:t>out</a:t>
+            </a:r>
+            <a:r>
+              <a:rPr lang="en-US" dirty="0" smtClean="0"/>
+              <a:t>/</a:t>
+            </a:r>
+            <a:r>
+              <a:rPr lang="en-US" dirty="0" err="1" smtClean="0">
+                <a:latin typeface="Courier New" panose="02070309020205020404" pitchFamily="49" charset="0"/>
+                <a:cs typeface="Courier New" panose="02070309020205020404" pitchFamily="49" charset="0"/>
+              </a:rPr>
               <a:t>inout</a:t>
             </a:r>
             <a:r>
@@ -6540,7 +6580,11 @@
           <a:p>
             <a:r>
               <a:rPr lang="en-US" dirty="0" smtClean="0"/>
-              <a:t>Defensive programming &amp; language features</a:t>
+              <a:t>Defensive </a:t>
+            </a:r>
+            <a:r>
+              <a:rPr lang="en-US" dirty="0" smtClean="0"/>
+              <a:t>programming</a:t>
             </a:r>
             <a:endParaRPr lang="nl-BE" dirty="0"/>
           </a:p>
@@ -23019,15 +23063,27 @@
               <a:rPr lang="en-US" dirty="0" smtClean="0">
                 <a:hlinkClick r:id="rId2"/>
               </a:rPr>
-              <a:t>Cambridge University, Undo, </a:t>
-            </a:r>
-            <a:r>
-              <a:rPr lang="en-US" dirty="0" err="1" smtClean="0">
+              <a:t>Cambridge University, </a:t>
+            </a:r>
+            <a:r>
+              <a:rPr lang="en-US" i="1" dirty="0" smtClean="0">
                 <a:hlinkClick r:id="rId2"/>
               </a:rPr>
+              <a:t>Undo</a:t>
+            </a:r>
+            <a:r>
+              <a:rPr lang="en-US" dirty="0" smtClean="0">
+                <a:hlinkClick r:id="rId2"/>
+              </a:rPr>
+              <a:t>, </a:t>
+            </a:r>
+            <a:r>
+              <a:rPr lang="en-US" i="1" dirty="0" err="1" smtClean="0">
+                <a:hlinkClick r:id="rId2"/>
+              </a:rPr>
               <a:t>RogueWave</a:t>
             </a:r>
-            <a:endParaRPr lang="en-US" dirty="0" smtClean="0"/>
+            <a:endParaRPr lang="en-US" i="1" dirty="0" smtClean="0"/>
           </a:p>
           <a:p>
             <a:pPr lvl="1"/>
@@ -36092,8 +36148,26 @@
           <a:p>
             <a:r>
               <a:rPr lang="en-US" dirty="0" smtClean="0"/>
-              <a:t>All (non-trivial) code has bugs!</a:t>
-            </a:r>
+              <a:t>All (non-trivial) code has bugs</a:t>
+            </a:r>
+            <a:r>
+              <a:rPr lang="en-US" dirty="0" smtClean="0"/>
+              <a:t>!</a:t>
+            </a:r>
+          </a:p>
+          <a:p>
+            <a:pPr lvl="1"/>
+            <a:r>
+              <a:rPr lang="en-US" dirty="0" smtClean="0"/>
+              <a:t>on average 8/1000 lines of code or </a:t>
+            </a:r>
+            <a:r>
+              <a:rPr lang="en-US" dirty="0" smtClean="0">
+                <a:hlinkClick r:id="rId2"/>
+              </a:rPr>
+              <a:t>worse</a:t>
+            </a:r>
+            <a:endParaRPr lang="en-US" dirty="0" smtClean="0"/>
           </a:p>
           <a:p>
             <a:r>
@@ -36188,33 +36262,15 @@
                                   </p:childTnLst>
                                 </p:cTn>
                               </p:par>
-                            </p:childTnLst>
-                          </p:cTn>
-                        </p:par>
-                      </p:childTnLst>
-                    </p:cTn>
-                  </p:par>
-                  <p:par>
-                    <p:cTn id="7" fill="hold">
-                      <p:stCondLst>
-                        <p:cond delay="indefinite"/>
-                      </p:stCondLst>
-                      <p:childTnLst>
-                        <p:par>
-                          <p:cTn id="8" fill="hold">
-                            <p:stCondLst>
-                              <p:cond delay="0"/>
-                            </p:stCondLst>
-                            <p:childTnLst>
                               <p:par>
-                                <p:cTn id="9" presetID="1" presetClass="entr" presetSubtype="0" fill="hold" grpId="0" nodeType="clickEffect">
+                                <p:cTn id="7" presetID="1" presetClass="entr" presetSubtype="0" fill="hold" grpId="0" nodeType="withEffect">
                                   <p:stCondLst>
                                     <p:cond delay="0"/>
                                   </p:stCondLst>
                                   <p:childTnLst>
                                     <p:set>
                                       <p:cBhvr>
-                                        <p:cTn id="10" dur="1" fill="hold">
+                                        <p:cTn id="8" dur="1" fill="hold">
                                           <p:stCondLst>
                                             <p:cond delay="0"/>
                                           </p:stCondLst>
@@ -36237,8 +36293,26 @@
                                   </p:childTnLst>
                                 </p:cTn>
                               </p:par>
+                            </p:childTnLst>
+                          </p:cTn>
+                        </p:par>
+                      </p:childTnLst>
+                    </p:cTn>
+                  </p:par>
+                  <p:par>
+                    <p:cTn id="9" fill="hold">
+                      <p:stCondLst>
+                        <p:cond delay="indefinite"/>
+                      </p:stCondLst>
+                      <p:childTnLst>
+                        <p:par>
+                          <p:cTn id="10" fill="hold">
+                            <p:stCondLst>
+                              <p:cond delay="0"/>
+                            </p:stCondLst>
+                            <p:childTnLst>
                               <p:par>
-                                <p:cTn id="11" presetID="1" presetClass="entr" presetSubtype="0" fill="hold" grpId="0" nodeType="withEffect">
+                                <p:cTn id="11" presetID="1" presetClass="entr" presetSubtype="0" fill="hold" grpId="0" nodeType="clickEffect">
                                   <p:stCondLst>
                                     <p:cond delay="0"/>
                                   </p:stCondLst>
@@ -36299,33 +36373,15 @@
                                   </p:childTnLst>
                                 </p:cTn>
                               </p:par>
-                            </p:childTnLst>
-                          </p:cTn>
-                        </p:par>
-                      </p:childTnLst>
-                    </p:cTn>
-                  </p:par>
-                  <p:par>
-                    <p:cTn id="15" fill="hold">
-                      <p:stCondLst>
-                        <p:cond delay="indefinite"/>
-                      </p:stCondLst>
-                      <p:childTnLst>
-                        <p:par>
-                          <p:cTn id="16" fill="hold">
-                            <p:stCondLst>
-                              <p:cond delay="0"/>
-                            </p:stCondLst>
-                            <p:childTnLst>
                               <p:par>
-                                <p:cTn id="17" presetID="1" presetClass="entr" presetSubtype="0" fill="hold" grpId="0" nodeType="clickEffect">
+                                <p:cTn id="15" presetID="1" presetClass="entr" presetSubtype="0" fill="hold" grpId="0" nodeType="withEffect">
                                   <p:stCondLst>
                                     <p:cond delay="0"/>
                                   </p:stCondLst>
                                   <p:childTnLst>
                                     <p:set>
                                       <p:cBhvr>
-                                        <p:cTn id="18" dur="1" fill="hold">
+                                        <p:cTn id="16" dur="1" fill="hold">
                                           <p:stCondLst>
                                             <p:cond delay="0"/>
                                           </p:stCondLst>
@@ -36334,6 +36390,55 @@
                                           <p:spTgt spid="5">
                                             <p:txEl>
                                               <p:pRg st="4" end="4"/>
+                                            </p:txEl>
+                                          </p:spTgt>
+                                        </p:tgtEl>
+                                        <p:attrNameLst>
+                                          <p:attrName>style.visibility</p:attrName>
+                                        </p:attrNameLst>
+                                      </p:cBhvr>
+                                      <p:to>
+                                        <p:strVal val="visible"/>
+                                      </p:to>
+                                    </p:set>
+                                  </p:childTnLst>
+                                </p:cTn>
+                              </p:par>
+                            </p:childTnLst>
+                          </p:cTn>
+                        </p:par>
+                      </p:childTnLst>
+                    </p:cTn>
+                  </p:par>
+                  <p:par>
+                    <p:cTn id="17" fill="hold">
+                      <p:stCondLst>
+                        <p:cond delay="indefinite"/>
+                      </p:stCondLst>
+                      <p:childTnLst>
+                        <p:par>
+                          <p:cTn id="18" fill="hold">
+                            <p:stCondLst>
+                              <p:cond delay="0"/>
+                            </p:stCondLst>
+                            <p:childTnLst>
+                              <p:par>
+                                <p:cTn id="19" presetID="1" presetClass="entr" presetSubtype="0" fill="hold" grpId="0" nodeType="clickEffect">
+                                  <p:stCondLst>
+                                    <p:cond delay="0"/>
+                                  </p:stCondLst>
+                                  <p:childTnLst>
+                                    <p:set>
+                                      <p:cBhvr>
+                                        <p:cTn id="20" dur="1" fill="hold">
+                                          <p:stCondLst>
+                                            <p:cond delay="0"/>
+                                          </p:stCondLst>
+                                        </p:cTn>
+                                        <p:tgtEl>
+                                          <p:spTgt spid="5">
+                                            <p:txEl>
+                                              <p:pRg st="5" end="5"/>
                                             </p:txEl>
                                           </p:spTgt>
                                         </p:tgtEl>

</xml_diff>

<commit_message>
Add remark on numerical stability
</commit_message>
<xml_diff>
--- a/Debugging/debugging.pptx
+++ b/Debugging/debugging.pptx
@@ -4472,6 +4472,41 @@
           </a:p>
         </p:txBody>
       </p:sp>
+      <p:sp>
+        <p:nvSpPr>
+          <p:cNvPr id="4" name="TextBox 3"/>
+          <p:cNvSpPr txBox="1"/>
+          <p:nvPr/>
+        </p:nvSpPr>
+        <p:spPr>
+          <a:xfrm>
+            <a:off x="1691680" y="5864553"/>
+            <a:ext cx="4840492" cy="523220"/>
+          </a:xfrm>
+          <a:prstGeom prst="rect">
+            <a:avLst/>
+          </a:prstGeom>
+          <a:noFill/>
+          <a:ln>
+            <a:solidFill>
+              <a:schemeClr val="tx1"/>
+            </a:solidFill>
+          </a:ln>
+        </p:spPr>
+        <p:txBody>
+          <a:bodyPr wrap="none" rtlCol="0">
+            <a:spAutoFit/>
+          </a:bodyPr>
+          <a:lstStyle/>
+          <a:p>
+            <a:r>
+              <a:rPr lang="en-US" sz="2800" dirty="0" smtClean="0"/>
+              <a:t>However, revise your algorithm!</a:t>
+            </a:r>
+            <a:endParaRPr lang="en-US" sz="2800" dirty="0"/>
+          </a:p>
+        </p:txBody>
+      </p:sp>
     </p:spTree>
     <p:extLst>
       <p:ext uri="{BB962C8B-B14F-4D97-AF65-F5344CB8AC3E}">
@@ -4720,6 +4755,51 @@
                       </p:childTnLst>
                     </p:cTn>
                   </p:par>
+                  <p:par>
+                    <p:cTn id="21" fill="hold">
+                      <p:stCondLst>
+                        <p:cond delay="indefinite"/>
+                      </p:stCondLst>
+                      <p:childTnLst>
+                        <p:par>
+                          <p:cTn id="22" fill="hold">
+                            <p:stCondLst>
+                              <p:cond delay="0"/>
+                            </p:stCondLst>
+                            <p:childTnLst>
+                              <p:par>
+                                <p:cTn id="23" presetID="1" presetClass="entr" presetSubtype="0" fill="hold" grpId="0" nodeType="clickEffect">
+                                  <p:stCondLst>
+                                    <p:cond delay="0"/>
+                                  </p:stCondLst>
+                                  <p:childTnLst>
+                                    <p:set>
+                                      <p:cBhvr>
+                                        <p:cTn id="24" dur="1" fill="hold">
+                                          <p:stCondLst>
+                                            <p:cond delay="0"/>
+                                          </p:stCondLst>
+                                        </p:cTn>
+                                        <p:tgtEl>
+                                          <p:spTgt spid="4"/>
+                                        </p:tgtEl>
+                                        <p:attrNameLst>
+                                          <p:attrName>style.visibility</p:attrName>
+                                        </p:attrNameLst>
+                                      </p:cBhvr>
+                                      <p:to>
+                                        <p:strVal val="visible"/>
+                                      </p:to>
+                                    </p:set>
+                                  </p:childTnLst>
+                                </p:cTn>
+                              </p:par>
+                            </p:childTnLst>
+                          </p:cTn>
+                        </p:par>
+                      </p:childTnLst>
+                    </p:cTn>
+                  </p:par>
                 </p:childTnLst>
               </p:cTn>
               <p:prevCondLst>
@@ -4743,6 +4823,7 @@
     </p:tnLst>
     <p:bldLst>
       <p:bldP spid="3" grpId="0" uiExpand="1" build="p" bldLvl="2"/>
+      <p:bldP spid="4" grpId="0" animBg="1"/>
     </p:bldLst>
   </p:timing>
 </p:sld>

</xml_diff>